<commit_message>
Added infor to powerpoint
</commit_message>
<xml_diff>
--- a/Paper Presentation/EECS405.PattersonFitzpatrick.PaperPresentation.pptx
+++ b/Paper Presentation/EECS405.PattersonFitzpatrick.PaperPresentation.pptx
@@ -7,6 +7,11 @@
   <p:sldIdLst>
     <p:sldId id="256" r:id="rId2"/>
     <p:sldId id="257" r:id="rId3"/>
+    <p:sldId id="258" r:id="rId4"/>
+    <p:sldId id="259" r:id="rId5"/>
+    <p:sldId id="260" r:id="rId6"/>
+    <p:sldId id="261" r:id="rId7"/>
+    <p:sldId id="262" r:id="rId8"/>
   </p:sldIdLst>
   <p:sldSz cx="12192000" cy="6858000"/>
   <p:notesSz cx="6858000" cy="9144000"/>
@@ -105,6 +110,11 @@
       </a:defRPr>
     </a:lvl9pPr>
   </p:defaultTextStyle>
+  <p:extLst>
+    <p:ext uri="{EFAFB233-063F-42B5-8137-9DF3F51BA10A}">
+      <p15:sldGuideLst xmlns:p15="http://schemas.microsoft.com/office/powerpoint/2012/main"/>
+    </p:ext>
+  </p:extLst>
 </p:presentation>
 </file>
 
@@ -239,7 +249,7 @@
           <a:p>
             <a:fld id="{4CB9A5DF-9AA1-485A-BB35-9AB4EAD39946}" type="datetimeFigureOut">
               <a:rPr lang="en-US" smtClean="0"/>
-              <a:t>4/9/2014</a:t>
+              <a:t>4/14/2014</a:t>
             </a:fld>
             <a:endParaRPr lang="en-US"/>
           </a:p>
@@ -409,7 +419,7 @@
           <a:p>
             <a:fld id="{4CB9A5DF-9AA1-485A-BB35-9AB4EAD39946}" type="datetimeFigureOut">
               <a:rPr lang="en-US" smtClean="0"/>
-              <a:t>4/9/2014</a:t>
+              <a:t>4/14/2014</a:t>
             </a:fld>
             <a:endParaRPr lang="en-US"/>
           </a:p>
@@ -589,7 +599,7 @@
           <a:p>
             <a:fld id="{4CB9A5DF-9AA1-485A-BB35-9AB4EAD39946}" type="datetimeFigureOut">
               <a:rPr lang="en-US" smtClean="0"/>
-              <a:t>4/9/2014</a:t>
+              <a:t>4/14/2014</a:t>
             </a:fld>
             <a:endParaRPr lang="en-US"/>
           </a:p>
@@ -759,7 +769,7 @@
           <a:p>
             <a:fld id="{4CB9A5DF-9AA1-485A-BB35-9AB4EAD39946}" type="datetimeFigureOut">
               <a:rPr lang="en-US" smtClean="0"/>
-              <a:t>4/9/2014</a:t>
+              <a:t>4/14/2014</a:t>
             </a:fld>
             <a:endParaRPr lang="en-US"/>
           </a:p>
@@ -1005,7 +1015,7 @@
           <a:p>
             <a:fld id="{4CB9A5DF-9AA1-485A-BB35-9AB4EAD39946}" type="datetimeFigureOut">
               <a:rPr lang="en-US" smtClean="0"/>
-              <a:t>4/9/2014</a:t>
+              <a:t>4/14/2014</a:t>
             </a:fld>
             <a:endParaRPr lang="en-US"/>
           </a:p>
@@ -1237,7 +1247,7 @@
           <a:p>
             <a:fld id="{4CB9A5DF-9AA1-485A-BB35-9AB4EAD39946}" type="datetimeFigureOut">
               <a:rPr lang="en-US" smtClean="0"/>
-              <a:t>4/9/2014</a:t>
+              <a:t>4/14/2014</a:t>
             </a:fld>
             <a:endParaRPr lang="en-US"/>
           </a:p>
@@ -1604,7 +1614,7 @@
           <a:p>
             <a:fld id="{4CB9A5DF-9AA1-485A-BB35-9AB4EAD39946}" type="datetimeFigureOut">
               <a:rPr lang="en-US" smtClean="0"/>
-              <a:t>4/9/2014</a:t>
+              <a:t>4/14/2014</a:t>
             </a:fld>
             <a:endParaRPr lang="en-US"/>
           </a:p>
@@ -1722,7 +1732,7 @@
           <a:p>
             <a:fld id="{4CB9A5DF-9AA1-485A-BB35-9AB4EAD39946}" type="datetimeFigureOut">
               <a:rPr lang="en-US" smtClean="0"/>
-              <a:t>4/9/2014</a:t>
+              <a:t>4/14/2014</a:t>
             </a:fld>
             <a:endParaRPr lang="en-US"/>
           </a:p>
@@ -1817,7 +1827,7 @@
           <a:p>
             <a:fld id="{4CB9A5DF-9AA1-485A-BB35-9AB4EAD39946}" type="datetimeFigureOut">
               <a:rPr lang="en-US" smtClean="0"/>
-              <a:t>4/9/2014</a:t>
+              <a:t>4/14/2014</a:t>
             </a:fld>
             <a:endParaRPr lang="en-US"/>
           </a:p>
@@ -2094,7 +2104,7 @@
           <a:p>
             <a:fld id="{4CB9A5DF-9AA1-485A-BB35-9AB4EAD39946}" type="datetimeFigureOut">
               <a:rPr lang="en-US" smtClean="0"/>
-              <a:t>4/9/2014</a:t>
+              <a:t>4/14/2014</a:t>
             </a:fld>
             <a:endParaRPr lang="en-US"/>
           </a:p>
@@ -2347,7 +2357,7 @@
           <a:p>
             <a:fld id="{4CB9A5DF-9AA1-485A-BB35-9AB4EAD39946}" type="datetimeFigureOut">
               <a:rPr lang="en-US" smtClean="0"/>
-              <a:t>4/9/2014</a:t>
+              <a:t>4/14/2014</a:t>
             </a:fld>
             <a:endParaRPr lang="en-US"/>
           </a:p>
@@ -2582,7 +2592,7 @@
           <a:p>
             <a:fld id="{4CB9A5DF-9AA1-485A-BB35-9AB4EAD39946}" type="datetimeFigureOut">
               <a:rPr lang="en-US" smtClean="0"/>
-              <a:t>4/9/2014</a:t>
+              <a:t>4/14/2014</a:t>
             </a:fld>
             <a:endParaRPr lang="en-US"/>
           </a:p>
@@ -3244,6 +3254,604 @@
 </p:sld>
 </file>
 
+<file path=ppt/slides/slide3.xml><?xml version="1.0" encoding="utf-8"?>
+<p:sld xmlns:a="http://schemas.openxmlformats.org/drawingml/2006/main" xmlns:r="http://schemas.openxmlformats.org/officeDocument/2006/relationships" xmlns:p="http://schemas.openxmlformats.org/presentationml/2006/main">
+  <p:cSld>
+    <p:spTree>
+      <p:nvGrpSpPr>
+        <p:cNvPr id="1" name=""/>
+        <p:cNvGrpSpPr/>
+        <p:nvPr/>
+      </p:nvGrpSpPr>
+      <p:grpSpPr>
+        <a:xfrm>
+          <a:off x="0" y="0"/>
+          <a:ext cx="0" cy="0"/>
+          <a:chOff x="0" y="0"/>
+          <a:chExt cx="0" cy="0"/>
+        </a:xfrm>
+      </p:grpSpPr>
+      <p:sp>
+        <p:nvSpPr>
+          <p:cNvPr id="2" name="Title 1"/>
+          <p:cNvSpPr>
+            <a:spLocks noGrp="1"/>
+          </p:cNvSpPr>
+          <p:nvPr>
+            <p:ph type="title"/>
+          </p:nvPr>
+        </p:nvSpPr>
+        <p:spPr/>
+        <p:txBody>
+          <a:bodyPr/>
+          <a:lstStyle/>
+          <a:p>
+            <a:r>
+              <a:rPr lang="en-US" dirty="0" smtClean="0"/>
+              <a:t>Introduction</a:t>
+            </a:r>
+            <a:endParaRPr lang="en-US" dirty="0"/>
+          </a:p>
+        </p:txBody>
+      </p:sp>
+      <p:sp>
+        <p:nvSpPr>
+          <p:cNvPr id="3" name="Content Placeholder 2"/>
+          <p:cNvSpPr>
+            <a:spLocks noGrp="1"/>
+          </p:cNvSpPr>
+          <p:nvPr>
+            <p:ph idx="1"/>
+          </p:nvPr>
+        </p:nvSpPr>
+        <p:spPr/>
+        <p:txBody>
+          <a:bodyPr/>
+          <a:lstStyle/>
+          <a:p>
+            <a:r>
+              <a:rPr lang="en-US" dirty="0" smtClean="0"/>
+              <a:t>Why?</a:t>
+            </a:r>
+          </a:p>
+          <a:p>
+            <a:pPr lvl="1"/>
+            <a:r>
+              <a:rPr lang="en-US" dirty="0" smtClean="0"/>
+              <a:t>Data Consistency</a:t>
+            </a:r>
+          </a:p>
+          <a:p>
+            <a:pPr lvl="1"/>
+            <a:r>
+              <a:rPr lang="en-US" dirty="0" smtClean="0"/>
+              <a:t>User Error</a:t>
+            </a:r>
+          </a:p>
+          <a:p>
+            <a:pPr lvl="1"/>
+            <a:r>
+              <a:rPr lang="en-US" dirty="0" smtClean="0"/>
+              <a:t>Significance to businesses</a:t>
+            </a:r>
+          </a:p>
+          <a:p>
+            <a:pPr lvl="1"/>
+            <a:endParaRPr lang="en-US" dirty="0"/>
+          </a:p>
+        </p:txBody>
+      </p:sp>
+    </p:spTree>
+    <p:extLst>
+      <p:ext uri="{BB962C8B-B14F-4D97-AF65-F5344CB8AC3E}">
+        <p14:creationId xmlns:p14="http://schemas.microsoft.com/office/powerpoint/2010/main" val="3855503630"/>
+      </p:ext>
+    </p:extLst>
+  </p:cSld>
+  <p:clrMapOvr>
+    <a:masterClrMapping/>
+  </p:clrMapOvr>
+</p:sld>
+</file>
+
+<file path=ppt/slides/slide4.xml><?xml version="1.0" encoding="utf-8"?>
+<p:sld xmlns:a="http://schemas.openxmlformats.org/drawingml/2006/main" xmlns:r="http://schemas.openxmlformats.org/officeDocument/2006/relationships" xmlns:p="http://schemas.openxmlformats.org/presentationml/2006/main">
+  <p:cSld>
+    <p:spTree>
+      <p:nvGrpSpPr>
+        <p:cNvPr id="1" name=""/>
+        <p:cNvGrpSpPr/>
+        <p:nvPr/>
+      </p:nvGrpSpPr>
+      <p:grpSpPr>
+        <a:xfrm>
+          <a:off x="0" y="0"/>
+          <a:ext cx="0" cy="0"/>
+          <a:chOff x="0" y="0"/>
+          <a:chExt cx="0" cy="0"/>
+        </a:xfrm>
+      </p:grpSpPr>
+      <p:sp>
+        <p:nvSpPr>
+          <p:cNvPr id="2" name="Title 1"/>
+          <p:cNvSpPr>
+            <a:spLocks noGrp="1"/>
+          </p:cNvSpPr>
+          <p:nvPr>
+            <p:ph type="title"/>
+          </p:nvPr>
+        </p:nvSpPr>
+        <p:spPr/>
+        <p:txBody>
+          <a:bodyPr/>
+          <a:lstStyle/>
+          <a:p>
+            <a:r>
+              <a:rPr lang="en-US" dirty="0" smtClean="0"/>
+              <a:t>TF/IDF</a:t>
+            </a:r>
+            <a:endParaRPr lang="en-US" dirty="0"/>
+          </a:p>
+        </p:txBody>
+      </p:sp>
+      <p:sp>
+        <p:nvSpPr>
+          <p:cNvPr id="3" name="Content Placeholder 2"/>
+          <p:cNvSpPr>
+            <a:spLocks noGrp="1"/>
+          </p:cNvSpPr>
+          <p:nvPr>
+            <p:ph idx="1"/>
+          </p:nvPr>
+        </p:nvSpPr>
+        <p:spPr/>
+        <p:txBody>
+          <a:bodyPr/>
+          <a:lstStyle/>
+          <a:p>
+            <a:r>
+              <a:rPr lang="en-US" dirty="0" smtClean="0"/>
+              <a:t>TF – Term Frequency</a:t>
+            </a:r>
+          </a:p>
+          <a:p>
+            <a:pPr lvl="1"/>
+            <a:r>
+              <a:rPr lang="en-US" dirty="0" smtClean="0"/>
+              <a:t>Each token is weighted by the total number of times it appears in the multi-set</a:t>
+            </a:r>
+          </a:p>
+          <a:p>
+            <a:pPr lvl="1"/>
+            <a:r>
+              <a:rPr lang="en-US" dirty="0" smtClean="0"/>
+              <a:t>The more times the term occurs (more common), the more weight given to it</a:t>
+            </a:r>
+          </a:p>
+          <a:p>
+            <a:r>
+              <a:rPr lang="en-US" dirty="0" smtClean="0"/>
+              <a:t>IDF – Inverse Document Frequency</a:t>
+            </a:r>
+          </a:p>
+          <a:p>
+            <a:pPr lvl="1"/>
+            <a:r>
+              <a:rPr lang="en-US" dirty="0" smtClean="0"/>
+              <a:t>The inverse of the total number of times a token appear in a database</a:t>
+            </a:r>
+          </a:p>
+          <a:p>
+            <a:pPr lvl="1"/>
+            <a:endParaRPr lang="en-US" dirty="0"/>
+          </a:p>
+        </p:txBody>
+      </p:sp>
+    </p:spTree>
+    <p:extLst>
+      <p:ext uri="{BB962C8B-B14F-4D97-AF65-F5344CB8AC3E}">
+        <p14:creationId xmlns:p14="http://schemas.microsoft.com/office/powerpoint/2010/main" val="2845544519"/>
+      </p:ext>
+    </p:extLst>
+  </p:cSld>
+  <p:clrMapOvr>
+    <a:masterClrMapping/>
+  </p:clrMapOvr>
+</p:sld>
+</file>
+
+<file path=ppt/slides/slide5.xml><?xml version="1.0" encoding="utf-8"?>
+<p:sld xmlns:a="http://schemas.openxmlformats.org/drawingml/2006/main" xmlns:r="http://schemas.openxmlformats.org/officeDocument/2006/relationships" xmlns:p="http://schemas.openxmlformats.org/presentationml/2006/main">
+  <p:cSld>
+    <p:spTree>
+      <p:nvGrpSpPr>
+        <p:cNvPr id="1" name=""/>
+        <p:cNvGrpSpPr/>
+        <p:nvPr/>
+      </p:nvGrpSpPr>
+      <p:grpSpPr>
+        <a:xfrm>
+          <a:off x="0" y="0"/>
+          <a:ext cx="0" cy="0"/>
+          <a:chOff x="0" y="0"/>
+          <a:chExt cx="0" cy="0"/>
+        </a:xfrm>
+      </p:grpSpPr>
+      <p:sp>
+        <p:nvSpPr>
+          <p:cNvPr id="2" name="Title 1"/>
+          <p:cNvSpPr>
+            <a:spLocks noGrp="1"/>
+          </p:cNvSpPr>
+          <p:nvPr>
+            <p:ph type="title"/>
+          </p:nvPr>
+        </p:nvSpPr>
+        <p:spPr/>
+        <p:txBody>
+          <a:bodyPr/>
+          <a:lstStyle/>
+          <a:p>
+            <a:r>
+              <a:rPr lang="en-US" dirty="0" smtClean="0"/>
+              <a:t>Usefulness of TF/IDF</a:t>
+            </a:r>
+            <a:endParaRPr lang="en-US" dirty="0"/>
+          </a:p>
+        </p:txBody>
+      </p:sp>
+      <p:sp>
+        <p:nvSpPr>
+          <p:cNvPr id="3" name="Content Placeholder 2"/>
+          <p:cNvSpPr>
+            <a:spLocks noGrp="1"/>
+          </p:cNvSpPr>
+          <p:nvPr>
+            <p:ph idx="1"/>
+          </p:nvPr>
+        </p:nvSpPr>
+        <p:spPr/>
+        <p:txBody>
+          <a:bodyPr/>
+          <a:lstStyle/>
+          <a:p>
+            <a:r>
+              <a:rPr lang="en-US" dirty="0" smtClean="0"/>
+              <a:t>These metrics utilize properties of datasets</a:t>
+            </a:r>
+          </a:p>
+          <a:p>
+            <a:r>
+              <a:rPr lang="en-US" dirty="0" smtClean="0"/>
+              <a:t>Most strings are unique</a:t>
+            </a:r>
+          </a:p>
+          <a:p>
+            <a:r>
+              <a:rPr lang="en-US" dirty="0" smtClean="0"/>
+              <a:t>Few strings are shared between documents</a:t>
+            </a:r>
+          </a:p>
+          <a:p>
+            <a:r>
+              <a:rPr lang="en-US" dirty="0" smtClean="0"/>
+              <a:t>Most strings have a small term frequency</a:t>
+            </a:r>
+          </a:p>
+          <a:p>
+            <a:endParaRPr lang="en-US" dirty="0" smtClean="0"/>
+          </a:p>
+        </p:txBody>
+      </p:sp>
+    </p:spTree>
+    <p:extLst>
+      <p:ext uri="{BB962C8B-B14F-4D97-AF65-F5344CB8AC3E}">
+        <p14:creationId xmlns:p14="http://schemas.microsoft.com/office/powerpoint/2010/main" val="3127636742"/>
+      </p:ext>
+    </p:extLst>
+  </p:cSld>
+  <p:clrMapOvr>
+    <a:masterClrMapping/>
+  </p:clrMapOvr>
+</p:sld>
+</file>
+
+<file path=ppt/slides/slide6.xml><?xml version="1.0" encoding="utf-8"?>
+<p:sld xmlns:a="http://schemas.openxmlformats.org/drawingml/2006/main" xmlns:r="http://schemas.openxmlformats.org/officeDocument/2006/relationships" xmlns:p="http://schemas.openxmlformats.org/presentationml/2006/main">
+  <p:cSld>
+    <p:spTree>
+      <p:nvGrpSpPr>
+        <p:cNvPr id="1" name=""/>
+        <p:cNvGrpSpPr/>
+        <p:nvPr/>
+      </p:nvGrpSpPr>
+      <p:grpSpPr>
+        <a:xfrm>
+          <a:off x="0" y="0"/>
+          <a:ext cx="0" cy="0"/>
+          <a:chOff x="0" y="0"/>
+          <a:chExt cx="0" cy="0"/>
+        </a:xfrm>
+      </p:grpSpPr>
+      <p:sp>
+        <p:nvSpPr>
+          <p:cNvPr id="2" name="Title 1"/>
+          <p:cNvSpPr>
+            <a:spLocks noGrp="1"/>
+          </p:cNvSpPr>
+          <p:nvPr>
+            <p:ph type="title"/>
+          </p:nvPr>
+        </p:nvSpPr>
+        <p:spPr/>
+        <p:txBody>
+          <a:bodyPr/>
+          <a:lstStyle/>
+          <a:p>
+            <a:r>
+              <a:rPr lang="en-US" dirty="0" smtClean="0"/>
+              <a:t>Existing Set Similarity Solutions</a:t>
+            </a:r>
+            <a:endParaRPr lang="en-US" dirty="0"/>
+          </a:p>
+        </p:txBody>
+      </p:sp>
+      <p:sp>
+        <p:nvSpPr>
+          <p:cNvPr id="3" name="Content Placeholder 2"/>
+          <p:cNvSpPr>
+            <a:spLocks noGrp="1"/>
+          </p:cNvSpPr>
+          <p:nvPr>
+            <p:ph idx="1"/>
+          </p:nvPr>
+        </p:nvSpPr>
+        <p:spPr/>
+        <p:txBody>
+          <a:bodyPr/>
+          <a:lstStyle/>
+          <a:p>
+            <a:r>
+              <a:rPr lang="en-US" dirty="0" smtClean="0"/>
+              <a:t>Relational Databases</a:t>
+            </a:r>
+          </a:p>
+          <a:p>
+            <a:pPr lvl="1"/>
+            <a:r>
+              <a:rPr lang="en-US" dirty="0" smtClean="0"/>
+              <a:t>Decompose String Sets into n-grams</a:t>
+            </a:r>
+          </a:p>
+          <a:p>
+            <a:pPr lvl="1"/>
+            <a:r>
+              <a:rPr lang="en-US" dirty="0" smtClean="0"/>
+              <a:t>Store locations/positions of grams</a:t>
+            </a:r>
+          </a:p>
+          <a:p>
+            <a:r>
+              <a:rPr lang="en-US" dirty="0" smtClean="0"/>
+              <a:t>Inverted Lists</a:t>
+            </a:r>
+          </a:p>
+          <a:p>
+            <a:pPr lvl="1"/>
+            <a:r>
+              <a:rPr lang="en-US" dirty="0" smtClean="0"/>
+              <a:t>Specialized Index</a:t>
+            </a:r>
+          </a:p>
+          <a:p>
+            <a:pPr lvl="1"/>
+            <a:r>
+              <a:rPr lang="en-US" dirty="0" smtClean="0"/>
+              <a:t>Each gram is a index in the list</a:t>
+            </a:r>
+          </a:p>
+          <a:p>
+            <a:pPr lvl="1"/>
+            <a:endParaRPr lang="en-US" dirty="0" smtClean="0"/>
+          </a:p>
+        </p:txBody>
+      </p:sp>
+    </p:spTree>
+    <p:extLst>
+      <p:ext uri="{BB962C8B-B14F-4D97-AF65-F5344CB8AC3E}">
+        <p14:creationId xmlns:p14="http://schemas.microsoft.com/office/powerpoint/2010/main" val="3441869188"/>
+      </p:ext>
+    </p:extLst>
+  </p:cSld>
+  <p:clrMapOvr>
+    <a:masterClrMapping/>
+  </p:clrMapOvr>
+</p:sld>
+</file>
+
+<file path=ppt/slides/slide7.xml><?xml version="1.0" encoding="utf-8"?>
+<p:sld xmlns:a="http://schemas.openxmlformats.org/drawingml/2006/main" xmlns:r="http://schemas.openxmlformats.org/officeDocument/2006/relationships" xmlns:p="http://schemas.openxmlformats.org/presentationml/2006/main">
+  <p:cSld>
+    <p:spTree>
+      <p:nvGrpSpPr>
+        <p:cNvPr id="1" name=""/>
+        <p:cNvGrpSpPr/>
+        <p:nvPr/>
+      </p:nvGrpSpPr>
+      <p:grpSpPr>
+        <a:xfrm>
+          <a:off x="0" y="0"/>
+          <a:ext cx="0" cy="0"/>
+          <a:chOff x="0" y="0"/>
+          <a:chExt cx="0" cy="0"/>
+        </a:xfrm>
+      </p:grpSpPr>
+      <p:sp>
+        <p:nvSpPr>
+          <p:cNvPr id="2" name="Title 1"/>
+          <p:cNvSpPr>
+            <a:spLocks noGrp="1"/>
+          </p:cNvSpPr>
+          <p:nvPr>
+            <p:ph type="title"/>
+          </p:nvPr>
+        </p:nvSpPr>
+        <p:spPr/>
+        <p:txBody>
+          <a:bodyPr/>
+          <a:lstStyle/>
+          <a:p>
+            <a:r>
+              <a:rPr lang="en-US" dirty="0" smtClean="0"/>
+              <a:t>Semantic Properties of IDF</a:t>
+            </a:r>
+            <a:endParaRPr lang="en-US" dirty="0"/>
+          </a:p>
+        </p:txBody>
+      </p:sp>
+      <p:sp>
+        <p:nvSpPr>
+          <p:cNvPr id="3" name="Content Placeholder 2"/>
+          <p:cNvSpPr>
+            <a:spLocks noGrp="1"/>
+          </p:cNvSpPr>
+          <p:nvPr>
+            <p:ph idx="1"/>
+          </p:nvPr>
+        </p:nvSpPr>
+        <p:spPr/>
+        <p:txBody>
+          <a:bodyPr/>
+          <a:lstStyle/>
+          <a:p>
+            <a:r>
+              <a:rPr lang="en-US" dirty="0" smtClean="0"/>
+              <a:t>Order Preservation</a:t>
+            </a:r>
+          </a:p>
+          <a:p>
+            <a:pPr lvl="1"/>
+            <a:r>
+              <a:rPr lang="en-US" dirty="0" smtClean="0"/>
+              <a:t>For all k!= l, if </a:t>
+            </a:r>
+            <a:r>
+              <a:rPr lang="en-US" dirty="0" err="1" smtClean="0"/>
+              <a:t>w</a:t>
+            </a:r>
+            <a:r>
+              <a:rPr lang="en-US" baseline="-25000" dirty="0" err="1" smtClean="0"/>
+              <a:t>k</a:t>
+            </a:r>
+            <a:r>
+              <a:rPr lang="en-US" dirty="0" smtClean="0"/>
+              <a:t>(s) &lt;= </a:t>
+            </a:r>
+            <a:r>
+              <a:rPr lang="en-US" dirty="0" err="1" smtClean="0"/>
+              <a:t>w</a:t>
+            </a:r>
+            <a:r>
+              <a:rPr lang="en-US" baseline="-25000" dirty="0" err="1" smtClean="0"/>
+              <a:t>k</a:t>
+            </a:r>
+            <a:r>
+              <a:rPr lang="en-US" dirty="0" smtClean="0"/>
+              <a:t>(r), then </a:t>
+            </a:r>
+            <a:r>
+              <a:rPr lang="en-US" dirty="0" err="1" smtClean="0"/>
+              <a:t>w</a:t>
+            </a:r>
+            <a:r>
+              <a:rPr lang="en-US" baseline="-25000" dirty="0" err="1" smtClean="0"/>
+              <a:t>l</a:t>
+            </a:r>
+            <a:r>
+              <a:rPr lang="en-US" dirty="0" smtClean="0"/>
+              <a:t>(s)&lt;= </a:t>
+            </a:r>
+            <a:r>
+              <a:rPr lang="en-US" dirty="0" err="1" smtClean="0"/>
+              <a:t>w</a:t>
+            </a:r>
+            <a:r>
+              <a:rPr lang="en-US" baseline="-25000" dirty="0" err="1" smtClean="0"/>
+              <a:t>l</a:t>
+            </a:r>
+            <a:r>
+              <a:rPr lang="en-US" dirty="0" smtClean="0"/>
+              <a:t>(r)</a:t>
+            </a:r>
+          </a:p>
+          <a:p>
+            <a:r>
+              <a:rPr lang="en-US" dirty="0" smtClean="0"/>
+              <a:t>Magnitude </a:t>
+            </a:r>
+            <a:r>
+              <a:rPr lang="en-US" dirty="0" err="1" smtClean="0"/>
+              <a:t>Boundedness</a:t>
+            </a:r>
+            <a:endParaRPr lang="en-US" dirty="0" smtClean="0"/>
+          </a:p>
+          <a:p>
+            <a:pPr lvl="1"/>
+            <a:r>
+              <a:rPr lang="en-US" dirty="0" smtClean="0"/>
+              <a:t>For any s and q, after retrieving </a:t>
+            </a:r>
+            <a:r>
+              <a:rPr lang="en-US" i="1" dirty="0" err="1" smtClean="0"/>
+              <a:t>len</a:t>
+            </a:r>
+            <a:r>
+              <a:rPr lang="en-US" i="1" dirty="0" smtClean="0"/>
+              <a:t>(s)</a:t>
+            </a:r>
+            <a:r>
+              <a:rPr lang="en-US" dirty="0"/>
+              <a:t> </a:t>
+            </a:r>
+            <a:r>
+              <a:rPr lang="en-US" dirty="0" smtClean="0"/>
+              <a:t>from any list </a:t>
+            </a:r>
+            <a:r>
+              <a:rPr lang="en-US" i="1" dirty="0" smtClean="0"/>
+              <a:t>k</a:t>
+            </a:r>
+            <a:r>
+              <a:rPr lang="en-US" dirty="0" smtClean="0"/>
+              <a:t>, the best case upper bound can be computed directly</a:t>
+            </a:r>
+          </a:p>
+          <a:p>
+            <a:r>
+              <a:rPr lang="en-US" dirty="0" smtClean="0"/>
+              <a:t>Length </a:t>
+            </a:r>
+            <a:r>
+              <a:rPr lang="en-US" dirty="0" err="1" smtClean="0"/>
+              <a:t>Boundedness</a:t>
+            </a:r>
+            <a:endParaRPr lang="en-US" dirty="0"/>
+          </a:p>
+        </p:txBody>
+      </p:sp>
+    </p:spTree>
+    <p:extLst>
+      <p:ext uri="{BB962C8B-B14F-4D97-AF65-F5344CB8AC3E}">
+        <p14:creationId xmlns:p14="http://schemas.microsoft.com/office/powerpoint/2010/main" val="2935519878"/>
+      </p:ext>
+    </p:extLst>
+  </p:cSld>
+  <p:clrMapOvr>
+    <a:masterClrMapping/>
+  </p:clrMapOvr>
+</p:sld>
+</file>
+
 <file path=ppt/theme/theme1.xml><?xml version="1.0" encoding="utf-8"?>
 <a:theme xmlns:a="http://schemas.openxmlformats.org/drawingml/2006/main" name="Office Theme">
   <a:themeElements>

</xml_diff>

<commit_message>
Final changes before concert
</commit_message>
<xml_diff>
--- a/Paper Presentation/EECS405.PattersonFitzpatrick.PaperPresentation.pptx
+++ b/Paper Presentation/EECS405.PattersonFitzpatrick.PaperPresentation.pptx
@@ -12,6 +12,10 @@
     <p:sldId id="260" r:id="rId6"/>
     <p:sldId id="261" r:id="rId7"/>
     <p:sldId id="262" r:id="rId8"/>
+    <p:sldId id="263" r:id="rId9"/>
+    <p:sldId id="265" r:id="rId10"/>
+    <p:sldId id="266" r:id="rId11"/>
+    <p:sldId id="264" r:id="rId12"/>
   </p:sldIdLst>
   <p:sldSz cx="12192000" cy="6858000"/>
   <p:notesSz cx="6858000" cy="9144000"/>
@@ -3146,6 +3150,181 @@
 </p:sld>
 </file>
 
+<file path=ppt/slides/slide10.xml><?xml version="1.0" encoding="utf-8"?>
+<p:sld xmlns:a="http://schemas.openxmlformats.org/drawingml/2006/main" xmlns:r="http://schemas.openxmlformats.org/officeDocument/2006/relationships" xmlns:p="http://schemas.openxmlformats.org/presentationml/2006/main">
+  <p:cSld>
+    <p:spTree>
+      <p:nvGrpSpPr>
+        <p:cNvPr id="1" name=""/>
+        <p:cNvGrpSpPr/>
+        <p:nvPr/>
+      </p:nvGrpSpPr>
+      <p:grpSpPr>
+        <a:xfrm>
+          <a:off x="0" y="0"/>
+          <a:ext cx="0" cy="0"/>
+          <a:chOff x="0" y="0"/>
+          <a:chExt cx="0" cy="0"/>
+        </a:xfrm>
+      </p:grpSpPr>
+      <p:sp>
+        <p:nvSpPr>
+          <p:cNvPr id="2" name="Title 1"/>
+          <p:cNvSpPr>
+            <a:spLocks noGrp="1"/>
+          </p:cNvSpPr>
+          <p:nvPr>
+            <p:ph type="title"/>
+          </p:nvPr>
+        </p:nvSpPr>
+        <p:spPr/>
+        <p:txBody>
+          <a:bodyPr/>
+          <a:lstStyle/>
+          <a:p>
+            <a:r>
+              <a:rPr lang="en-US" dirty="0" smtClean="0"/>
+              <a:t>Hybrid Algorithm</a:t>
+            </a:r>
+            <a:endParaRPr lang="en-US" dirty="0"/>
+          </a:p>
+        </p:txBody>
+      </p:sp>
+      <p:sp>
+        <p:nvSpPr>
+          <p:cNvPr id="3" name="Content Placeholder 2"/>
+          <p:cNvSpPr>
+            <a:spLocks noGrp="1"/>
+          </p:cNvSpPr>
+          <p:nvPr>
+            <p:ph idx="1"/>
+          </p:nvPr>
+        </p:nvSpPr>
+        <p:spPr/>
+        <p:txBody>
+          <a:bodyPr/>
+          <a:lstStyle/>
+          <a:p>
+            <a:r>
+              <a:rPr lang="en-US" smtClean="0"/>
+              <a:t>ADD STUFF HERE!</a:t>
+            </a:r>
+            <a:endParaRPr lang="en-US"/>
+          </a:p>
+        </p:txBody>
+      </p:sp>
+    </p:spTree>
+    <p:extLst>
+      <p:ext uri="{BB962C8B-B14F-4D97-AF65-F5344CB8AC3E}">
+        <p14:creationId xmlns:p14="http://schemas.microsoft.com/office/powerpoint/2010/main" val="2410208813"/>
+      </p:ext>
+    </p:extLst>
+  </p:cSld>
+  <p:clrMapOvr>
+    <a:masterClrMapping/>
+  </p:clrMapOvr>
+</p:sld>
+</file>
+
+<file path=ppt/slides/slide11.xml><?xml version="1.0" encoding="utf-8"?>
+<p:sld xmlns:a="http://schemas.openxmlformats.org/drawingml/2006/main" xmlns:r="http://schemas.openxmlformats.org/officeDocument/2006/relationships" xmlns:p="http://schemas.openxmlformats.org/presentationml/2006/main">
+  <p:cSld>
+    <p:spTree>
+      <p:nvGrpSpPr>
+        <p:cNvPr id="1" name=""/>
+        <p:cNvGrpSpPr/>
+        <p:nvPr/>
+      </p:nvGrpSpPr>
+      <p:grpSpPr>
+        <a:xfrm>
+          <a:off x="0" y="0"/>
+          <a:ext cx="0" cy="0"/>
+          <a:chOff x="0" y="0"/>
+          <a:chExt cx="0" cy="0"/>
+        </a:xfrm>
+      </p:grpSpPr>
+      <p:sp>
+        <p:nvSpPr>
+          <p:cNvPr id="2" name="Title 1"/>
+          <p:cNvSpPr>
+            <a:spLocks noGrp="1"/>
+          </p:cNvSpPr>
+          <p:nvPr>
+            <p:ph type="title"/>
+          </p:nvPr>
+        </p:nvSpPr>
+        <p:spPr/>
+        <p:txBody>
+          <a:bodyPr/>
+          <a:lstStyle/>
+          <a:p>
+            <a:r>
+              <a:rPr lang="en-US" dirty="0" smtClean="0"/>
+              <a:t>Conclusions</a:t>
+            </a:r>
+            <a:endParaRPr lang="en-US" dirty="0"/>
+          </a:p>
+        </p:txBody>
+      </p:sp>
+      <p:sp>
+        <p:nvSpPr>
+          <p:cNvPr id="3" name="Content Placeholder 2"/>
+          <p:cNvSpPr>
+            <a:spLocks noGrp="1"/>
+          </p:cNvSpPr>
+          <p:nvPr>
+            <p:ph idx="1"/>
+          </p:nvPr>
+        </p:nvSpPr>
+        <p:spPr/>
+        <p:txBody>
+          <a:bodyPr/>
+          <a:lstStyle/>
+          <a:p>
+            <a:r>
+              <a:rPr lang="en-US" dirty="0" smtClean="0"/>
+              <a:t>In General, SF had the best performance of the mentioned algorithms</a:t>
+            </a:r>
+          </a:p>
+          <a:p>
+            <a:pPr lvl="1"/>
+            <a:r>
+              <a:rPr lang="en-US" dirty="0" smtClean="0"/>
+              <a:t>Only in certain edge cases did the guarantees of </a:t>
+            </a:r>
+            <a:r>
+              <a:rPr lang="en-US" dirty="0" err="1" smtClean="0"/>
+              <a:t>iNRA</a:t>
+            </a:r>
+            <a:r>
+              <a:rPr lang="en-US" dirty="0" smtClean="0"/>
+              <a:t> improve performance</a:t>
+            </a:r>
+          </a:p>
+          <a:p>
+            <a:r>
+              <a:rPr lang="en-US" dirty="0" smtClean="0"/>
+              <a:t>All algorithms benefit from Length Bounded pruning</a:t>
+            </a:r>
+          </a:p>
+          <a:p>
+            <a:endParaRPr lang="en-US" dirty="0"/>
+          </a:p>
+        </p:txBody>
+      </p:sp>
+    </p:spTree>
+    <p:extLst>
+      <p:ext uri="{BB962C8B-B14F-4D97-AF65-F5344CB8AC3E}">
+        <p14:creationId xmlns:p14="http://schemas.microsoft.com/office/powerpoint/2010/main" val="1231606385"/>
+      </p:ext>
+    </p:extLst>
+  </p:cSld>
+  <p:clrMapOvr>
+    <a:masterClrMapping/>
+  </p:clrMapOvr>
+</p:sld>
+</file>
+
 <file path=ppt/slides/slide2.xml><?xml version="1.0" encoding="utf-8"?>
 <p:sld xmlns:a="http://schemas.openxmlformats.org/drawingml/2006/main" xmlns:r="http://schemas.openxmlformats.org/officeDocument/2006/relationships" xmlns:p="http://schemas.openxmlformats.org/presentationml/2006/main">
   <p:cSld>
@@ -3843,6 +4022,237 @@
     <p:extLst>
       <p:ext uri="{BB962C8B-B14F-4D97-AF65-F5344CB8AC3E}">
         <p14:creationId xmlns:p14="http://schemas.microsoft.com/office/powerpoint/2010/main" val="2935519878"/>
+      </p:ext>
+    </p:extLst>
+  </p:cSld>
+  <p:clrMapOvr>
+    <a:masterClrMapping/>
+  </p:clrMapOvr>
+</p:sld>
+</file>
+
+<file path=ppt/slides/slide8.xml><?xml version="1.0" encoding="utf-8"?>
+<p:sld xmlns:a="http://schemas.openxmlformats.org/drawingml/2006/main" xmlns:r="http://schemas.openxmlformats.org/officeDocument/2006/relationships" xmlns:p="http://schemas.openxmlformats.org/presentationml/2006/main">
+  <p:cSld>
+    <p:spTree>
+      <p:nvGrpSpPr>
+        <p:cNvPr id="1" name=""/>
+        <p:cNvGrpSpPr/>
+        <p:nvPr/>
+      </p:nvGrpSpPr>
+      <p:grpSpPr>
+        <a:xfrm>
+          <a:off x="0" y="0"/>
+          <a:ext cx="0" cy="0"/>
+          <a:chOff x="0" y="0"/>
+          <a:chExt cx="0" cy="0"/>
+        </a:xfrm>
+      </p:grpSpPr>
+      <p:sp>
+        <p:nvSpPr>
+          <p:cNvPr id="2" name="Title 1"/>
+          <p:cNvSpPr>
+            <a:spLocks noGrp="1"/>
+          </p:cNvSpPr>
+          <p:nvPr>
+            <p:ph type="title"/>
+          </p:nvPr>
+        </p:nvSpPr>
+        <p:spPr/>
+        <p:txBody>
+          <a:bodyPr/>
+          <a:lstStyle/>
+          <a:p>
+            <a:r>
+              <a:rPr lang="en-US" dirty="0" smtClean="0"/>
+              <a:t>Improved Non Random Access (</a:t>
+            </a:r>
+            <a:r>
+              <a:rPr lang="en-US" dirty="0" err="1" smtClean="0"/>
+              <a:t>iNRA</a:t>
+            </a:r>
+            <a:r>
+              <a:rPr lang="en-US" dirty="0" smtClean="0"/>
+              <a:t>)</a:t>
+            </a:r>
+            <a:endParaRPr lang="en-US" dirty="0"/>
+          </a:p>
+        </p:txBody>
+      </p:sp>
+      <p:sp>
+        <p:nvSpPr>
+          <p:cNvPr id="3" name="Content Placeholder 2"/>
+          <p:cNvSpPr>
+            <a:spLocks noGrp="1"/>
+          </p:cNvSpPr>
+          <p:nvPr>
+            <p:ph idx="1"/>
+          </p:nvPr>
+        </p:nvSpPr>
+        <p:spPr/>
+        <p:txBody>
+          <a:bodyPr/>
+          <a:lstStyle/>
+          <a:p>
+            <a:r>
+              <a:rPr lang="en-US" dirty="0" smtClean="0"/>
+              <a:t>Improvements to the NRA algorithm</a:t>
+            </a:r>
+          </a:p>
+          <a:p>
+            <a:r>
+              <a:rPr lang="en-US" dirty="0" smtClean="0"/>
+              <a:t>Use Length </a:t>
+            </a:r>
+            <a:r>
+              <a:rPr lang="en-US" dirty="0" err="1" smtClean="0"/>
+              <a:t>Boundedness</a:t>
+            </a:r>
+            <a:r>
+              <a:rPr lang="en-US" dirty="0" smtClean="0"/>
+              <a:t> to prune search space. </a:t>
+            </a:r>
+          </a:p>
+          <a:p>
+            <a:endParaRPr lang="en-US" dirty="0"/>
+          </a:p>
+        </p:txBody>
+      </p:sp>
+    </p:spTree>
+    <p:extLst>
+      <p:ext uri="{BB962C8B-B14F-4D97-AF65-F5344CB8AC3E}">
+        <p14:creationId xmlns:p14="http://schemas.microsoft.com/office/powerpoint/2010/main" val="603883257"/>
+      </p:ext>
+    </p:extLst>
+  </p:cSld>
+  <p:clrMapOvr>
+    <a:masterClrMapping/>
+  </p:clrMapOvr>
+</p:sld>
+</file>
+
+<file path=ppt/slides/slide9.xml><?xml version="1.0" encoding="utf-8"?>
+<p:sld xmlns:a="http://schemas.openxmlformats.org/drawingml/2006/main" xmlns:r="http://schemas.openxmlformats.org/officeDocument/2006/relationships" xmlns:p="http://schemas.openxmlformats.org/presentationml/2006/main">
+  <p:cSld>
+    <p:spTree>
+      <p:nvGrpSpPr>
+        <p:cNvPr id="1" name=""/>
+        <p:cNvGrpSpPr/>
+        <p:nvPr/>
+      </p:nvGrpSpPr>
+      <p:grpSpPr>
+        <a:xfrm>
+          <a:off x="0" y="0"/>
+          <a:ext cx="0" cy="0"/>
+          <a:chOff x="0" y="0"/>
+          <a:chExt cx="0" cy="0"/>
+        </a:xfrm>
+      </p:grpSpPr>
+      <p:sp>
+        <p:nvSpPr>
+          <p:cNvPr id="2" name="Title 1"/>
+          <p:cNvSpPr>
+            <a:spLocks noGrp="1"/>
+          </p:cNvSpPr>
+          <p:nvPr>
+            <p:ph type="title"/>
+          </p:nvPr>
+        </p:nvSpPr>
+        <p:spPr/>
+        <p:txBody>
+          <a:bodyPr/>
+          <a:lstStyle/>
+          <a:p>
+            <a:r>
+              <a:rPr lang="en-US" dirty="0" smtClean="0"/>
+              <a:t>Shortest-First Algorithm</a:t>
+            </a:r>
+            <a:endParaRPr lang="en-US" dirty="0"/>
+          </a:p>
+        </p:txBody>
+      </p:sp>
+      <p:sp>
+        <p:nvSpPr>
+          <p:cNvPr id="3" name="Content Placeholder 2"/>
+          <p:cNvSpPr>
+            <a:spLocks noGrp="1"/>
+          </p:cNvSpPr>
+          <p:nvPr>
+            <p:ph idx="1"/>
+          </p:nvPr>
+        </p:nvSpPr>
+        <p:spPr/>
+        <p:txBody>
+          <a:bodyPr/>
+          <a:lstStyle/>
+          <a:p>
+            <a:r>
+              <a:rPr lang="en-US" dirty="0" smtClean="0"/>
+              <a:t>Scan list in decreasing </a:t>
+            </a:r>
+            <a:r>
+              <a:rPr lang="en-US" dirty="0" err="1" smtClean="0"/>
+              <a:t>idf</a:t>
+            </a:r>
+            <a:r>
+              <a:rPr lang="en-US" dirty="0" smtClean="0"/>
+              <a:t> order</a:t>
+            </a:r>
+          </a:p>
+          <a:p>
+            <a:pPr lvl="1"/>
+            <a:r>
+              <a:rPr lang="en-US" dirty="0" smtClean="0"/>
+              <a:t>Tokens with lower </a:t>
+            </a:r>
+            <a:r>
+              <a:rPr lang="en-US" dirty="0" err="1" smtClean="0"/>
+              <a:t>idfs</a:t>
+            </a:r>
+            <a:r>
+              <a:rPr lang="en-US" dirty="0" smtClean="0"/>
+              <a:t> examined first</a:t>
+            </a:r>
+            <a:endParaRPr lang="en-US" dirty="0"/>
+          </a:p>
+          <a:p>
+            <a:pPr lvl="2"/>
+            <a:r>
+              <a:rPr lang="en-US" dirty="0" smtClean="0"/>
+              <a:t>Occur in fewer strings</a:t>
+            </a:r>
+          </a:p>
+          <a:p>
+            <a:pPr lvl="2"/>
+            <a:r>
+              <a:rPr lang="en-US" dirty="0" smtClean="0"/>
+              <a:t>Smaller lists of strings that they occur in</a:t>
+            </a:r>
+          </a:p>
+          <a:p>
+            <a:pPr lvl="2"/>
+            <a:r>
+              <a:rPr lang="en-US" dirty="0" smtClean="0"/>
+              <a:t>Smallest chance of false positive candidates</a:t>
+            </a:r>
+          </a:p>
+          <a:p>
+            <a:pPr lvl="2"/>
+            <a:endParaRPr lang="en-US" dirty="0" smtClean="0"/>
+          </a:p>
+          <a:p>
+            <a:r>
+              <a:rPr lang="en-US" dirty="0" smtClean="0"/>
+              <a:t>Find shortest list of candidate strings. </a:t>
+            </a:r>
+            <a:endParaRPr lang="en-US" dirty="0"/>
+          </a:p>
+        </p:txBody>
+      </p:sp>
+    </p:spTree>
+    <p:extLst>
+      <p:ext uri="{BB962C8B-B14F-4D97-AF65-F5344CB8AC3E}">
+        <p14:creationId xmlns:p14="http://schemas.microsoft.com/office/powerpoint/2010/main" val="2740628492"/>
       </p:ext>
     </p:extLst>
   </p:cSld>

</xml_diff>

<commit_message>
Added Intro and SF materials
</commit_message>
<xml_diff>
--- a/Paper Presentation/EECS405.PattersonFitzpatrick.PaperPresentation.pptx
+++ b/Paper Presentation/EECS405.PattersonFitzpatrick.PaperPresentation.pptx
@@ -18,7 +18,7 @@
     <p:sldId id="272" r:id="rId12"/>
     <p:sldId id="265" r:id="rId13"/>
     <p:sldId id="274" r:id="rId14"/>
-    <p:sldId id="267" r:id="rId15"/>
+    <p:sldId id="275" r:id="rId15"/>
     <p:sldId id="273" r:id="rId16"/>
     <p:sldId id="266" r:id="rId17"/>
     <p:sldId id="264" r:id="rId18"/>
@@ -3328,15 +3328,11 @@
                 <a:pPr lvl="1"/>
                 <a:r>
                   <a:rPr lang="en-US" dirty="0" smtClean="0"/>
-                  <a:t>Natural Cut-</a:t>
-                </a:r>
-                <a:r>
-                  <a:rPr lang="en-US" dirty="0" err="1" smtClean="0"/>
-                  <a:t>offLengths</a:t>
+                  <a:t>Natural </a:t>
                 </a:r>
                 <a:r>
                   <a:rPr lang="en-US" dirty="0" smtClean="0"/>
-                  <a:t> </a:t>
+                  <a:t>Cut-off Lengths </a:t>
                 </a:r>
                 <a:r>
                   <a:rPr lang="el-GR" dirty="0" smtClean="0"/>
@@ -3802,9 +3798,6 @@
                 <a:endParaRPr lang="en-US" dirty="0" smtClean="0"/>
               </a:p>
               <a:p>
-                <a:pPr marL="914400" lvl="2" indent="0">
-                  <a:buNone/>
-                </a:pPr>
                 <a:endParaRPr lang="en-US" dirty="0" smtClean="0"/>
               </a:p>
             </p:txBody>
@@ -3891,11 +3884,7 @@
           <a:p>
             <a:r>
               <a:rPr lang="en-US" dirty="0" smtClean="0"/>
-              <a:t>Shortest-First </a:t>
-            </a:r>
-            <a:r>
-              <a:rPr lang="en-US" dirty="0" smtClean="0"/>
-              <a:t>Algorithm (SF)</a:t>
+              <a:t>Shortest-First Algorithm (SF)</a:t>
             </a:r>
             <a:endParaRPr lang="en-US" dirty="0"/>
           </a:p>
@@ -3913,7 +3902,9 @@
         </p:nvSpPr>
         <p:spPr/>
         <p:txBody>
-          <a:bodyPr/>
+          <a:bodyPr>
+            <a:normAutofit fontScale="92500" lnSpcReduction="10000"/>
+          </a:bodyPr>
           <a:lstStyle/>
           <a:p>
             <a:r>
@@ -3956,18 +3947,36 @@
             </a:r>
             <a:r>
               <a:rPr lang="en-US" i="1" dirty="0" smtClean="0"/>
-              <a:t>(q)</a:t>
-            </a:r>
-            <a:endParaRPr lang="en-US" dirty="0" smtClean="0"/>
+              <a:t>(q</a:t>
+            </a:r>
+            <a:r>
+              <a:rPr lang="en-US" i="1" dirty="0" smtClean="0"/>
+              <a:t>)</a:t>
+            </a:r>
+          </a:p>
+          <a:p>
+            <a:r>
+              <a:rPr lang="en-US" dirty="0"/>
+              <a:t>Compute </a:t>
+            </a:r>
+            <a:r>
+              <a:rPr lang="el-GR" dirty="0"/>
+              <a:t>λ</a:t>
+            </a:r>
+            <a:r>
+              <a:rPr lang="en-US" baseline="-25000" dirty="0"/>
+              <a:t>1….n</a:t>
+            </a:r>
+            <a:endParaRPr lang="en-US" dirty="0"/>
           </a:p>
           <a:p>
             <a:r>
               <a:rPr lang="en-US" dirty="0" smtClean="0"/>
-              <a:t>Scan inverted lists </a:t>
+              <a:t>Scan </a:t>
             </a:r>
             <a:r>
               <a:rPr lang="en-US" dirty="0" smtClean="0"/>
-              <a:t>in decreasing </a:t>
+              <a:t>inverted lists in decreasing </a:t>
             </a:r>
             <a:r>
               <a:rPr lang="en-US" dirty="0" err="1" smtClean="0"/>
@@ -4075,8 +4084,17 @@
           <a:p>
             <a:r>
               <a:rPr lang="en-US" dirty="0" smtClean="0"/>
-              <a:t>Store candidates</a:t>
-            </a:r>
+              <a:t>Store </a:t>
+            </a:r>
+            <a:r>
+              <a:rPr lang="en-US" dirty="0" smtClean="0"/>
+              <a:t>candidates in candidate set </a:t>
+            </a:r>
+            <a:r>
+              <a:rPr lang="en-US" i="1" dirty="0" smtClean="0"/>
+              <a:t>C</a:t>
+            </a:r>
+            <a:endParaRPr lang="en-US" i="1" dirty="0" smtClean="0"/>
           </a:p>
           <a:p>
             <a:endParaRPr lang="en-US" dirty="0" smtClean="0"/>
@@ -4130,7 +4148,11 @@
           <a:p>
             <a:r>
               <a:rPr lang="en-US" dirty="0" smtClean="0"/>
-              <a:t>Shortest First - Algorithm</a:t>
+              <a:t>Shortest-First </a:t>
+            </a:r>
+            <a:r>
+              <a:rPr lang="en-US" dirty="0" smtClean="0"/>
+              <a:t>- Algorithm</a:t>
             </a:r>
             <a:endParaRPr lang="en-US" dirty="0"/>
           </a:p>
@@ -4172,9 +4194,16 @@
           </a:p>
           <a:p>
             <a:r>
-              <a:rPr lang="en-US" smtClean="0"/>
-              <a:t>Adjust </a:t>
-            </a:r>
+              <a:rPr lang="en-US" dirty="0" smtClean="0"/>
+              <a:t>As we search more subsequent list, the lengths of candidate strings will get shorter. </a:t>
+            </a:r>
+          </a:p>
+          <a:p>
+            <a:r>
+              <a:rPr lang="en-US" dirty="0" smtClean="0"/>
+              <a:t>Continue until scores for each element in candidate set is calculated</a:t>
+            </a:r>
+            <a:endParaRPr lang="en-US" dirty="0" smtClean="0"/>
           </a:p>
         </p:txBody>
       </p:sp>
@@ -4225,80 +4254,42 @@
           <a:p>
             <a:r>
               <a:rPr lang="en-US" dirty="0" smtClean="0"/>
-              <a:t>Shortest First - Algorithm</a:t>
+              <a:t>Shortest-First - Algorithm</a:t>
             </a:r>
             <a:endParaRPr lang="en-US" dirty="0"/>
           </a:p>
         </p:txBody>
       </p:sp>
-      <p:sp>
-        <p:nvSpPr>
-          <p:cNvPr id="3" name="Content Placeholder 2"/>
-          <p:cNvSpPr>
-            <a:spLocks noGrp="1"/>
-          </p:cNvSpPr>
+      <p:pic>
+        <p:nvPicPr>
+          <p:cNvPr id="8" name="Content Placeholder 7"/>
+          <p:cNvPicPr>
+            <a:picLocks noGrp="1" noChangeAspect="1"/>
+          </p:cNvPicPr>
           <p:nvPr>
             <p:ph idx="1"/>
           </p:nvPr>
-        </p:nvSpPr>
-        <p:spPr/>
-        <p:txBody>
-          <a:bodyPr/>
-          <a:lstStyle/>
-          <a:p>
-            <a:r>
-              <a:rPr lang="en-US" dirty="0" smtClean="0"/>
-              <a:t>Skip to the first entry in every list with </a:t>
-            </a:r>
-            <a:r>
-              <a:rPr lang="en-US" i="1" dirty="0" err="1" smtClean="0"/>
-              <a:t>len</a:t>
-            </a:r>
-            <a:r>
-              <a:rPr lang="en-US" i="1" dirty="0" smtClean="0"/>
-              <a:t>(s) &gt;= </a:t>
-            </a:r>
-            <a:r>
-              <a:rPr lang="el-GR" i="1" dirty="0" smtClean="0"/>
-              <a:t>τ</a:t>
-            </a:r>
-            <a:r>
-              <a:rPr lang="en-US" i="1" dirty="0" smtClean="0"/>
-              <a:t> </a:t>
-            </a:r>
-            <a:r>
-              <a:rPr lang="en-US" i="1" dirty="0" err="1" smtClean="0"/>
-              <a:t>len</a:t>
-            </a:r>
-            <a:r>
-              <a:rPr lang="en-US" i="1" dirty="0" smtClean="0"/>
-              <a:t>(q)</a:t>
-            </a:r>
-          </a:p>
-          <a:p>
-            <a:r>
-              <a:rPr lang="en-US" dirty="0" smtClean="0"/>
-              <a:t>Compute </a:t>
-            </a:r>
-            <a:r>
-              <a:rPr lang="el-GR" dirty="0" smtClean="0"/>
-              <a:t>λ</a:t>
-            </a:r>
-            <a:r>
-              <a:rPr lang="en-US" baseline="-25000" dirty="0" smtClean="0"/>
-              <a:t>1….n</a:t>
-            </a:r>
-            <a:endParaRPr lang="en-US" dirty="0" smtClean="0"/>
-          </a:p>
-          <a:p>
-            <a:endParaRPr lang="en-US" dirty="0"/>
-          </a:p>
-        </p:txBody>
-      </p:sp>
+        </p:nvPicPr>
+        <p:blipFill>
+          <a:blip r:embed="rId2"/>
+          <a:stretch>
+            <a:fillRect/>
+          </a:stretch>
+        </p:blipFill>
+        <p:spPr>
+          <a:xfrm>
+            <a:off x="2232929" y="1944130"/>
+            <a:ext cx="7726142" cy="4114328"/>
+          </a:xfrm>
+          <a:prstGeom prst="rect">
+            <a:avLst/>
+          </a:prstGeom>
+        </p:spPr>
+      </p:pic>
     </p:spTree>
     <p:extLst>
       <p:ext uri="{BB962C8B-B14F-4D97-AF65-F5344CB8AC3E}">
-        <p14:creationId xmlns:p14="http://schemas.microsoft.com/office/powerpoint/2010/main" val="2692966065"/>
+        <p14:creationId xmlns:p14="http://schemas.microsoft.com/office/powerpoint/2010/main" val="206841373"/>
       </p:ext>
     </p:extLst>
   </p:cSld>
@@ -4342,7 +4333,11 @@
           <a:p>
             <a:r>
               <a:rPr lang="en-US" dirty="0" smtClean="0"/>
-              <a:t>Shortest First - Performance</a:t>
+              <a:t>Shortest-First </a:t>
+            </a:r>
+            <a:r>
+              <a:rPr lang="en-US" dirty="0" smtClean="0"/>
+              <a:t>- Performance</a:t>
             </a:r>
             <a:endParaRPr lang="en-US" dirty="0"/>
           </a:p>
@@ -4409,8 +4404,50 @@
             <a:pPr lvl="1"/>
             <a:r>
               <a:rPr lang="en-US" dirty="0" smtClean="0"/>
-              <a:t>Occurs with many long lists and poor pruning</a:t>
-            </a:r>
+              <a:t>Occurs with many long </a:t>
+            </a:r>
+            <a:r>
+              <a:rPr lang="en-US" dirty="0" smtClean="0"/>
+              <a:t>lists, low </a:t>
+            </a:r>
+            <a:r>
+              <a:rPr lang="el-GR" dirty="0" smtClean="0"/>
+              <a:t>τ</a:t>
+            </a:r>
+            <a:r>
+              <a:rPr lang="en-US" dirty="0" smtClean="0"/>
+              <a:t>, and </a:t>
+            </a:r>
+            <a:r>
+              <a:rPr lang="en-US" dirty="0" smtClean="0"/>
+              <a:t>poor </a:t>
+            </a:r>
+            <a:r>
+              <a:rPr lang="en-US" dirty="0" smtClean="0"/>
+              <a:t>pruning lengths</a:t>
+            </a:r>
+          </a:p>
+          <a:p>
+            <a:r>
+              <a:rPr lang="en-US" dirty="0" smtClean="0"/>
+              <a:t>Curious Case</a:t>
+            </a:r>
+          </a:p>
+          <a:p>
+            <a:pPr lvl="1"/>
+            <a:r>
+              <a:rPr lang="en-US" dirty="0" smtClean="0"/>
+              <a:t>If the </a:t>
+            </a:r>
+            <a:r>
+              <a:rPr lang="el-GR" dirty="0" smtClean="0"/>
+              <a:t>τ</a:t>
+            </a:r>
+            <a:r>
+              <a:rPr lang="en-US" dirty="0" smtClean="0"/>
+              <a:t> = 1, then the search will only be done on string of the exact same length</a:t>
+            </a:r>
+            <a:endParaRPr lang="en-US" dirty="0" smtClean="0"/>
           </a:p>
           <a:p>
             <a:r>
@@ -4582,13 +4619,44 @@
             </a:r>
             <a:r>
               <a:rPr lang="en-US" dirty="0" smtClean="0"/>
-              <a:t> improve performance</a:t>
-            </a:r>
-          </a:p>
-          <a:p>
+              <a:t> improve </a:t>
+            </a:r>
             <a:r>
               <a:rPr lang="en-US" dirty="0" smtClean="0"/>
-              <a:t>All algorithms benefit from Length Bounded pruning</a:t>
+              <a:t>performance</a:t>
+            </a:r>
+          </a:p>
+          <a:p>
+            <a:pPr lvl="1"/>
+            <a:r>
+              <a:rPr lang="en-US" dirty="0" smtClean="0"/>
+              <a:t>The minimal bookkeeping </a:t>
+            </a:r>
+            <a:r>
+              <a:rPr lang="en-US" dirty="0" err="1" smtClean="0"/>
+              <a:t>outweighted</a:t>
+            </a:r>
+            <a:r>
+              <a:rPr lang="en-US" dirty="0" smtClean="0"/>
+              <a:t> gains from pruning search space</a:t>
+            </a:r>
+          </a:p>
+          <a:p>
+            <a:r>
+              <a:rPr lang="en-US" dirty="0" smtClean="0"/>
+              <a:t>All similarity </a:t>
+            </a:r>
+            <a:r>
+              <a:rPr lang="en-US" dirty="0" smtClean="0"/>
+              <a:t>search </a:t>
+            </a:r>
+            <a:r>
+              <a:rPr lang="en-US" dirty="0" smtClean="0"/>
+              <a:t>algorithms from this paper can </a:t>
+            </a:r>
+            <a:r>
+              <a:rPr lang="en-US" dirty="0" smtClean="0"/>
+              <a:t>benefit from Length Bounded pruning</a:t>
             </a:r>
           </a:p>
           <a:p>
@@ -4693,15 +4761,7 @@
           <a:p>
             <a:r>
               <a:rPr lang="en-US" dirty="0" smtClean="0"/>
-              <a:t>Set Similarity Versus </a:t>
-            </a:r>
-            <a:r>
-              <a:rPr lang="en-US" dirty="0" smtClean="0"/>
-              <a:t>String </a:t>
-            </a:r>
-            <a:r>
-              <a:rPr lang="en-US" dirty="0" smtClean="0"/>
-              <a:t>Similarity</a:t>
+              <a:t>Set Similarity Versus String Similarity</a:t>
             </a:r>
           </a:p>
           <a:p>
@@ -6459,25 +6519,4233 @@
           </a:p>
         </p:txBody>
       </p:sp>
-      <p:sp>
-        <p:nvSpPr>
-          <p:cNvPr id="3" name="Content Placeholder 2"/>
-          <p:cNvSpPr>
-            <a:spLocks noGrp="1"/>
-          </p:cNvSpPr>
+      <p:graphicFrame>
+        <p:nvGraphicFramePr>
+          <p:cNvPr id="13" name="Content Placeholder 12"/>
+          <p:cNvGraphicFramePr>
+            <a:graphicFrameLocks noGrp="1"/>
+          </p:cNvGraphicFramePr>
           <p:nvPr>
             <p:ph idx="1"/>
+            <p:extLst>
+              <p:ext uri="{D42A27DB-BD31-4B8C-83A1-F6EECF244321}">
+                <p14:modId xmlns:p14="http://schemas.microsoft.com/office/powerpoint/2010/main" val="3875980156"/>
+              </p:ext>
+            </p:extLst>
           </p:nvPr>
-        </p:nvSpPr>
-        <p:spPr/>
-        <p:txBody>
-          <a:bodyPr/>
-          <a:lstStyle/>
-          <a:p>
-            <a:endParaRPr lang="en-US"/>
-          </a:p>
-        </p:txBody>
-      </p:sp>
+        </p:nvGraphicFramePr>
+        <p:xfrm>
+          <a:off x="3009698" y="1997204"/>
+          <a:ext cx="6172603" cy="4008180"/>
+        </p:xfrm>
+        <a:graphic>
+          <a:graphicData uri="http://schemas.openxmlformats.org/drawingml/2006/table">
+            <a:tbl>
+              <a:tblPr/>
+              <a:tblGrid>
+                <a:gridCol w="424535"/>
+                <a:gridCol w="424535"/>
+                <a:gridCol w="431274"/>
+                <a:gridCol w="424535"/>
+                <a:gridCol w="424535"/>
+                <a:gridCol w="485183"/>
+                <a:gridCol w="424535"/>
+                <a:gridCol w="424535"/>
+                <a:gridCol w="566046"/>
+                <a:gridCol w="424535"/>
+                <a:gridCol w="424535"/>
+                <a:gridCol w="1293820"/>
+              </a:tblGrid>
+              <a:tr h="400818">
+                <a:tc gridSpan="2">
+                  <a:txBody>
+                    <a:bodyPr/>
+                    <a:lstStyle/>
+                    <a:p>
+                      <a:pPr algn="ctr" fontAlgn="b"/>
+                      <a:r>
+                        <a:rPr lang="en-US" sz="2300" b="0" i="0" u="none" strike="noStrike">
+                          <a:solidFill>
+                            <a:srgbClr val="000000"/>
+                          </a:solidFill>
+                          <a:effectLst/>
+                          <a:latin typeface="Calibri" panose="020F0502020204030204" pitchFamily="34" charset="0"/>
+                        </a:rPr>
+                        <a:t>7</a:t>
+                      </a:r>
+                    </a:p>
+                  </a:txBody>
+                  <a:tcPr marL="20041" marR="20041" marT="20041" marB="0" anchor="b">
+                    <a:lnL>
+                      <a:noFill/>
+                    </a:lnL>
+                    <a:lnR>
+                      <a:noFill/>
+                    </a:lnR>
+                    <a:lnT>
+                      <a:noFill/>
+                    </a:lnT>
+                    <a:lnB>
+                      <a:noFill/>
+                    </a:lnB>
+                  </a:tcPr>
+                </a:tc>
+                <a:tc hMerge="1">
+                  <a:txBody>
+                    <a:bodyPr/>
+                    <a:lstStyle/>
+                    <a:p>
+                      <a:endParaRPr lang="en-US"/>
+                    </a:p>
+                  </a:txBody>
+                  <a:tcPr/>
+                </a:tc>
+                <a:tc>
+                  <a:txBody>
+                    <a:bodyPr/>
+                    <a:lstStyle/>
+                    <a:p>
+                      <a:pPr algn="l" fontAlgn="b"/>
+                      <a:endParaRPr lang="en-US" sz="2300" b="0" i="0" u="none" strike="noStrike">
+                        <a:solidFill>
+                          <a:srgbClr val="000000"/>
+                        </a:solidFill>
+                        <a:effectLst/>
+                        <a:latin typeface="Calibri" panose="020F0502020204030204" pitchFamily="34" charset="0"/>
+                      </a:endParaRPr>
+                    </a:p>
+                  </a:txBody>
+                  <a:tcPr marL="20041" marR="20041" marT="20041" marB="0" anchor="b">
+                    <a:lnL>
+                      <a:noFill/>
+                    </a:lnL>
+                    <a:lnR>
+                      <a:noFill/>
+                    </a:lnR>
+                    <a:lnT>
+                      <a:noFill/>
+                    </a:lnT>
+                    <a:lnB>
+                      <a:noFill/>
+                    </a:lnB>
+                  </a:tcPr>
+                </a:tc>
+                <a:tc gridSpan="2">
+                  <a:txBody>
+                    <a:bodyPr/>
+                    <a:lstStyle/>
+                    <a:p>
+                      <a:pPr algn="ctr" fontAlgn="b"/>
+                      <a:r>
+                        <a:rPr lang="en-US" sz="2300" b="0" i="0" u="none" strike="noStrike">
+                          <a:solidFill>
+                            <a:srgbClr val="000000"/>
+                          </a:solidFill>
+                          <a:effectLst/>
+                          <a:latin typeface="Calibri" panose="020F0502020204030204" pitchFamily="34" charset="0"/>
+                        </a:rPr>
+                        <a:t>10</a:t>
+                      </a:r>
+                    </a:p>
+                  </a:txBody>
+                  <a:tcPr marL="20041" marR="20041" marT="20041" marB="0" anchor="b">
+                    <a:lnL>
+                      <a:noFill/>
+                    </a:lnL>
+                    <a:lnR>
+                      <a:noFill/>
+                    </a:lnR>
+                    <a:lnT>
+                      <a:noFill/>
+                    </a:lnT>
+                    <a:lnB>
+                      <a:noFill/>
+                    </a:lnB>
+                  </a:tcPr>
+                </a:tc>
+                <a:tc hMerge="1">
+                  <a:txBody>
+                    <a:bodyPr/>
+                    <a:lstStyle/>
+                    <a:p>
+                      <a:endParaRPr lang="en-US"/>
+                    </a:p>
+                  </a:txBody>
+                  <a:tcPr/>
+                </a:tc>
+                <a:tc>
+                  <a:txBody>
+                    <a:bodyPr/>
+                    <a:lstStyle/>
+                    <a:p>
+                      <a:pPr algn="l" fontAlgn="b"/>
+                      <a:endParaRPr lang="en-US" sz="2300" b="0" i="0" u="none" strike="noStrike">
+                        <a:solidFill>
+                          <a:srgbClr val="000000"/>
+                        </a:solidFill>
+                        <a:effectLst/>
+                        <a:latin typeface="Calibri" panose="020F0502020204030204" pitchFamily="34" charset="0"/>
+                      </a:endParaRPr>
+                    </a:p>
+                  </a:txBody>
+                  <a:tcPr marL="20041" marR="20041" marT="20041" marB="0" anchor="b">
+                    <a:lnL>
+                      <a:noFill/>
+                    </a:lnL>
+                    <a:lnR>
+                      <a:noFill/>
+                    </a:lnR>
+                    <a:lnT>
+                      <a:noFill/>
+                    </a:lnT>
+                    <a:lnB>
+                      <a:noFill/>
+                    </a:lnB>
+                  </a:tcPr>
+                </a:tc>
+                <a:tc gridSpan="2">
+                  <a:txBody>
+                    <a:bodyPr/>
+                    <a:lstStyle/>
+                    <a:p>
+                      <a:pPr algn="ctr" fontAlgn="b"/>
+                      <a:r>
+                        <a:rPr lang="en-US" sz="2300" b="0" i="0" u="none" strike="noStrike">
+                          <a:solidFill>
+                            <a:srgbClr val="000000"/>
+                          </a:solidFill>
+                          <a:effectLst/>
+                          <a:latin typeface="Calibri" panose="020F0502020204030204" pitchFamily="34" charset="0"/>
+                        </a:rPr>
+                        <a:t>15</a:t>
+                      </a:r>
+                    </a:p>
+                  </a:txBody>
+                  <a:tcPr marL="20041" marR="20041" marT="20041" marB="0" anchor="b">
+                    <a:lnL>
+                      <a:noFill/>
+                    </a:lnL>
+                    <a:lnR>
+                      <a:noFill/>
+                    </a:lnR>
+                    <a:lnT>
+                      <a:noFill/>
+                    </a:lnT>
+                    <a:lnB>
+                      <a:noFill/>
+                    </a:lnB>
+                  </a:tcPr>
+                </a:tc>
+                <a:tc hMerge="1">
+                  <a:txBody>
+                    <a:bodyPr/>
+                    <a:lstStyle/>
+                    <a:p>
+                      <a:endParaRPr lang="en-US"/>
+                    </a:p>
+                  </a:txBody>
+                  <a:tcPr/>
+                </a:tc>
+                <a:tc>
+                  <a:txBody>
+                    <a:bodyPr/>
+                    <a:lstStyle/>
+                    <a:p>
+                      <a:pPr algn="l" fontAlgn="b"/>
+                      <a:endParaRPr lang="en-US" sz="2300" b="0" i="0" u="none" strike="noStrike">
+                        <a:solidFill>
+                          <a:srgbClr val="000000"/>
+                        </a:solidFill>
+                        <a:effectLst/>
+                        <a:latin typeface="Calibri" panose="020F0502020204030204" pitchFamily="34" charset="0"/>
+                      </a:endParaRPr>
+                    </a:p>
+                  </a:txBody>
+                  <a:tcPr marL="20041" marR="20041" marT="20041" marB="0" anchor="b">
+                    <a:lnL>
+                      <a:noFill/>
+                    </a:lnL>
+                    <a:lnR>
+                      <a:noFill/>
+                    </a:lnR>
+                    <a:lnT>
+                      <a:noFill/>
+                    </a:lnT>
+                    <a:lnB>
+                      <a:noFill/>
+                    </a:lnB>
+                  </a:tcPr>
+                </a:tc>
+                <a:tc gridSpan="2">
+                  <a:txBody>
+                    <a:bodyPr/>
+                    <a:lstStyle/>
+                    <a:p>
+                      <a:pPr algn="ctr" fontAlgn="b"/>
+                      <a:r>
+                        <a:rPr lang="en-US" sz="2300" b="0" i="0" u="none" strike="noStrike">
+                          <a:solidFill>
+                            <a:srgbClr val="000000"/>
+                          </a:solidFill>
+                          <a:effectLst/>
+                          <a:latin typeface="Calibri" panose="020F0502020204030204" pitchFamily="34" charset="0"/>
+                        </a:rPr>
+                        <a:t>13</a:t>
+                      </a:r>
+                    </a:p>
+                  </a:txBody>
+                  <a:tcPr marL="20041" marR="20041" marT="20041" marB="0" anchor="b">
+                    <a:lnL>
+                      <a:noFill/>
+                    </a:lnL>
+                    <a:lnR>
+                      <a:noFill/>
+                    </a:lnR>
+                    <a:lnT>
+                      <a:noFill/>
+                    </a:lnT>
+                    <a:lnB>
+                      <a:noFill/>
+                    </a:lnB>
+                  </a:tcPr>
+                </a:tc>
+                <a:tc hMerge="1">
+                  <a:txBody>
+                    <a:bodyPr/>
+                    <a:lstStyle/>
+                    <a:p>
+                      <a:endParaRPr lang="en-US"/>
+                    </a:p>
+                  </a:txBody>
+                  <a:tcPr/>
+                </a:tc>
+                <a:tc>
+                  <a:txBody>
+                    <a:bodyPr/>
+                    <a:lstStyle/>
+                    <a:p>
+                      <a:pPr algn="l" fontAlgn="b"/>
+                      <a:r>
+                        <a:rPr lang="en-US" sz="2300" b="0" i="0" u="none" strike="noStrike">
+                          <a:solidFill>
+                            <a:srgbClr val="000000"/>
+                          </a:solidFill>
+                          <a:effectLst/>
+                          <a:latin typeface="Calibri" panose="020F0502020204030204" pitchFamily="34" charset="0"/>
+                        </a:rPr>
+                        <a:t>&lt;-- idf</a:t>
+                      </a:r>
+                    </a:p>
+                  </a:txBody>
+                  <a:tcPr marL="20041" marR="20041" marT="20041" marB="0" anchor="b">
+                    <a:lnL>
+                      <a:noFill/>
+                    </a:lnL>
+                    <a:lnR>
+                      <a:noFill/>
+                    </a:lnR>
+                    <a:lnT>
+                      <a:noFill/>
+                    </a:lnT>
+                    <a:lnB>
+                      <a:noFill/>
+                    </a:lnB>
+                  </a:tcPr>
+                </a:tc>
+              </a:tr>
+              <a:tr h="400818">
+                <a:tc gridSpan="2">
+                  <a:txBody>
+                    <a:bodyPr/>
+                    <a:lstStyle/>
+                    <a:p>
+                      <a:pPr algn="ctr" fontAlgn="b"/>
+                      <a:r>
+                        <a:rPr lang="en-US" sz="2300" b="0" i="0" u="none" strike="noStrike">
+                          <a:solidFill>
+                            <a:srgbClr val="000000"/>
+                          </a:solidFill>
+                          <a:effectLst/>
+                          <a:latin typeface="Calibri" panose="020F0502020204030204" pitchFamily="34" charset="0"/>
+                        </a:rPr>
+                        <a:t>Main</a:t>
+                      </a:r>
+                    </a:p>
+                  </a:txBody>
+                  <a:tcPr marL="20041" marR="20041" marT="20041" marB="0" anchor="b">
+                    <a:lnL>
+                      <a:noFill/>
+                    </a:lnL>
+                    <a:lnR>
+                      <a:noFill/>
+                    </a:lnR>
+                    <a:lnT>
+                      <a:noFill/>
+                    </a:lnT>
+                    <a:lnB w="6350" cap="flat" cmpd="sng" algn="ctr">
+                      <a:solidFill>
+                        <a:srgbClr val="000000"/>
+                      </a:solidFill>
+                      <a:prstDash val="solid"/>
+                      <a:round/>
+                      <a:headEnd type="none" w="med" len="med"/>
+                      <a:tailEnd type="none" w="med" len="med"/>
+                    </a:lnB>
+                  </a:tcPr>
+                </a:tc>
+                <a:tc hMerge="1">
+                  <a:txBody>
+                    <a:bodyPr/>
+                    <a:lstStyle/>
+                    <a:p>
+                      <a:endParaRPr lang="en-US"/>
+                    </a:p>
+                  </a:txBody>
+                  <a:tcPr/>
+                </a:tc>
+                <a:tc>
+                  <a:txBody>
+                    <a:bodyPr/>
+                    <a:lstStyle/>
+                    <a:p>
+                      <a:pPr algn="l" fontAlgn="b"/>
+                      <a:endParaRPr lang="en-US" sz="2300" b="0" i="0" u="none" strike="noStrike">
+                        <a:solidFill>
+                          <a:srgbClr val="000000"/>
+                        </a:solidFill>
+                        <a:effectLst/>
+                        <a:latin typeface="Calibri" panose="020F0502020204030204" pitchFamily="34" charset="0"/>
+                      </a:endParaRPr>
+                    </a:p>
+                  </a:txBody>
+                  <a:tcPr marL="20041" marR="20041" marT="20041" marB="0" anchor="b">
+                    <a:lnL>
+                      <a:noFill/>
+                    </a:lnL>
+                    <a:lnR>
+                      <a:noFill/>
+                    </a:lnR>
+                    <a:lnT>
+                      <a:noFill/>
+                    </a:lnT>
+                    <a:lnB>
+                      <a:noFill/>
+                    </a:lnB>
+                  </a:tcPr>
+                </a:tc>
+                <a:tc gridSpan="2">
+                  <a:txBody>
+                    <a:bodyPr/>
+                    <a:lstStyle/>
+                    <a:p>
+                      <a:pPr algn="ctr" fontAlgn="b"/>
+                      <a:r>
+                        <a:rPr lang="en-US" sz="2300" b="0" i="0" u="none" strike="noStrike">
+                          <a:solidFill>
+                            <a:srgbClr val="000000"/>
+                          </a:solidFill>
+                          <a:effectLst/>
+                          <a:latin typeface="Calibri" panose="020F0502020204030204" pitchFamily="34" charset="0"/>
+                        </a:rPr>
+                        <a:t>ain_</a:t>
+                      </a:r>
+                    </a:p>
+                  </a:txBody>
+                  <a:tcPr marL="20041" marR="20041" marT="20041" marB="0" anchor="b">
+                    <a:lnL>
+                      <a:noFill/>
+                    </a:lnL>
+                    <a:lnR>
+                      <a:noFill/>
+                    </a:lnR>
+                    <a:lnT>
+                      <a:noFill/>
+                    </a:lnT>
+                    <a:lnB w="6350" cap="flat" cmpd="sng" algn="ctr">
+                      <a:solidFill>
+                        <a:srgbClr val="000000"/>
+                      </a:solidFill>
+                      <a:prstDash val="solid"/>
+                      <a:round/>
+                      <a:headEnd type="none" w="med" len="med"/>
+                      <a:tailEnd type="none" w="med" len="med"/>
+                    </a:lnB>
+                  </a:tcPr>
+                </a:tc>
+                <a:tc hMerge="1">
+                  <a:txBody>
+                    <a:bodyPr/>
+                    <a:lstStyle/>
+                    <a:p>
+                      <a:endParaRPr lang="en-US"/>
+                    </a:p>
+                  </a:txBody>
+                  <a:tcPr/>
+                </a:tc>
+                <a:tc>
+                  <a:txBody>
+                    <a:bodyPr/>
+                    <a:lstStyle/>
+                    <a:p>
+                      <a:pPr algn="l" fontAlgn="b"/>
+                      <a:endParaRPr lang="en-US" sz="2300" b="0" i="0" u="none" strike="noStrike">
+                        <a:solidFill>
+                          <a:srgbClr val="000000"/>
+                        </a:solidFill>
+                        <a:effectLst/>
+                        <a:latin typeface="Calibri" panose="020F0502020204030204" pitchFamily="34" charset="0"/>
+                      </a:endParaRPr>
+                    </a:p>
+                  </a:txBody>
+                  <a:tcPr marL="20041" marR="20041" marT="20041" marB="0" anchor="b">
+                    <a:lnL>
+                      <a:noFill/>
+                    </a:lnL>
+                    <a:lnR>
+                      <a:noFill/>
+                    </a:lnR>
+                    <a:lnT>
+                      <a:noFill/>
+                    </a:lnT>
+                    <a:lnB>
+                      <a:noFill/>
+                    </a:lnB>
+                  </a:tcPr>
+                </a:tc>
+                <a:tc gridSpan="2">
+                  <a:txBody>
+                    <a:bodyPr/>
+                    <a:lstStyle/>
+                    <a:p>
+                      <a:pPr algn="ctr" fontAlgn="b"/>
+                      <a:r>
+                        <a:rPr lang="en-US" sz="2300" b="0" i="0" u="none" strike="noStrike">
+                          <a:solidFill>
+                            <a:srgbClr val="000000"/>
+                          </a:solidFill>
+                          <a:effectLst/>
+                          <a:latin typeface="Calibri" panose="020F0502020204030204" pitchFamily="34" charset="0"/>
+                        </a:rPr>
+                        <a:t>in_S</a:t>
+                      </a:r>
+                    </a:p>
+                  </a:txBody>
+                  <a:tcPr marL="20041" marR="20041" marT="20041" marB="0" anchor="b">
+                    <a:lnL>
+                      <a:noFill/>
+                    </a:lnL>
+                    <a:lnR>
+                      <a:noFill/>
+                    </a:lnR>
+                    <a:lnT>
+                      <a:noFill/>
+                    </a:lnT>
+                    <a:lnB w="6350" cap="flat" cmpd="sng" algn="ctr">
+                      <a:solidFill>
+                        <a:srgbClr val="000000"/>
+                      </a:solidFill>
+                      <a:prstDash val="solid"/>
+                      <a:round/>
+                      <a:headEnd type="none" w="med" len="med"/>
+                      <a:tailEnd type="none" w="med" len="med"/>
+                    </a:lnB>
+                  </a:tcPr>
+                </a:tc>
+                <a:tc hMerge="1">
+                  <a:txBody>
+                    <a:bodyPr/>
+                    <a:lstStyle/>
+                    <a:p>
+                      <a:endParaRPr lang="en-US"/>
+                    </a:p>
+                  </a:txBody>
+                  <a:tcPr/>
+                </a:tc>
+                <a:tc>
+                  <a:txBody>
+                    <a:bodyPr/>
+                    <a:lstStyle/>
+                    <a:p>
+                      <a:pPr algn="l" fontAlgn="b"/>
+                      <a:endParaRPr lang="en-US" sz="2300" b="0" i="0" u="none" strike="noStrike">
+                        <a:solidFill>
+                          <a:srgbClr val="000000"/>
+                        </a:solidFill>
+                        <a:effectLst/>
+                        <a:latin typeface="Calibri" panose="020F0502020204030204" pitchFamily="34" charset="0"/>
+                      </a:endParaRPr>
+                    </a:p>
+                  </a:txBody>
+                  <a:tcPr marL="20041" marR="20041" marT="20041" marB="0" anchor="b">
+                    <a:lnL>
+                      <a:noFill/>
+                    </a:lnL>
+                    <a:lnR>
+                      <a:noFill/>
+                    </a:lnR>
+                    <a:lnT>
+                      <a:noFill/>
+                    </a:lnT>
+                    <a:lnB>
+                      <a:noFill/>
+                    </a:lnB>
+                  </a:tcPr>
+                </a:tc>
+                <a:tc gridSpan="2">
+                  <a:txBody>
+                    <a:bodyPr/>
+                    <a:lstStyle/>
+                    <a:p>
+                      <a:pPr algn="ctr" fontAlgn="b"/>
+                      <a:r>
+                        <a:rPr lang="en-US" sz="2300" b="0" i="0" u="none" strike="noStrike">
+                          <a:solidFill>
+                            <a:srgbClr val="000000"/>
+                          </a:solidFill>
+                          <a:effectLst/>
+                          <a:latin typeface="Calibri" panose="020F0502020204030204" pitchFamily="34" charset="0"/>
+                        </a:rPr>
+                        <a:t>n_St</a:t>
+                      </a:r>
+                    </a:p>
+                  </a:txBody>
+                  <a:tcPr marL="20041" marR="20041" marT="20041" marB="0" anchor="b">
+                    <a:lnL>
+                      <a:noFill/>
+                    </a:lnL>
+                    <a:lnR>
+                      <a:noFill/>
+                    </a:lnR>
+                    <a:lnT>
+                      <a:noFill/>
+                    </a:lnT>
+                    <a:lnB w="6350" cap="flat" cmpd="sng" algn="ctr">
+                      <a:solidFill>
+                        <a:srgbClr val="000000"/>
+                      </a:solidFill>
+                      <a:prstDash val="solid"/>
+                      <a:round/>
+                      <a:headEnd type="none" w="med" len="med"/>
+                      <a:tailEnd type="none" w="med" len="med"/>
+                    </a:lnB>
+                  </a:tcPr>
+                </a:tc>
+                <a:tc hMerge="1">
+                  <a:txBody>
+                    <a:bodyPr/>
+                    <a:lstStyle/>
+                    <a:p>
+                      <a:endParaRPr lang="en-US"/>
+                    </a:p>
+                  </a:txBody>
+                  <a:tcPr/>
+                </a:tc>
+                <a:tc>
+                  <a:txBody>
+                    <a:bodyPr/>
+                    <a:lstStyle/>
+                    <a:p>
+                      <a:pPr algn="l" fontAlgn="b"/>
+                      <a:r>
+                        <a:rPr lang="en-US" sz="2300" b="0" i="0" u="none" strike="noStrike">
+                          <a:solidFill>
+                            <a:srgbClr val="000000"/>
+                          </a:solidFill>
+                          <a:effectLst/>
+                          <a:latin typeface="Calibri" panose="020F0502020204030204" pitchFamily="34" charset="0"/>
+                        </a:rPr>
+                        <a:t>&lt;-- 4-gram</a:t>
+                      </a:r>
+                    </a:p>
+                  </a:txBody>
+                  <a:tcPr marL="20041" marR="20041" marT="20041" marB="0" anchor="b">
+                    <a:lnL>
+                      <a:noFill/>
+                    </a:lnL>
+                    <a:lnR>
+                      <a:noFill/>
+                    </a:lnR>
+                    <a:lnT>
+                      <a:noFill/>
+                    </a:lnT>
+                    <a:lnB>
+                      <a:noFill/>
+                    </a:lnB>
+                  </a:tcPr>
+                </a:tc>
+              </a:tr>
+              <a:tr h="400818">
+                <a:tc>
+                  <a:txBody>
+                    <a:bodyPr/>
+                    <a:lstStyle/>
+                    <a:p>
+                      <a:pPr algn="r" fontAlgn="b"/>
+                      <a:r>
+                        <a:rPr lang="en-US" sz="2300" b="1" i="0" u="none" strike="noStrike">
+                          <a:solidFill>
+                            <a:srgbClr val="000000"/>
+                          </a:solidFill>
+                          <a:effectLst/>
+                          <a:latin typeface="Calibri" panose="020F0502020204030204" pitchFamily="34" charset="0"/>
+                        </a:rPr>
+                        <a:t>2</a:t>
+                      </a:r>
+                    </a:p>
+                  </a:txBody>
+                  <a:tcPr marL="20041" marR="20041" marT="20041" marB="0" anchor="b">
+                    <a:lnL w="6350" cap="flat" cmpd="sng" algn="ctr">
+                      <a:solidFill>
+                        <a:srgbClr val="000000"/>
+                      </a:solidFill>
+                      <a:prstDash val="solid"/>
+                      <a:round/>
+                      <a:headEnd type="none" w="med" len="med"/>
+                      <a:tailEnd type="none" w="med" len="med"/>
+                    </a:lnL>
+                    <a:lnR>
+                      <a:noFill/>
+                    </a:lnR>
+                    <a:lnT w="6350" cap="flat" cmpd="sng" algn="ctr">
+                      <a:solidFill>
+                        <a:srgbClr val="000000"/>
+                      </a:solidFill>
+                      <a:prstDash val="solid"/>
+                      <a:round/>
+                      <a:headEnd type="none" w="med" len="med"/>
+                      <a:tailEnd type="none" w="med" len="med"/>
+                    </a:lnT>
+                    <a:lnB>
+                      <a:noFill/>
+                    </a:lnB>
+                  </a:tcPr>
+                </a:tc>
+                <a:tc>
+                  <a:txBody>
+                    <a:bodyPr/>
+                    <a:lstStyle/>
+                    <a:p>
+                      <a:pPr algn="r" fontAlgn="b"/>
+                      <a:r>
+                        <a:rPr lang="en-US" sz="2300" b="0" i="0" u="none" strike="noStrike">
+                          <a:solidFill>
+                            <a:srgbClr val="000000"/>
+                          </a:solidFill>
+                          <a:effectLst/>
+                          <a:latin typeface="Calibri" panose="020F0502020204030204" pitchFamily="34" charset="0"/>
+                        </a:rPr>
+                        <a:t>3</a:t>
+                      </a:r>
+                    </a:p>
+                  </a:txBody>
+                  <a:tcPr marL="20041" marR="20041" marT="20041" marB="0" anchor="b">
+                    <a:lnL>
+                      <a:noFill/>
+                    </a:lnL>
+                    <a:lnR w="6350" cap="flat" cmpd="sng" algn="ctr">
+                      <a:solidFill>
+                        <a:srgbClr val="000000"/>
+                      </a:solidFill>
+                      <a:prstDash val="solid"/>
+                      <a:round/>
+                      <a:headEnd type="none" w="med" len="med"/>
+                      <a:tailEnd type="none" w="med" len="med"/>
+                    </a:lnR>
+                    <a:lnT w="6350" cap="flat" cmpd="sng" algn="ctr">
+                      <a:solidFill>
+                        <a:srgbClr val="000000"/>
+                      </a:solidFill>
+                      <a:prstDash val="solid"/>
+                      <a:round/>
+                      <a:headEnd type="none" w="med" len="med"/>
+                      <a:tailEnd type="none" w="med" len="med"/>
+                    </a:lnT>
+                    <a:lnB>
+                      <a:noFill/>
+                    </a:lnB>
+                  </a:tcPr>
+                </a:tc>
+                <a:tc>
+                  <a:txBody>
+                    <a:bodyPr/>
+                    <a:lstStyle/>
+                    <a:p>
+                      <a:pPr algn="l" fontAlgn="b"/>
+                      <a:endParaRPr lang="en-US" sz="2300" b="0" i="0" u="none" strike="noStrike">
+                        <a:solidFill>
+                          <a:srgbClr val="000000"/>
+                        </a:solidFill>
+                        <a:effectLst/>
+                        <a:latin typeface="Calibri" panose="020F0502020204030204" pitchFamily="34" charset="0"/>
+                      </a:endParaRPr>
+                    </a:p>
+                  </a:txBody>
+                  <a:tcPr marL="20041" marR="20041" marT="20041" marB="0" anchor="b">
+                    <a:lnL w="6350" cap="flat" cmpd="sng" algn="ctr">
+                      <a:solidFill>
+                        <a:srgbClr val="000000"/>
+                      </a:solidFill>
+                      <a:prstDash val="solid"/>
+                      <a:round/>
+                      <a:headEnd type="none" w="med" len="med"/>
+                      <a:tailEnd type="none" w="med" len="med"/>
+                    </a:lnL>
+                    <a:lnR w="6350" cap="flat" cmpd="sng" algn="ctr">
+                      <a:solidFill>
+                        <a:srgbClr val="000000"/>
+                      </a:solidFill>
+                      <a:prstDash val="solid"/>
+                      <a:round/>
+                      <a:headEnd type="none" w="med" len="med"/>
+                      <a:tailEnd type="none" w="med" len="med"/>
+                    </a:lnR>
+                    <a:lnT>
+                      <a:noFill/>
+                    </a:lnT>
+                    <a:lnB>
+                      <a:noFill/>
+                    </a:lnB>
+                  </a:tcPr>
+                </a:tc>
+                <a:tc>
+                  <a:txBody>
+                    <a:bodyPr/>
+                    <a:lstStyle/>
+                    <a:p>
+                      <a:pPr algn="r" fontAlgn="b"/>
+                      <a:r>
+                        <a:rPr lang="en-US" sz="2300" b="1" i="0" u="none" strike="noStrike">
+                          <a:solidFill>
+                            <a:srgbClr val="000000"/>
+                          </a:solidFill>
+                          <a:effectLst/>
+                          <a:latin typeface="Calibri" panose="020F0502020204030204" pitchFamily="34" charset="0"/>
+                        </a:rPr>
+                        <a:t>1</a:t>
+                      </a:r>
+                    </a:p>
+                  </a:txBody>
+                  <a:tcPr marL="20041" marR="20041" marT="20041" marB="0" anchor="b">
+                    <a:lnL w="6350" cap="flat" cmpd="sng" algn="ctr">
+                      <a:solidFill>
+                        <a:srgbClr val="000000"/>
+                      </a:solidFill>
+                      <a:prstDash val="solid"/>
+                      <a:round/>
+                      <a:headEnd type="none" w="med" len="med"/>
+                      <a:tailEnd type="none" w="med" len="med"/>
+                    </a:lnL>
+                    <a:lnR>
+                      <a:noFill/>
+                    </a:lnR>
+                    <a:lnT w="6350" cap="flat" cmpd="sng" algn="ctr">
+                      <a:solidFill>
+                        <a:srgbClr val="000000"/>
+                      </a:solidFill>
+                      <a:prstDash val="solid"/>
+                      <a:round/>
+                      <a:headEnd type="none" w="med" len="med"/>
+                      <a:tailEnd type="none" w="med" len="med"/>
+                    </a:lnT>
+                    <a:lnB>
+                      <a:noFill/>
+                    </a:lnB>
+                  </a:tcPr>
+                </a:tc>
+                <a:tc>
+                  <a:txBody>
+                    <a:bodyPr/>
+                    <a:lstStyle/>
+                    <a:p>
+                      <a:pPr algn="r" fontAlgn="b"/>
+                      <a:r>
+                        <a:rPr lang="en-US" sz="2300" b="0" i="0" u="none" strike="noStrike">
+                          <a:solidFill>
+                            <a:srgbClr val="000000"/>
+                          </a:solidFill>
+                          <a:effectLst/>
+                          <a:latin typeface="Calibri" panose="020F0502020204030204" pitchFamily="34" charset="0"/>
+                        </a:rPr>
+                        <a:t>1</a:t>
+                      </a:r>
+                    </a:p>
+                  </a:txBody>
+                  <a:tcPr marL="20041" marR="20041" marT="20041" marB="0" anchor="b">
+                    <a:lnL>
+                      <a:noFill/>
+                    </a:lnL>
+                    <a:lnR w="6350" cap="flat" cmpd="sng" algn="ctr">
+                      <a:solidFill>
+                        <a:srgbClr val="000000"/>
+                      </a:solidFill>
+                      <a:prstDash val="solid"/>
+                      <a:round/>
+                      <a:headEnd type="none" w="med" len="med"/>
+                      <a:tailEnd type="none" w="med" len="med"/>
+                    </a:lnR>
+                    <a:lnT w="6350" cap="flat" cmpd="sng" algn="ctr">
+                      <a:solidFill>
+                        <a:srgbClr val="000000"/>
+                      </a:solidFill>
+                      <a:prstDash val="solid"/>
+                      <a:round/>
+                      <a:headEnd type="none" w="med" len="med"/>
+                      <a:tailEnd type="none" w="med" len="med"/>
+                    </a:lnT>
+                    <a:lnB>
+                      <a:noFill/>
+                    </a:lnB>
+                  </a:tcPr>
+                </a:tc>
+                <a:tc>
+                  <a:txBody>
+                    <a:bodyPr/>
+                    <a:lstStyle/>
+                    <a:p>
+                      <a:pPr algn="l" fontAlgn="b"/>
+                      <a:endParaRPr lang="en-US" sz="2300" b="0" i="0" u="none" strike="noStrike">
+                        <a:solidFill>
+                          <a:srgbClr val="000000"/>
+                        </a:solidFill>
+                        <a:effectLst/>
+                        <a:latin typeface="Calibri" panose="020F0502020204030204" pitchFamily="34" charset="0"/>
+                      </a:endParaRPr>
+                    </a:p>
+                  </a:txBody>
+                  <a:tcPr marL="20041" marR="20041" marT="20041" marB="0" anchor="b">
+                    <a:lnL w="6350" cap="flat" cmpd="sng" algn="ctr">
+                      <a:solidFill>
+                        <a:srgbClr val="000000"/>
+                      </a:solidFill>
+                      <a:prstDash val="solid"/>
+                      <a:round/>
+                      <a:headEnd type="none" w="med" len="med"/>
+                      <a:tailEnd type="none" w="med" len="med"/>
+                    </a:lnL>
+                    <a:lnR w="6350" cap="flat" cmpd="sng" algn="ctr">
+                      <a:solidFill>
+                        <a:srgbClr val="000000"/>
+                      </a:solidFill>
+                      <a:prstDash val="solid"/>
+                      <a:round/>
+                      <a:headEnd type="none" w="med" len="med"/>
+                      <a:tailEnd type="none" w="med" len="med"/>
+                    </a:lnR>
+                    <a:lnT>
+                      <a:noFill/>
+                    </a:lnT>
+                    <a:lnB>
+                      <a:noFill/>
+                    </a:lnB>
+                  </a:tcPr>
+                </a:tc>
+                <a:tc>
+                  <a:txBody>
+                    <a:bodyPr/>
+                    <a:lstStyle/>
+                    <a:p>
+                      <a:pPr algn="r" fontAlgn="b"/>
+                      <a:r>
+                        <a:rPr lang="en-US" sz="2300" b="1" i="0" u="none" strike="noStrike">
+                          <a:solidFill>
+                            <a:srgbClr val="000000"/>
+                          </a:solidFill>
+                          <a:effectLst/>
+                          <a:latin typeface="Calibri" panose="020F0502020204030204" pitchFamily="34" charset="0"/>
+                        </a:rPr>
+                        <a:t>1</a:t>
+                      </a:r>
+                    </a:p>
+                  </a:txBody>
+                  <a:tcPr marL="20041" marR="20041" marT="20041" marB="0" anchor="b">
+                    <a:lnL w="6350" cap="flat" cmpd="sng" algn="ctr">
+                      <a:solidFill>
+                        <a:srgbClr val="000000"/>
+                      </a:solidFill>
+                      <a:prstDash val="solid"/>
+                      <a:round/>
+                      <a:headEnd type="none" w="med" len="med"/>
+                      <a:tailEnd type="none" w="med" len="med"/>
+                    </a:lnL>
+                    <a:lnR>
+                      <a:noFill/>
+                    </a:lnR>
+                    <a:lnT w="6350" cap="flat" cmpd="sng" algn="ctr">
+                      <a:solidFill>
+                        <a:srgbClr val="000000"/>
+                      </a:solidFill>
+                      <a:prstDash val="solid"/>
+                      <a:round/>
+                      <a:headEnd type="none" w="med" len="med"/>
+                      <a:tailEnd type="none" w="med" len="med"/>
+                    </a:lnT>
+                    <a:lnB>
+                      <a:noFill/>
+                    </a:lnB>
+                  </a:tcPr>
+                </a:tc>
+                <a:tc>
+                  <a:txBody>
+                    <a:bodyPr/>
+                    <a:lstStyle/>
+                    <a:p>
+                      <a:pPr algn="r" fontAlgn="b"/>
+                      <a:r>
+                        <a:rPr lang="en-US" sz="2300" b="0" i="0" u="none" strike="noStrike">
+                          <a:solidFill>
+                            <a:srgbClr val="000000"/>
+                          </a:solidFill>
+                          <a:effectLst/>
+                          <a:latin typeface="Calibri" panose="020F0502020204030204" pitchFamily="34" charset="0"/>
+                        </a:rPr>
+                        <a:t>1</a:t>
+                      </a:r>
+                    </a:p>
+                  </a:txBody>
+                  <a:tcPr marL="20041" marR="20041" marT="20041" marB="0" anchor="b">
+                    <a:lnL>
+                      <a:noFill/>
+                    </a:lnL>
+                    <a:lnR w="6350" cap="flat" cmpd="sng" algn="ctr">
+                      <a:solidFill>
+                        <a:srgbClr val="000000"/>
+                      </a:solidFill>
+                      <a:prstDash val="solid"/>
+                      <a:round/>
+                      <a:headEnd type="none" w="med" len="med"/>
+                      <a:tailEnd type="none" w="med" len="med"/>
+                    </a:lnR>
+                    <a:lnT w="6350" cap="flat" cmpd="sng" algn="ctr">
+                      <a:solidFill>
+                        <a:srgbClr val="000000"/>
+                      </a:solidFill>
+                      <a:prstDash val="solid"/>
+                      <a:round/>
+                      <a:headEnd type="none" w="med" len="med"/>
+                      <a:tailEnd type="none" w="med" len="med"/>
+                    </a:lnT>
+                    <a:lnB>
+                      <a:noFill/>
+                    </a:lnB>
+                  </a:tcPr>
+                </a:tc>
+                <a:tc>
+                  <a:txBody>
+                    <a:bodyPr/>
+                    <a:lstStyle/>
+                    <a:p>
+                      <a:pPr algn="l" fontAlgn="b"/>
+                      <a:endParaRPr lang="en-US" sz="2300" b="0" i="0" u="none" strike="noStrike">
+                        <a:solidFill>
+                          <a:srgbClr val="000000"/>
+                        </a:solidFill>
+                        <a:effectLst/>
+                        <a:latin typeface="Calibri" panose="020F0502020204030204" pitchFamily="34" charset="0"/>
+                      </a:endParaRPr>
+                    </a:p>
+                  </a:txBody>
+                  <a:tcPr marL="20041" marR="20041" marT="20041" marB="0" anchor="b">
+                    <a:lnL w="6350" cap="flat" cmpd="sng" algn="ctr">
+                      <a:solidFill>
+                        <a:srgbClr val="000000"/>
+                      </a:solidFill>
+                      <a:prstDash val="solid"/>
+                      <a:round/>
+                      <a:headEnd type="none" w="med" len="med"/>
+                      <a:tailEnd type="none" w="med" len="med"/>
+                    </a:lnL>
+                    <a:lnR w="6350" cap="flat" cmpd="sng" algn="ctr">
+                      <a:solidFill>
+                        <a:srgbClr val="000000"/>
+                      </a:solidFill>
+                      <a:prstDash val="solid"/>
+                      <a:round/>
+                      <a:headEnd type="none" w="med" len="med"/>
+                      <a:tailEnd type="none" w="med" len="med"/>
+                    </a:lnR>
+                    <a:lnT>
+                      <a:noFill/>
+                    </a:lnT>
+                    <a:lnB>
+                      <a:noFill/>
+                    </a:lnB>
+                  </a:tcPr>
+                </a:tc>
+                <a:tc>
+                  <a:txBody>
+                    <a:bodyPr/>
+                    <a:lstStyle/>
+                    <a:p>
+                      <a:pPr algn="r" fontAlgn="b"/>
+                      <a:r>
+                        <a:rPr lang="en-US" sz="2300" b="1" i="0" u="none" strike="noStrike">
+                          <a:solidFill>
+                            <a:srgbClr val="000000"/>
+                          </a:solidFill>
+                          <a:effectLst/>
+                          <a:latin typeface="Calibri" panose="020F0502020204030204" pitchFamily="34" charset="0"/>
+                        </a:rPr>
+                        <a:t>3</a:t>
+                      </a:r>
+                    </a:p>
+                  </a:txBody>
+                  <a:tcPr marL="20041" marR="20041" marT="20041" marB="0" anchor="b">
+                    <a:lnL w="6350" cap="flat" cmpd="sng" algn="ctr">
+                      <a:solidFill>
+                        <a:srgbClr val="000000"/>
+                      </a:solidFill>
+                      <a:prstDash val="solid"/>
+                      <a:round/>
+                      <a:headEnd type="none" w="med" len="med"/>
+                      <a:tailEnd type="none" w="med" len="med"/>
+                    </a:lnL>
+                    <a:lnR>
+                      <a:noFill/>
+                    </a:lnR>
+                    <a:lnT w="6350" cap="flat" cmpd="sng" algn="ctr">
+                      <a:solidFill>
+                        <a:srgbClr val="000000"/>
+                      </a:solidFill>
+                      <a:prstDash val="solid"/>
+                      <a:round/>
+                      <a:headEnd type="none" w="med" len="med"/>
+                      <a:tailEnd type="none" w="med" len="med"/>
+                    </a:lnT>
+                    <a:lnB>
+                      <a:noFill/>
+                    </a:lnB>
+                  </a:tcPr>
+                </a:tc>
+                <a:tc>
+                  <a:txBody>
+                    <a:bodyPr/>
+                    <a:lstStyle/>
+                    <a:p>
+                      <a:pPr algn="r" fontAlgn="b"/>
+                      <a:r>
+                        <a:rPr lang="en-US" sz="2300" b="0" i="0" u="none" strike="noStrike">
+                          <a:solidFill>
+                            <a:srgbClr val="000000"/>
+                          </a:solidFill>
+                          <a:effectLst/>
+                          <a:latin typeface="Calibri" panose="020F0502020204030204" pitchFamily="34" charset="0"/>
+                        </a:rPr>
+                        <a:t>5</a:t>
+                      </a:r>
+                    </a:p>
+                  </a:txBody>
+                  <a:tcPr marL="20041" marR="20041" marT="20041" marB="0" anchor="b">
+                    <a:lnL>
+                      <a:noFill/>
+                    </a:lnL>
+                    <a:lnR w="6350" cap="flat" cmpd="sng" algn="ctr">
+                      <a:solidFill>
+                        <a:srgbClr val="000000"/>
+                      </a:solidFill>
+                      <a:prstDash val="solid"/>
+                      <a:round/>
+                      <a:headEnd type="none" w="med" len="med"/>
+                      <a:tailEnd type="none" w="med" len="med"/>
+                    </a:lnR>
+                    <a:lnT w="6350" cap="flat" cmpd="sng" algn="ctr">
+                      <a:solidFill>
+                        <a:srgbClr val="000000"/>
+                      </a:solidFill>
+                      <a:prstDash val="solid"/>
+                      <a:round/>
+                      <a:headEnd type="none" w="med" len="med"/>
+                      <a:tailEnd type="none" w="med" len="med"/>
+                    </a:lnT>
+                    <a:lnB>
+                      <a:noFill/>
+                    </a:lnB>
+                  </a:tcPr>
+                </a:tc>
+                <a:tc>
+                  <a:txBody>
+                    <a:bodyPr/>
+                    <a:lstStyle/>
+                    <a:p>
+                      <a:pPr algn="l" fontAlgn="b"/>
+                      <a:endParaRPr lang="en-US" sz="2300" b="0" i="0" u="none" strike="noStrike">
+                        <a:solidFill>
+                          <a:srgbClr val="000000"/>
+                        </a:solidFill>
+                        <a:effectLst/>
+                        <a:latin typeface="Calibri" panose="020F0502020204030204" pitchFamily="34" charset="0"/>
+                      </a:endParaRPr>
+                    </a:p>
+                  </a:txBody>
+                  <a:tcPr marL="20041" marR="20041" marT="20041" marB="0" anchor="b">
+                    <a:lnL w="6350" cap="flat" cmpd="sng" algn="ctr">
+                      <a:solidFill>
+                        <a:srgbClr val="000000"/>
+                      </a:solidFill>
+                      <a:prstDash val="solid"/>
+                      <a:round/>
+                      <a:headEnd type="none" w="med" len="med"/>
+                      <a:tailEnd type="none" w="med" len="med"/>
+                    </a:lnL>
+                    <a:lnR>
+                      <a:noFill/>
+                    </a:lnR>
+                    <a:lnT>
+                      <a:noFill/>
+                    </a:lnT>
+                    <a:lnB>
+                      <a:noFill/>
+                    </a:lnB>
+                  </a:tcPr>
+                </a:tc>
+              </a:tr>
+              <a:tr h="400818">
+                <a:tc>
+                  <a:txBody>
+                    <a:bodyPr/>
+                    <a:lstStyle/>
+                    <a:p>
+                      <a:pPr algn="r" fontAlgn="b"/>
+                      <a:r>
+                        <a:rPr lang="en-US" sz="2300" b="1" i="0" u="none" strike="noStrike">
+                          <a:solidFill>
+                            <a:srgbClr val="000000"/>
+                          </a:solidFill>
+                          <a:effectLst/>
+                          <a:latin typeface="Calibri" panose="020F0502020204030204" pitchFamily="34" charset="0"/>
+                        </a:rPr>
+                        <a:t>3</a:t>
+                      </a:r>
+                    </a:p>
+                  </a:txBody>
+                  <a:tcPr marL="20041" marR="20041" marT="20041" marB="0" anchor="b">
+                    <a:lnL w="6350" cap="flat" cmpd="sng" algn="ctr">
+                      <a:solidFill>
+                        <a:srgbClr val="000000"/>
+                      </a:solidFill>
+                      <a:prstDash val="solid"/>
+                      <a:round/>
+                      <a:headEnd type="none" w="med" len="med"/>
+                      <a:tailEnd type="none" w="med" len="med"/>
+                    </a:lnL>
+                    <a:lnR>
+                      <a:noFill/>
+                    </a:lnR>
+                    <a:lnT>
+                      <a:noFill/>
+                    </a:lnT>
+                    <a:lnB>
+                      <a:noFill/>
+                    </a:lnB>
+                  </a:tcPr>
+                </a:tc>
+                <a:tc>
+                  <a:txBody>
+                    <a:bodyPr/>
+                    <a:lstStyle/>
+                    <a:p>
+                      <a:pPr algn="r" fontAlgn="b"/>
+                      <a:r>
+                        <a:rPr lang="en-US" sz="2300" b="0" i="0" u="none" strike="noStrike">
+                          <a:solidFill>
+                            <a:srgbClr val="000000"/>
+                          </a:solidFill>
+                          <a:effectLst/>
+                          <a:latin typeface="Calibri" panose="020F0502020204030204" pitchFamily="34" charset="0"/>
+                        </a:rPr>
+                        <a:t>5</a:t>
+                      </a:r>
+                    </a:p>
+                  </a:txBody>
+                  <a:tcPr marL="20041" marR="20041" marT="20041" marB="0" anchor="b">
+                    <a:lnL>
+                      <a:noFill/>
+                    </a:lnL>
+                    <a:lnR w="6350" cap="flat" cmpd="sng" algn="ctr">
+                      <a:solidFill>
+                        <a:srgbClr val="000000"/>
+                      </a:solidFill>
+                      <a:prstDash val="solid"/>
+                      <a:round/>
+                      <a:headEnd type="none" w="med" len="med"/>
+                      <a:tailEnd type="none" w="med" len="med"/>
+                    </a:lnR>
+                    <a:lnT>
+                      <a:noFill/>
+                    </a:lnT>
+                    <a:lnB>
+                      <a:noFill/>
+                    </a:lnB>
+                  </a:tcPr>
+                </a:tc>
+                <a:tc>
+                  <a:txBody>
+                    <a:bodyPr/>
+                    <a:lstStyle/>
+                    <a:p>
+                      <a:pPr algn="l" fontAlgn="b"/>
+                      <a:endParaRPr lang="en-US" sz="2300" b="0" i="0" u="none" strike="noStrike">
+                        <a:solidFill>
+                          <a:srgbClr val="000000"/>
+                        </a:solidFill>
+                        <a:effectLst/>
+                        <a:latin typeface="Calibri" panose="020F0502020204030204" pitchFamily="34" charset="0"/>
+                      </a:endParaRPr>
+                    </a:p>
+                  </a:txBody>
+                  <a:tcPr marL="20041" marR="20041" marT="20041" marB="0" anchor="b">
+                    <a:lnL w="6350" cap="flat" cmpd="sng" algn="ctr">
+                      <a:solidFill>
+                        <a:srgbClr val="000000"/>
+                      </a:solidFill>
+                      <a:prstDash val="solid"/>
+                      <a:round/>
+                      <a:headEnd type="none" w="med" len="med"/>
+                      <a:tailEnd type="none" w="med" len="med"/>
+                    </a:lnL>
+                    <a:lnR w="6350" cap="flat" cmpd="sng" algn="ctr">
+                      <a:solidFill>
+                        <a:srgbClr val="000000"/>
+                      </a:solidFill>
+                      <a:prstDash val="solid"/>
+                      <a:round/>
+                      <a:headEnd type="none" w="med" len="med"/>
+                      <a:tailEnd type="none" w="med" len="med"/>
+                    </a:lnR>
+                    <a:lnT>
+                      <a:noFill/>
+                    </a:lnT>
+                    <a:lnB>
+                      <a:noFill/>
+                    </a:lnB>
+                  </a:tcPr>
+                </a:tc>
+                <a:tc>
+                  <a:txBody>
+                    <a:bodyPr/>
+                    <a:lstStyle/>
+                    <a:p>
+                      <a:pPr algn="r" fontAlgn="b"/>
+                      <a:r>
+                        <a:rPr lang="en-US" sz="2300" b="1" i="0" u="none" strike="noStrike">
+                          <a:solidFill>
+                            <a:srgbClr val="000000"/>
+                          </a:solidFill>
+                          <a:effectLst/>
+                          <a:latin typeface="Calibri" panose="020F0502020204030204" pitchFamily="34" charset="0"/>
+                        </a:rPr>
+                        <a:t>3</a:t>
+                      </a:r>
+                    </a:p>
+                  </a:txBody>
+                  <a:tcPr marL="20041" marR="20041" marT="20041" marB="0" anchor="b">
+                    <a:lnL w="6350" cap="flat" cmpd="sng" algn="ctr">
+                      <a:solidFill>
+                        <a:srgbClr val="000000"/>
+                      </a:solidFill>
+                      <a:prstDash val="solid"/>
+                      <a:round/>
+                      <a:headEnd type="none" w="med" len="med"/>
+                      <a:tailEnd type="none" w="med" len="med"/>
+                    </a:lnL>
+                    <a:lnR>
+                      <a:noFill/>
+                    </a:lnR>
+                    <a:lnT>
+                      <a:noFill/>
+                    </a:lnT>
+                    <a:lnB>
+                      <a:noFill/>
+                    </a:lnB>
+                  </a:tcPr>
+                </a:tc>
+                <a:tc>
+                  <a:txBody>
+                    <a:bodyPr/>
+                    <a:lstStyle/>
+                    <a:p>
+                      <a:pPr algn="r" fontAlgn="b"/>
+                      <a:r>
+                        <a:rPr lang="en-US" sz="2300" b="0" i="0" u="none" strike="noStrike">
+                          <a:solidFill>
+                            <a:srgbClr val="000000"/>
+                          </a:solidFill>
+                          <a:effectLst/>
+                          <a:latin typeface="Calibri" panose="020F0502020204030204" pitchFamily="34" charset="0"/>
+                        </a:rPr>
+                        <a:t>5</a:t>
+                      </a:r>
+                    </a:p>
+                  </a:txBody>
+                  <a:tcPr marL="20041" marR="20041" marT="20041" marB="0" anchor="b">
+                    <a:lnL>
+                      <a:noFill/>
+                    </a:lnL>
+                    <a:lnR w="6350" cap="flat" cmpd="sng" algn="ctr">
+                      <a:solidFill>
+                        <a:srgbClr val="000000"/>
+                      </a:solidFill>
+                      <a:prstDash val="solid"/>
+                      <a:round/>
+                      <a:headEnd type="none" w="med" len="med"/>
+                      <a:tailEnd type="none" w="med" len="med"/>
+                    </a:lnR>
+                    <a:lnT>
+                      <a:noFill/>
+                    </a:lnT>
+                    <a:lnB>
+                      <a:noFill/>
+                    </a:lnB>
+                  </a:tcPr>
+                </a:tc>
+                <a:tc>
+                  <a:txBody>
+                    <a:bodyPr/>
+                    <a:lstStyle/>
+                    <a:p>
+                      <a:pPr algn="l" fontAlgn="b"/>
+                      <a:endParaRPr lang="en-US" sz="2300" b="0" i="0" u="none" strike="noStrike">
+                        <a:solidFill>
+                          <a:srgbClr val="000000"/>
+                        </a:solidFill>
+                        <a:effectLst/>
+                        <a:latin typeface="Calibri" panose="020F0502020204030204" pitchFamily="34" charset="0"/>
+                      </a:endParaRPr>
+                    </a:p>
+                  </a:txBody>
+                  <a:tcPr marL="20041" marR="20041" marT="20041" marB="0" anchor="b">
+                    <a:lnL w="6350" cap="flat" cmpd="sng" algn="ctr">
+                      <a:solidFill>
+                        <a:srgbClr val="000000"/>
+                      </a:solidFill>
+                      <a:prstDash val="solid"/>
+                      <a:round/>
+                      <a:headEnd type="none" w="med" len="med"/>
+                      <a:tailEnd type="none" w="med" len="med"/>
+                    </a:lnL>
+                    <a:lnR w="6350" cap="flat" cmpd="sng" algn="ctr">
+                      <a:solidFill>
+                        <a:srgbClr val="000000"/>
+                      </a:solidFill>
+                      <a:prstDash val="solid"/>
+                      <a:round/>
+                      <a:headEnd type="none" w="med" len="med"/>
+                      <a:tailEnd type="none" w="med" len="med"/>
+                    </a:lnR>
+                    <a:lnT>
+                      <a:noFill/>
+                    </a:lnT>
+                    <a:lnB>
+                      <a:noFill/>
+                    </a:lnB>
+                  </a:tcPr>
+                </a:tc>
+                <a:tc>
+                  <a:txBody>
+                    <a:bodyPr/>
+                    <a:lstStyle/>
+                    <a:p>
+                      <a:pPr algn="r" fontAlgn="b"/>
+                      <a:r>
+                        <a:rPr lang="en-US" sz="2300" b="1" i="0" u="none" strike="noStrike">
+                          <a:solidFill>
+                            <a:srgbClr val="000000"/>
+                          </a:solidFill>
+                          <a:effectLst/>
+                          <a:latin typeface="Calibri" panose="020F0502020204030204" pitchFamily="34" charset="0"/>
+                        </a:rPr>
+                        <a:t>5</a:t>
+                      </a:r>
+                    </a:p>
+                  </a:txBody>
+                  <a:tcPr marL="20041" marR="20041" marT="20041" marB="0" anchor="b">
+                    <a:lnL w="6350" cap="flat" cmpd="sng" algn="ctr">
+                      <a:solidFill>
+                        <a:srgbClr val="000000"/>
+                      </a:solidFill>
+                      <a:prstDash val="solid"/>
+                      <a:round/>
+                      <a:headEnd type="none" w="med" len="med"/>
+                      <a:tailEnd type="none" w="med" len="med"/>
+                    </a:lnL>
+                    <a:lnR>
+                      <a:noFill/>
+                    </a:lnR>
+                    <a:lnT>
+                      <a:noFill/>
+                    </a:lnT>
+                    <a:lnB>
+                      <a:noFill/>
+                    </a:lnB>
+                  </a:tcPr>
+                </a:tc>
+                <a:tc>
+                  <a:txBody>
+                    <a:bodyPr/>
+                    <a:lstStyle/>
+                    <a:p>
+                      <a:pPr algn="r" fontAlgn="b"/>
+                      <a:r>
+                        <a:rPr lang="en-US" sz="2300" b="0" i="0" u="none" strike="noStrike">
+                          <a:solidFill>
+                            <a:srgbClr val="000000"/>
+                          </a:solidFill>
+                          <a:effectLst/>
+                          <a:latin typeface="Calibri" panose="020F0502020204030204" pitchFamily="34" charset="0"/>
+                        </a:rPr>
+                        <a:t>10</a:t>
+                      </a:r>
+                    </a:p>
+                  </a:txBody>
+                  <a:tcPr marL="20041" marR="20041" marT="20041" marB="0" anchor="b">
+                    <a:lnL>
+                      <a:noFill/>
+                    </a:lnL>
+                    <a:lnR w="6350" cap="flat" cmpd="sng" algn="ctr">
+                      <a:solidFill>
+                        <a:srgbClr val="000000"/>
+                      </a:solidFill>
+                      <a:prstDash val="solid"/>
+                      <a:round/>
+                      <a:headEnd type="none" w="med" len="med"/>
+                      <a:tailEnd type="none" w="med" len="med"/>
+                    </a:lnR>
+                    <a:lnT>
+                      <a:noFill/>
+                    </a:lnT>
+                    <a:lnB>
+                      <a:noFill/>
+                    </a:lnB>
+                  </a:tcPr>
+                </a:tc>
+                <a:tc>
+                  <a:txBody>
+                    <a:bodyPr/>
+                    <a:lstStyle/>
+                    <a:p>
+                      <a:pPr algn="l" fontAlgn="b"/>
+                      <a:endParaRPr lang="en-US" sz="2300" b="0" i="0" u="none" strike="noStrike">
+                        <a:solidFill>
+                          <a:srgbClr val="000000"/>
+                        </a:solidFill>
+                        <a:effectLst/>
+                        <a:latin typeface="Calibri" panose="020F0502020204030204" pitchFamily="34" charset="0"/>
+                      </a:endParaRPr>
+                    </a:p>
+                  </a:txBody>
+                  <a:tcPr marL="20041" marR="20041" marT="20041" marB="0" anchor="b">
+                    <a:lnL w="6350" cap="flat" cmpd="sng" algn="ctr">
+                      <a:solidFill>
+                        <a:srgbClr val="000000"/>
+                      </a:solidFill>
+                      <a:prstDash val="solid"/>
+                      <a:round/>
+                      <a:headEnd type="none" w="med" len="med"/>
+                      <a:tailEnd type="none" w="med" len="med"/>
+                    </a:lnL>
+                    <a:lnR w="6350" cap="flat" cmpd="sng" algn="ctr">
+                      <a:solidFill>
+                        <a:srgbClr val="000000"/>
+                      </a:solidFill>
+                      <a:prstDash val="solid"/>
+                      <a:round/>
+                      <a:headEnd type="none" w="med" len="med"/>
+                      <a:tailEnd type="none" w="med" len="med"/>
+                    </a:lnR>
+                    <a:lnT>
+                      <a:noFill/>
+                    </a:lnT>
+                    <a:lnB>
+                      <a:noFill/>
+                    </a:lnB>
+                  </a:tcPr>
+                </a:tc>
+                <a:tc>
+                  <a:txBody>
+                    <a:bodyPr/>
+                    <a:lstStyle/>
+                    <a:p>
+                      <a:pPr algn="r" fontAlgn="b"/>
+                      <a:r>
+                        <a:rPr lang="en-US" sz="2300" b="1" i="0" u="none" strike="noStrike">
+                          <a:solidFill>
+                            <a:srgbClr val="000000"/>
+                          </a:solidFill>
+                          <a:effectLst/>
+                          <a:latin typeface="Calibri" panose="020F0502020204030204" pitchFamily="34" charset="0"/>
+                        </a:rPr>
+                        <a:t>5</a:t>
+                      </a:r>
+                    </a:p>
+                  </a:txBody>
+                  <a:tcPr marL="20041" marR="20041" marT="20041" marB="0" anchor="b">
+                    <a:lnL w="6350" cap="flat" cmpd="sng" algn="ctr">
+                      <a:solidFill>
+                        <a:srgbClr val="000000"/>
+                      </a:solidFill>
+                      <a:prstDash val="solid"/>
+                      <a:round/>
+                      <a:headEnd type="none" w="med" len="med"/>
+                      <a:tailEnd type="none" w="med" len="med"/>
+                    </a:lnL>
+                    <a:lnR>
+                      <a:noFill/>
+                    </a:lnR>
+                    <a:lnT>
+                      <a:noFill/>
+                    </a:lnT>
+                    <a:lnB>
+                      <a:noFill/>
+                    </a:lnB>
+                  </a:tcPr>
+                </a:tc>
+                <a:tc>
+                  <a:txBody>
+                    <a:bodyPr/>
+                    <a:lstStyle/>
+                    <a:p>
+                      <a:pPr algn="r" fontAlgn="b"/>
+                      <a:r>
+                        <a:rPr lang="en-US" sz="2300" b="0" i="0" u="none" strike="noStrike">
+                          <a:solidFill>
+                            <a:srgbClr val="000000"/>
+                          </a:solidFill>
+                          <a:effectLst/>
+                          <a:latin typeface="Calibri" panose="020F0502020204030204" pitchFamily="34" charset="0"/>
+                        </a:rPr>
+                        <a:t>10</a:t>
+                      </a:r>
+                    </a:p>
+                  </a:txBody>
+                  <a:tcPr marL="20041" marR="20041" marT="20041" marB="0" anchor="b">
+                    <a:lnL>
+                      <a:noFill/>
+                    </a:lnL>
+                    <a:lnR w="6350" cap="flat" cmpd="sng" algn="ctr">
+                      <a:solidFill>
+                        <a:srgbClr val="000000"/>
+                      </a:solidFill>
+                      <a:prstDash val="solid"/>
+                      <a:round/>
+                      <a:headEnd type="none" w="med" len="med"/>
+                      <a:tailEnd type="none" w="med" len="med"/>
+                    </a:lnR>
+                    <a:lnT>
+                      <a:noFill/>
+                    </a:lnT>
+                    <a:lnB>
+                      <a:noFill/>
+                    </a:lnB>
+                  </a:tcPr>
+                </a:tc>
+                <a:tc>
+                  <a:txBody>
+                    <a:bodyPr/>
+                    <a:lstStyle/>
+                    <a:p>
+                      <a:pPr algn="l" fontAlgn="b"/>
+                      <a:endParaRPr lang="en-US" sz="2300" b="0" i="0" u="none" strike="noStrike">
+                        <a:solidFill>
+                          <a:srgbClr val="000000"/>
+                        </a:solidFill>
+                        <a:effectLst/>
+                        <a:latin typeface="Calibri" panose="020F0502020204030204" pitchFamily="34" charset="0"/>
+                      </a:endParaRPr>
+                    </a:p>
+                  </a:txBody>
+                  <a:tcPr marL="20041" marR="20041" marT="20041" marB="0" anchor="b">
+                    <a:lnL w="6350" cap="flat" cmpd="sng" algn="ctr">
+                      <a:solidFill>
+                        <a:srgbClr val="000000"/>
+                      </a:solidFill>
+                      <a:prstDash val="solid"/>
+                      <a:round/>
+                      <a:headEnd type="none" w="med" len="med"/>
+                      <a:tailEnd type="none" w="med" len="med"/>
+                    </a:lnL>
+                    <a:lnR>
+                      <a:noFill/>
+                    </a:lnR>
+                    <a:lnT>
+                      <a:noFill/>
+                    </a:lnT>
+                    <a:lnB>
+                      <a:noFill/>
+                    </a:lnB>
+                  </a:tcPr>
+                </a:tc>
+              </a:tr>
+              <a:tr h="400818">
+                <a:tc>
+                  <a:txBody>
+                    <a:bodyPr/>
+                    <a:lstStyle/>
+                    <a:p>
+                      <a:pPr algn="r" fontAlgn="b"/>
+                      <a:r>
+                        <a:rPr lang="en-US" sz="2300" b="1" i="0" u="none" strike="noStrike">
+                          <a:solidFill>
+                            <a:srgbClr val="000000"/>
+                          </a:solidFill>
+                          <a:effectLst/>
+                          <a:latin typeface="Calibri" panose="020F0502020204030204" pitchFamily="34" charset="0"/>
+                        </a:rPr>
+                        <a:t>5</a:t>
+                      </a:r>
+                    </a:p>
+                  </a:txBody>
+                  <a:tcPr marL="20041" marR="20041" marT="20041" marB="0" anchor="b">
+                    <a:lnL w="6350" cap="flat" cmpd="sng" algn="ctr">
+                      <a:solidFill>
+                        <a:srgbClr val="000000"/>
+                      </a:solidFill>
+                      <a:prstDash val="solid"/>
+                      <a:round/>
+                      <a:headEnd type="none" w="med" len="med"/>
+                      <a:tailEnd type="none" w="med" len="med"/>
+                    </a:lnL>
+                    <a:lnR>
+                      <a:noFill/>
+                    </a:lnR>
+                    <a:lnT>
+                      <a:noFill/>
+                    </a:lnT>
+                    <a:lnB>
+                      <a:noFill/>
+                    </a:lnB>
+                  </a:tcPr>
+                </a:tc>
+                <a:tc>
+                  <a:txBody>
+                    <a:bodyPr/>
+                    <a:lstStyle/>
+                    <a:p>
+                      <a:pPr algn="r" fontAlgn="b"/>
+                      <a:r>
+                        <a:rPr lang="en-US" sz="2300" b="0" i="0" u="none" strike="noStrike">
+                          <a:solidFill>
+                            <a:srgbClr val="000000"/>
+                          </a:solidFill>
+                          <a:effectLst/>
+                          <a:latin typeface="Calibri" panose="020F0502020204030204" pitchFamily="34" charset="0"/>
+                        </a:rPr>
+                        <a:t>10</a:t>
+                      </a:r>
+                    </a:p>
+                  </a:txBody>
+                  <a:tcPr marL="20041" marR="20041" marT="20041" marB="0" anchor="b">
+                    <a:lnL>
+                      <a:noFill/>
+                    </a:lnL>
+                    <a:lnR w="6350" cap="flat" cmpd="sng" algn="ctr">
+                      <a:solidFill>
+                        <a:srgbClr val="000000"/>
+                      </a:solidFill>
+                      <a:prstDash val="solid"/>
+                      <a:round/>
+                      <a:headEnd type="none" w="med" len="med"/>
+                      <a:tailEnd type="none" w="med" len="med"/>
+                    </a:lnR>
+                    <a:lnT>
+                      <a:noFill/>
+                    </a:lnT>
+                    <a:lnB>
+                      <a:noFill/>
+                    </a:lnB>
+                  </a:tcPr>
+                </a:tc>
+                <a:tc>
+                  <a:txBody>
+                    <a:bodyPr/>
+                    <a:lstStyle/>
+                    <a:p>
+                      <a:pPr algn="l" fontAlgn="b"/>
+                      <a:endParaRPr lang="en-US" sz="2300" b="0" i="0" u="none" strike="noStrike">
+                        <a:solidFill>
+                          <a:srgbClr val="000000"/>
+                        </a:solidFill>
+                        <a:effectLst/>
+                        <a:latin typeface="Calibri" panose="020F0502020204030204" pitchFamily="34" charset="0"/>
+                      </a:endParaRPr>
+                    </a:p>
+                  </a:txBody>
+                  <a:tcPr marL="20041" marR="20041" marT="20041" marB="0" anchor="b">
+                    <a:lnL w="6350" cap="flat" cmpd="sng" algn="ctr">
+                      <a:solidFill>
+                        <a:srgbClr val="000000"/>
+                      </a:solidFill>
+                      <a:prstDash val="solid"/>
+                      <a:round/>
+                      <a:headEnd type="none" w="med" len="med"/>
+                      <a:tailEnd type="none" w="med" len="med"/>
+                    </a:lnL>
+                    <a:lnR w="6350" cap="flat" cmpd="sng" algn="ctr">
+                      <a:solidFill>
+                        <a:srgbClr val="000000"/>
+                      </a:solidFill>
+                      <a:prstDash val="solid"/>
+                      <a:round/>
+                      <a:headEnd type="none" w="med" len="med"/>
+                      <a:tailEnd type="none" w="med" len="med"/>
+                    </a:lnR>
+                    <a:lnT>
+                      <a:noFill/>
+                    </a:lnT>
+                    <a:lnB>
+                      <a:noFill/>
+                    </a:lnB>
+                  </a:tcPr>
+                </a:tc>
+                <a:tc>
+                  <a:txBody>
+                    <a:bodyPr/>
+                    <a:lstStyle/>
+                    <a:p>
+                      <a:pPr algn="r" fontAlgn="b"/>
+                      <a:r>
+                        <a:rPr lang="en-US" sz="2300" b="1" i="0" u="none" strike="noStrike">
+                          <a:solidFill>
+                            <a:srgbClr val="000000"/>
+                          </a:solidFill>
+                          <a:effectLst/>
+                          <a:latin typeface="Calibri" panose="020F0502020204030204" pitchFamily="34" charset="0"/>
+                        </a:rPr>
+                        <a:t>6</a:t>
+                      </a:r>
+                    </a:p>
+                  </a:txBody>
+                  <a:tcPr marL="20041" marR="20041" marT="20041" marB="0" anchor="b">
+                    <a:lnL w="6350" cap="flat" cmpd="sng" algn="ctr">
+                      <a:solidFill>
+                        <a:srgbClr val="000000"/>
+                      </a:solidFill>
+                      <a:prstDash val="solid"/>
+                      <a:round/>
+                      <a:headEnd type="none" w="med" len="med"/>
+                      <a:tailEnd type="none" w="med" len="med"/>
+                    </a:lnL>
+                    <a:lnR>
+                      <a:noFill/>
+                    </a:lnR>
+                    <a:lnT>
+                      <a:noFill/>
+                    </a:lnT>
+                    <a:lnB>
+                      <a:noFill/>
+                    </a:lnB>
+                  </a:tcPr>
+                </a:tc>
+                <a:tc>
+                  <a:txBody>
+                    <a:bodyPr/>
+                    <a:lstStyle/>
+                    <a:p>
+                      <a:pPr algn="r" fontAlgn="b"/>
+                      <a:r>
+                        <a:rPr lang="en-US" sz="2300" b="0" i="0" u="none" strike="noStrike">
+                          <a:solidFill>
+                            <a:srgbClr val="000000"/>
+                          </a:solidFill>
+                          <a:effectLst/>
+                          <a:latin typeface="Calibri" panose="020F0502020204030204" pitchFamily="34" charset="0"/>
+                        </a:rPr>
+                        <a:t>2</a:t>
+                      </a:r>
+                    </a:p>
+                  </a:txBody>
+                  <a:tcPr marL="20041" marR="20041" marT="20041" marB="0" anchor="b">
+                    <a:lnL>
+                      <a:noFill/>
+                    </a:lnL>
+                    <a:lnR w="6350" cap="flat" cmpd="sng" algn="ctr">
+                      <a:solidFill>
+                        <a:srgbClr val="000000"/>
+                      </a:solidFill>
+                      <a:prstDash val="solid"/>
+                      <a:round/>
+                      <a:headEnd type="none" w="med" len="med"/>
+                      <a:tailEnd type="none" w="med" len="med"/>
+                    </a:lnR>
+                    <a:lnT>
+                      <a:noFill/>
+                    </a:lnT>
+                    <a:lnB>
+                      <a:noFill/>
+                    </a:lnB>
+                  </a:tcPr>
+                </a:tc>
+                <a:tc>
+                  <a:txBody>
+                    <a:bodyPr/>
+                    <a:lstStyle/>
+                    <a:p>
+                      <a:pPr algn="l" fontAlgn="b"/>
+                      <a:endParaRPr lang="en-US" sz="2300" b="0" i="0" u="none" strike="noStrike">
+                        <a:solidFill>
+                          <a:srgbClr val="000000"/>
+                        </a:solidFill>
+                        <a:effectLst/>
+                        <a:latin typeface="Calibri" panose="020F0502020204030204" pitchFamily="34" charset="0"/>
+                      </a:endParaRPr>
+                    </a:p>
+                  </a:txBody>
+                  <a:tcPr marL="20041" marR="20041" marT="20041" marB="0" anchor="b">
+                    <a:lnL w="6350" cap="flat" cmpd="sng" algn="ctr">
+                      <a:solidFill>
+                        <a:srgbClr val="000000"/>
+                      </a:solidFill>
+                      <a:prstDash val="solid"/>
+                      <a:round/>
+                      <a:headEnd type="none" w="med" len="med"/>
+                      <a:tailEnd type="none" w="med" len="med"/>
+                    </a:lnL>
+                    <a:lnR w="6350" cap="flat" cmpd="sng" algn="ctr">
+                      <a:solidFill>
+                        <a:srgbClr val="000000"/>
+                      </a:solidFill>
+                      <a:prstDash val="solid"/>
+                      <a:round/>
+                      <a:headEnd type="none" w="med" len="med"/>
+                      <a:tailEnd type="none" w="med" len="med"/>
+                    </a:lnR>
+                    <a:lnT>
+                      <a:noFill/>
+                    </a:lnT>
+                    <a:lnB>
+                      <a:noFill/>
+                    </a:lnB>
+                  </a:tcPr>
+                </a:tc>
+                <a:tc>
+                  <a:txBody>
+                    <a:bodyPr/>
+                    <a:lstStyle/>
+                    <a:p>
+                      <a:pPr algn="r" fontAlgn="b"/>
+                      <a:r>
+                        <a:rPr lang="en-US" sz="2300" b="1" i="0" u="none" strike="noStrike">
+                          <a:solidFill>
+                            <a:srgbClr val="000000"/>
+                          </a:solidFill>
+                          <a:effectLst/>
+                          <a:latin typeface="Calibri" panose="020F0502020204030204" pitchFamily="34" charset="0"/>
+                        </a:rPr>
+                        <a:t>10</a:t>
+                      </a:r>
+                    </a:p>
+                  </a:txBody>
+                  <a:tcPr marL="20041" marR="20041" marT="20041" marB="0" anchor="b">
+                    <a:lnL w="6350" cap="flat" cmpd="sng" algn="ctr">
+                      <a:solidFill>
+                        <a:srgbClr val="000000"/>
+                      </a:solidFill>
+                      <a:prstDash val="solid"/>
+                      <a:round/>
+                      <a:headEnd type="none" w="med" len="med"/>
+                      <a:tailEnd type="none" w="med" len="med"/>
+                    </a:lnL>
+                    <a:lnR>
+                      <a:noFill/>
+                    </a:lnR>
+                    <a:lnT>
+                      <a:noFill/>
+                    </a:lnT>
+                    <a:lnB w="6350" cap="flat" cmpd="sng" algn="ctr">
+                      <a:solidFill>
+                        <a:srgbClr val="000000"/>
+                      </a:solidFill>
+                      <a:prstDash val="solid"/>
+                      <a:round/>
+                      <a:headEnd type="none" w="med" len="med"/>
+                      <a:tailEnd type="none" w="med" len="med"/>
+                    </a:lnB>
+                  </a:tcPr>
+                </a:tc>
+                <a:tc>
+                  <a:txBody>
+                    <a:bodyPr/>
+                    <a:lstStyle/>
+                    <a:p>
+                      <a:pPr algn="r" fontAlgn="b"/>
+                      <a:r>
+                        <a:rPr lang="en-US" sz="2300" b="0" i="0" u="none" strike="noStrike">
+                          <a:solidFill>
+                            <a:srgbClr val="000000"/>
+                          </a:solidFill>
+                          <a:effectLst/>
+                          <a:latin typeface="Calibri" panose="020F0502020204030204" pitchFamily="34" charset="0"/>
+                        </a:rPr>
+                        <a:t>1</a:t>
+                      </a:r>
+                    </a:p>
+                  </a:txBody>
+                  <a:tcPr marL="20041" marR="20041" marT="20041" marB="0" anchor="b">
+                    <a:lnL>
+                      <a:noFill/>
+                    </a:lnL>
+                    <a:lnR w="6350" cap="flat" cmpd="sng" algn="ctr">
+                      <a:solidFill>
+                        <a:srgbClr val="000000"/>
+                      </a:solidFill>
+                      <a:prstDash val="solid"/>
+                      <a:round/>
+                      <a:headEnd type="none" w="med" len="med"/>
+                      <a:tailEnd type="none" w="med" len="med"/>
+                    </a:lnR>
+                    <a:lnT>
+                      <a:noFill/>
+                    </a:lnT>
+                    <a:lnB w="6350" cap="flat" cmpd="sng" algn="ctr">
+                      <a:solidFill>
+                        <a:srgbClr val="000000"/>
+                      </a:solidFill>
+                      <a:prstDash val="solid"/>
+                      <a:round/>
+                      <a:headEnd type="none" w="med" len="med"/>
+                      <a:tailEnd type="none" w="med" len="med"/>
+                    </a:lnB>
+                  </a:tcPr>
+                </a:tc>
+                <a:tc>
+                  <a:txBody>
+                    <a:bodyPr/>
+                    <a:lstStyle/>
+                    <a:p>
+                      <a:pPr algn="l" fontAlgn="b"/>
+                      <a:endParaRPr lang="en-US" sz="2300" b="0" i="0" u="none" strike="noStrike">
+                        <a:solidFill>
+                          <a:srgbClr val="000000"/>
+                        </a:solidFill>
+                        <a:effectLst/>
+                        <a:latin typeface="Calibri" panose="020F0502020204030204" pitchFamily="34" charset="0"/>
+                      </a:endParaRPr>
+                    </a:p>
+                  </a:txBody>
+                  <a:tcPr marL="20041" marR="20041" marT="20041" marB="0" anchor="b">
+                    <a:lnL w="6350" cap="flat" cmpd="sng" algn="ctr">
+                      <a:solidFill>
+                        <a:srgbClr val="000000"/>
+                      </a:solidFill>
+                      <a:prstDash val="solid"/>
+                      <a:round/>
+                      <a:headEnd type="none" w="med" len="med"/>
+                      <a:tailEnd type="none" w="med" len="med"/>
+                    </a:lnL>
+                    <a:lnR w="6350" cap="flat" cmpd="sng" algn="ctr">
+                      <a:solidFill>
+                        <a:srgbClr val="000000"/>
+                      </a:solidFill>
+                      <a:prstDash val="solid"/>
+                      <a:round/>
+                      <a:headEnd type="none" w="med" len="med"/>
+                      <a:tailEnd type="none" w="med" len="med"/>
+                    </a:lnR>
+                    <a:lnT>
+                      <a:noFill/>
+                    </a:lnT>
+                    <a:lnB>
+                      <a:noFill/>
+                    </a:lnB>
+                  </a:tcPr>
+                </a:tc>
+                <a:tc>
+                  <a:txBody>
+                    <a:bodyPr/>
+                    <a:lstStyle/>
+                    <a:p>
+                      <a:pPr algn="r" fontAlgn="b"/>
+                      <a:r>
+                        <a:rPr lang="en-US" sz="2300" b="1" i="0" u="none" strike="noStrike">
+                          <a:solidFill>
+                            <a:srgbClr val="000000"/>
+                          </a:solidFill>
+                          <a:effectLst/>
+                          <a:latin typeface="Calibri" panose="020F0502020204030204" pitchFamily="34" charset="0"/>
+                        </a:rPr>
+                        <a:t>6</a:t>
+                      </a:r>
+                    </a:p>
+                  </a:txBody>
+                  <a:tcPr marL="20041" marR="20041" marT="20041" marB="0" anchor="b">
+                    <a:lnL w="6350" cap="flat" cmpd="sng" algn="ctr">
+                      <a:solidFill>
+                        <a:srgbClr val="000000"/>
+                      </a:solidFill>
+                      <a:prstDash val="solid"/>
+                      <a:round/>
+                      <a:headEnd type="none" w="med" len="med"/>
+                      <a:tailEnd type="none" w="med" len="med"/>
+                    </a:lnL>
+                    <a:lnR>
+                      <a:noFill/>
+                    </a:lnR>
+                    <a:lnT>
+                      <a:noFill/>
+                    </a:lnT>
+                    <a:lnB>
+                      <a:noFill/>
+                    </a:lnB>
+                  </a:tcPr>
+                </a:tc>
+                <a:tc>
+                  <a:txBody>
+                    <a:bodyPr/>
+                    <a:lstStyle/>
+                    <a:p>
+                      <a:pPr algn="r" fontAlgn="b"/>
+                      <a:r>
+                        <a:rPr lang="en-US" sz="2300" b="0" i="0" u="none" strike="noStrike">
+                          <a:solidFill>
+                            <a:srgbClr val="000000"/>
+                          </a:solidFill>
+                          <a:effectLst/>
+                          <a:latin typeface="Calibri" panose="020F0502020204030204" pitchFamily="34" charset="0"/>
+                        </a:rPr>
+                        <a:t>2</a:t>
+                      </a:r>
+                    </a:p>
+                  </a:txBody>
+                  <a:tcPr marL="20041" marR="20041" marT="20041" marB="0" anchor="b">
+                    <a:lnL>
+                      <a:noFill/>
+                    </a:lnL>
+                    <a:lnR w="6350" cap="flat" cmpd="sng" algn="ctr">
+                      <a:solidFill>
+                        <a:srgbClr val="000000"/>
+                      </a:solidFill>
+                      <a:prstDash val="solid"/>
+                      <a:round/>
+                      <a:headEnd type="none" w="med" len="med"/>
+                      <a:tailEnd type="none" w="med" len="med"/>
+                    </a:lnR>
+                    <a:lnT>
+                      <a:noFill/>
+                    </a:lnT>
+                    <a:lnB>
+                      <a:noFill/>
+                    </a:lnB>
+                  </a:tcPr>
+                </a:tc>
+                <a:tc>
+                  <a:txBody>
+                    <a:bodyPr/>
+                    <a:lstStyle/>
+                    <a:p>
+                      <a:pPr algn="l" fontAlgn="b"/>
+                      <a:endParaRPr lang="en-US" sz="2300" b="0" i="0" u="none" strike="noStrike">
+                        <a:solidFill>
+                          <a:srgbClr val="000000"/>
+                        </a:solidFill>
+                        <a:effectLst/>
+                        <a:latin typeface="Calibri" panose="020F0502020204030204" pitchFamily="34" charset="0"/>
+                      </a:endParaRPr>
+                    </a:p>
+                  </a:txBody>
+                  <a:tcPr marL="20041" marR="20041" marT="20041" marB="0" anchor="b">
+                    <a:lnL w="6350" cap="flat" cmpd="sng" algn="ctr">
+                      <a:solidFill>
+                        <a:srgbClr val="000000"/>
+                      </a:solidFill>
+                      <a:prstDash val="solid"/>
+                      <a:round/>
+                      <a:headEnd type="none" w="med" len="med"/>
+                      <a:tailEnd type="none" w="med" len="med"/>
+                    </a:lnL>
+                    <a:lnR>
+                      <a:noFill/>
+                    </a:lnR>
+                    <a:lnT>
+                      <a:noFill/>
+                    </a:lnT>
+                    <a:lnB>
+                      <a:noFill/>
+                    </a:lnB>
+                  </a:tcPr>
+                </a:tc>
+              </a:tr>
+              <a:tr h="400818">
+                <a:tc>
+                  <a:txBody>
+                    <a:bodyPr/>
+                    <a:lstStyle/>
+                    <a:p>
+                      <a:pPr algn="r" fontAlgn="b"/>
+                      <a:r>
+                        <a:rPr lang="en-US" sz="2300" b="1" i="0" u="none" strike="noStrike">
+                          <a:solidFill>
+                            <a:srgbClr val="000000"/>
+                          </a:solidFill>
+                          <a:effectLst/>
+                          <a:latin typeface="Calibri" panose="020F0502020204030204" pitchFamily="34" charset="0"/>
+                        </a:rPr>
+                        <a:t>9</a:t>
+                      </a:r>
+                    </a:p>
+                  </a:txBody>
+                  <a:tcPr marL="20041" marR="20041" marT="20041" marB="0" anchor="b">
+                    <a:lnL w="6350" cap="flat" cmpd="sng" algn="ctr">
+                      <a:solidFill>
+                        <a:srgbClr val="000000"/>
+                      </a:solidFill>
+                      <a:prstDash val="solid"/>
+                      <a:round/>
+                      <a:headEnd type="none" w="med" len="med"/>
+                      <a:tailEnd type="none" w="med" len="med"/>
+                    </a:lnL>
+                    <a:lnR>
+                      <a:noFill/>
+                    </a:lnR>
+                    <a:lnT>
+                      <a:noFill/>
+                    </a:lnT>
+                    <a:lnB>
+                      <a:noFill/>
+                    </a:lnB>
+                  </a:tcPr>
+                </a:tc>
+                <a:tc>
+                  <a:txBody>
+                    <a:bodyPr/>
+                    <a:lstStyle/>
+                    <a:p>
+                      <a:pPr algn="r" fontAlgn="b"/>
+                      <a:r>
+                        <a:rPr lang="en-US" sz="2300" b="0" i="0" u="none" strike="noStrike">
+                          <a:solidFill>
+                            <a:srgbClr val="000000"/>
+                          </a:solidFill>
+                          <a:effectLst/>
+                          <a:latin typeface="Calibri" panose="020F0502020204030204" pitchFamily="34" charset="0"/>
+                        </a:rPr>
+                        <a:t>4</a:t>
+                      </a:r>
+                    </a:p>
+                  </a:txBody>
+                  <a:tcPr marL="20041" marR="20041" marT="20041" marB="0" anchor="b">
+                    <a:lnL>
+                      <a:noFill/>
+                    </a:lnL>
+                    <a:lnR w="6350" cap="flat" cmpd="sng" algn="ctr">
+                      <a:solidFill>
+                        <a:srgbClr val="000000"/>
+                      </a:solidFill>
+                      <a:prstDash val="solid"/>
+                      <a:round/>
+                      <a:headEnd type="none" w="med" len="med"/>
+                      <a:tailEnd type="none" w="med" len="med"/>
+                    </a:lnR>
+                    <a:lnT>
+                      <a:noFill/>
+                    </a:lnT>
+                    <a:lnB>
+                      <a:noFill/>
+                    </a:lnB>
+                  </a:tcPr>
+                </a:tc>
+                <a:tc>
+                  <a:txBody>
+                    <a:bodyPr/>
+                    <a:lstStyle/>
+                    <a:p>
+                      <a:pPr algn="l" fontAlgn="b"/>
+                      <a:endParaRPr lang="en-US" sz="2300" b="0" i="0" u="none" strike="noStrike">
+                        <a:solidFill>
+                          <a:srgbClr val="000000"/>
+                        </a:solidFill>
+                        <a:effectLst/>
+                        <a:latin typeface="Calibri" panose="020F0502020204030204" pitchFamily="34" charset="0"/>
+                      </a:endParaRPr>
+                    </a:p>
+                  </a:txBody>
+                  <a:tcPr marL="20041" marR="20041" marT="20041" marB="0" anchor="b">
+                    <a:lnL w="6350" cap="flat" cmpd="sng" algn="ctr">
+                      <a:solidFill>
+                        <a:srgbClr val="000000"/>
+                      </a:solidFill>
+                      <a:prstDash val="solid"/>
+                      <a:round/>
+                      <a:headEnd type="none" w="med" len="med"/>
+                      <a:tailEnd type="none" w="med" len="med"/>
+                    </a:lnL>
+                    <a:lnR w="6350" cap="flat" cmpd="sng" algn="ctr">
+                      <a:solidFill>
+                        <a:srgbClr val="000000"/>
+                      </a:solidFill>
+                      <a:prstDash val="solid"/>
+                      <a:round/>
+                      <a:headEnd type="none" w="med" len="med"/>
+                      <a:tailEnd type="none" w="med" len="med"/>
+                    </a:lnR>
+                    <a:lnT>
+                      <a:noFill/>
+                    </a:lnT>
+                    <a:lnB>
+                      <a:noFill/>
+                    </a:lnB>
+                  </a:tcPr>
+                </a:tc>
+                <a:tc>
+                  <a:txBody>
+                    <a:bodyPr/>
+                    <a:lstStyle/>
+                    <a:p>
+                      <a:pPr algn="r" fontAlgn="b"/>
+                      <a:r>
+                        <a:rPr lang="en-US" sz="2300" b="1" i="0" u="none" strike="noStrike">
+                          <a:solidFill>
+                            <a:srgbClr val="000000"/>
+                          </a:solidFill>
+                          <a:effectLst/>
+                          <a:latin typeface="Calibri" panose="020F0502020204030204" pitchFamily="34" charset="0"/>
+                        </a:rPr>
+                        <a:t>7</a:t>
+                      </a:r>
+                    </a:p>
+                  </a:txBody>
+                  <a:tcPr marL="20041" marR="20041" marT="20041" marB="0" anchor="b">
+                    <a:lnL w="6350" cap="flat" cmpd="sng" algn="ctr">
+                      <a:solidFill>
+                        <a:srgbClr val="000000"/>
+                      </a:solidFill>
+                      <a:prstDash val="solid"/>
+                      <a:round/>
+                      <a:headEnd type="none" w="med" len="med"/>
+                      <a:tailEnd type="none" w="med" len="med"/>
+                    </a:lnL>
+                    <a:lnR>
+                      <a:noFill/>
+                    </a:lnR>
+                    <a:lnT>
+                      <a:noFill/>
+                    </a:lnT>
+                    <a:lnB>
+                      <a:noFill/>
+                    </a:lnB>
+                  </a:tcPr>
+                </a:tc>
+                <a:tc>
+                  <a:txBody>
+                    <a:bodyPr/>
+                    <a:lstStyle/>
+                    <a:p>
+                      <a:pPr algn="r" fontAlgn="b"/>
+                      <a:r>
+                        <a:rPr lang="en-US" sz="2300" b="0" i="0" u="none" strike="noStrike">
+                          <a:solidFill>
+                            <a:srgbClr val="000000"/>
+                          </a:solidFill>
+                          <a:effectLst/>
+                          <a:latin typeface="Calibri" panose="020F0502020204030204" pitchFamily="34" charset="0"/>
+                        </a:rPr>
+                        <a:t>7</a:t>
+                      </a:r>
+                    </a:p>
+                  </a:txBody>
+                  <a:tcPr marL="20041" marR="20041" marT="20041" marB="0" anchor="b">
+                    <a:lnL>
+                      <a:noFill/>
+                    </a:lnL>
+                    <a:lnR w="6350" cap="flat" cmpd="sng" algn="ctr">
+                      <a:solidFill>
+                        <a:srgbClr val="000000"/>
+                      </a:solidFill>
+                      <a:prstDash val="solid"/>
+                      <a:round/>
+                      <a:headEnd type="none" w="med" len="med"/>
+                      <a:tailEnd type="none" w="med" len="med"/>
+                    </a:lnR>
+                    <a:lnT>
+                      <a:noFill/>
+                    </a:lnT>
+                    <a:lnB>
+                      <a:noFill/>
+                    </a:lnB>
+                  </a:tcPr>
+                </a:tc>
+                <a:tc>
+                  <a:txBody>
+                    <a:bodyPr/>
+                    <a:lstStyle/>
+                    <a:p>
+                      <a:pPr algn="l" fontAlgn="b"/>
+                      <a:endParaRPr lang="en-US" sz="2300" b="0" i="0" u="none" strike="noStrike">
+                        <a:solidFill>
+                          <a:srgbClr val="000000"/>
+                        </a:solidFill>
+                        <a:effectLst/>
+                        <a:latin typeface="Calibri" panose="020F0502020204030204" pitchFamily="34" charset="0"/>
+                      </a:endParaRPr>
+                    </a:p>
+                  </a:txBody>
+                  <a:tcPr marL="20041" marR="20041" marT="20041" marB="0" anchor="b">
+                    <a:lnL w="6350" cap="flat" cmpd="sng" algn="ctr">
+                      <a:solidFill>
+                        <a:srgbClr val="000000"/>
+                      </a:solidFill>
+                      <a:prstDash val="solid"/>
+                      <a:round/>
+                      <a:headEnd type="none" w="med" len="med"/>
+                      <a:tailEnd type="none" w="med" len="med"/>
+                    </a:lnL>
+                    <a:lnR>
+                      <a:noFill/>
+                    </a:lnR>
+                    <a:lnT>
+                      <a:noFill/>
+                    </a:lnT>
+                    <a:lnB>
+                      <a:noFill/>
+                    </a:lnB>
+                  </a:tcPr>
+                </a:tc>
+                <a:tc>
+                  <a:txBody>
+                    <a:bodyPr/>
+                    <a:lstStyle/>
+                    <a:p>
+                      <a:pPr algn="l" fontAlgn="b"/>
+                      <a:endParaRPr lang="en-US" sz="2300" b="1" i="0" u="none" strike="noStrike">
+                        <a:solidFill>
+                          <a:srgbClr val="000000"/>
+                        </a:solidFill>
+                        <a:effectLst/>
+                        <a:latin typeface="Calibri" panose="020F0502020204030204" pitchFamily="34" charset="0"/>
+                      </a:endParaRPr>
+                    </a:p>
+                  </a:txBody>
+                  <a:tcPr marL="20041" marR="20041" marT="20041" marB="0" anchor="b">
+                    <a:lnL>
+                      <a:noFill/>
+                    </a:lnL>
+                    <a:lnR>
+                      <a:noFill/>
+                    </a:lnR>
+                    <a:lnT w="6350" cap="flat" cmpd="sng" algn="ctr">
+                      <a:solidFill>
+                        <a:srgbClr val="000000"/>
+                      </a:solidFill>
+                      <a:prstDash val="solid"/>
+                      <a:round/>
+                      <a:headEnd type="none" w="med" len="med"/>
+                      <a:tailEnd type="none" w="med" len="med"/>
+                    </a:lnT>
+                    <a:lnB>
+                      <a:noFill/>
+                    </a:lnB>
+                  </a:tcPr>
+                </a:tc>
+                <a:tc>
+                  <a:txBody>
+                    <a:bodyPr/>
+                    <a:lstStyle/>
+                    <a:p>
+                      <a:pPr algn="l" fontAlgn="b"/>
+                      <a:endParaRPr lang="en-US" sz="2300" b="0" i="0" u="none" strike="noStrike">
+                        <a:solidFill>
+                          <a:srgbClr val="000000"/>
+                        </a:solidFill>
+                        <a:effectLst/>
+                        <a:latin typeface="Calibri" panose="020F0502020204030204" pitchFamily="34" charset="0"/>
+                      </a:endParaRPr>
+                    </a:p>
+                  </a:txBody>
+                  <a:tcPr marL="20041" marR="20041" marT="20041" marB="0" anchor="b">
+                    <a:lnL>
+                      <a:noFill/>
+                    </a:lnL>
+                    <a:lnR>
+                      <a:noFill/>
+                    </a:lnR>
+                    <a:lnT w="6350" cap="flat" cmpd="sng" algn="ctr">
+                      <a:solidFill>
+                        <a:srgbClr val="000000"/>
+                      </a:solidFill>
+                      <a:prstDash val="solid"/>
+                      <a:round/>
+                      <a:headEnd type="none" w="med" len="med"/>
+                      <a:tailEnd type="none" w="med" len="med"/>
+                    </a:lnT>
+                    <a:lnB>
+                      <a:noFill/>
+                    </a:lnB>
+                  </a:tcPr>
+                </a:tc>
+                <a:tc>
+                  <a:txBody>
+                    <a:bodyPr/>
+                    <a:lstStyle/>
+                    <a:p>
+                      <a:pPr algn="l" fontAlgn="b"/>
+                      <a:endParaRPr lang="en-US" sz="2300" b="0" i="0" u="none" strike="noStrike">
+                        <a:solidFill>
+                          <a:srgbClr val="000000"/>
+                        </a:solidFill>
+                        <a:effectLst/>
+                        <a:latin typeface="Calibri" panose="020F0502020204030204" pitchFamily="34" charset="0"/>
+                      </a:endParaRPr>
+                    </a:p>
+                  </a:txBody>
+                  <a:tcPr marL="20041" marR="20041" marT="20041" marB="0" anchor="b">
+                    <a:lnL>
+                      <a:noFill/>
+                    </a:lnL>
+                    <a:lnR w="6350" cap="flat" cmpd="sng" algn="ctr">
+                      <a:solidFill>
+                        <a:srgbClr val="000000"/>
+                      </a:solidFill>
+                      <a:prstDash val="solid"/>
+                      <a:round/>
+                      <a:headEnd type="none" w="med" len="med"/>
+                      <a:tailEnd type="none" w="med" len="med"/>
+                    </a:lnR>
+                    <a:lnT>
+                      <a:noFill/>
+                    </a:lnT>
+                    <a:lnB>
+                      <a:noFill/>
+                    </a:lnB>
+                  </a:tcPr>
+                </a:tc>
+                <a:tc>
+                  <a:txBody>
+                    <a:bodyPr/>
+                    <a:lstStyle/>
+                    <a:p>
+                      <a:pPr algn="r" fontAlgn="b"/>
+                      <a:r>
+                        <a:rPr lang="en-US" sz="2300" b="1" i="0" u="none" strike="noStrike">
+                          <a:solidFill>
+                            <a:srgbClr val="000000"/>
+                          </a:solidFill>
+                          <a:effectLst/>
+                          <a:latin typeface="Calibri" panose="020F0502020204030204" pitchFamily="34" charset="0"/>
+                        </a:rPr>
+                        <a:t>12</a:t>
+                      </a:r>
+                    </a:p>
+                  </a:txBody>
+                  <a:tcPr marL="20041" marR="20041" marT="20041" marB="0" anchor="b">
+                    <a:lnL w="6350" cap="flat" cmpd="sng" algn="ctr">
+                      <a:solidFill>
+                        <a:srgbClr val="000000"/>
+                      </a:solidFill>
+                      <a:prstDash val="solid"/>
+                      <a:round/>
+                      <a:headEnd type="none" w="med" len="med"/>
+                      <a:tailEnd type="none" w="med" len="med"/>
+                    </a:lnL>
+                    <a:lnR>
+                      <a:noFill/>
+                    </a:lnR>
+                    <a:lnT>
+                      <a:noFill/>
+                    </a:lnT>
+                    <a:lnB>
+                      <a:noFill/>
+                    </a:lnB>
+                  </a:tcPr>
+                </a:tc>
+                <a:tc>
+                  <a:txBody>
+                    <a:bodyPr/>
+                    <a:lstStyle/>
+                    <a:p>
+                      <a:pPr algn="r" fontAlgn="b"/>
+                      <a:r>
+                        <a:rPr lang="en-US" sz="2300" b="0" i="0" u="none" strike="noStrike">
+                          <a:solidFill>
+                            <a:srgbClr val="000000"/>
+                          </a:solidFill>
+                          <a:effectLst/>
+                          <a:latin typeface="Calibri" panose="020F0502020204030204" pitchFamily="34" charset="0"/>
+                        </a:rPr>
+                        <a:t>5</a:t>
+                      </a:r>
+                    </a:p>
+                  </a:txBody>
+                  <a:tcPr marL="20041" marR="20041" marT="20041" marB="0" anchor="b">
+                    <a:lnL>
+                      <a:noFill/>
+                    </a:lnL>
+                    <a:lnR w="6350" cap="flat" cmpd="sng" algn="ctr">
+                      <a:solidFill>
+                        <a:srgbClr val="000000"/>
+                      </a:solidFill>
+                      <a:prstDash val="solid"/>
+                      <a:round/>
+                      <a:headEnd type="none" w="med" len="med"/>
+                      <a:tailEnd type="none" w="med" len="med"/>
+                    </a:lnR>
+                    <a:lnT>
+                      <a:noFill/>
+                    </a:lnT>
+                    <a:lnB>
+                      <a:noFill/>
+                    </a:lnB>
+                  </a:tcPr>
+                </a:tc>
+                <a:tc>
+                  <a:txBody>
+                    <a:bodyPr/>
+                    <a:lstStyle/>
+                    <a:p>
+                      <a:pPr algn="l" fontAlgn="b"/>
+                      <a:endParaRPr lang="en-US" sz="2300" b="0" i="0" u="none" strike="noStrike">
+                        <a:solidFill>
+                          <a:srgbClr val="000000"/>
+                        </a:solidFill>
+                        <a:effectLst/>
+                        <a:latin typeface="Calibri" panose="020F0502020204030204" pitchFamily="34" charset="0"/>
+                      </a:endParaRPr>
+                    </a:p>
+                  </a:txBody>
+                  <a:tcPr marL="20041" marR="20041" marT="20041" marB="0" anchor="b">
+                    <a:lnL w="6350" cap="flat" cmpd="sng" algn="ctr">
+                      <a:solidFill>
+                        <a:srgbClr val="000000"/>
+                      </a:solidFill>
+                      <a:prstDash val="solid"/>
+                      <a:round/>
+                      <a:headEnd type="none" w="med" len="med"/>
+                      <a:tailEnd type="none" w="med" len="med"/>
+                    </a:lnL>
+                    <a:lnR>
+                      <a:noFill/>
+                    </a:lnR>
+                    <a:lnT>
+                      <a:noFill/>
+                    </a:lnT>
+                    <a:lnB>
+                      <a:noFill/>
+                    </a:lnB>
+                  </a:tcPr>
+                </a:tc>
+              </a:tr>
+              <a:tr h="400818">
+                <a:tc>
+                  <a:txBody>
+                    <a:bodyPr/>
+                    <a:lstStyle/>
+                    <a:p>
+                      <a:pPr algn="r" fontAlgn="b"/>
+                      <a:r>
+                        <a:rPr lang="en-US" sz="2300" b="1" i="0" u="none" strike="noStrike">
+                          <a:solidFill>
+                            <a:srgbClr val="000000"/>
+                          </a:solidFill>
+                          <a:effectLst/>
+                          <a:latin typeface="Calibri" panose="020F0502020204030204" pitchFamily="34" charset="0"/>
+                        </a:rPr>
+                        <a:t>11</a:t>
+                      </a:r>
+                    </a:p>
+                  </a:txBody>
+                  <a:tcPr marL="20041" marR="20041" marT="20041" marB="0" anchor="b">
+                    <a:lnL w="6350" cap="flat" cmpd="sng" algn="ctr">
+                      <a:solidFill>
+                        <a:srgbClr val="000000"/>
+                      </a:solidFill>
+                      <a:prstDash val="solid"/>
+                      <a:round/>
+                      <a:headEnd type="none" w="med" len="med"/>
+                      <a:tailEnd type="none" w="med" len="med"/>
+                    </a:lnL>
+                    <a:lnR>
+                      <a:noFill/>
+                    </a:lnR>
+                    <a:lnT>
+                      <a:noFill/>
+                    </a:lnT>
+                    <a:lnB>
+                      <a:noFill/>
+                    </a:lnB>
+                  </a:tcPr>
+                </a:tc>
+                <a:tc>
+                  <a:txBody>
+                    <a:bodyPr/>
+                    <a:lstStyle/>
+                    <a:p>
+                      <a:pPr algn="r" fontAlgn="b"/>
+                      <a:r>
+                        <a:rPr lang="en-US" sz="2300" b="0" i="0" u="none" strike="noStrike">
+                          <a:solidFill>
+                            <a:srgbClr val="000000"/>
+                          </a:solidFill>
+                          <a:effectLst/>
+                          <a:latin typeface="Calibri" panose="020F0502020204030204" pitchFamily="34" charset="0"/>
+                        </a:rPr>
+                        <a:t>3</a:t>
+                      </a:r>
+                    </a:p>
+                  </a:txBody>
+                  <a:tcPr marL="20041" marR="20041" marT="20041" marB="0" anchor="b">
+                    <a:lnL>
+                      <a:noFill/>
+                    </a:lnL>
+                    <a:lnR w="6350" cap="flat" cmpd="sng" algn="ctr">
+                      <a:solidFill>
+                        <a:srgbClr val="000000"/>
+                      </a:solidFill>
+                      <a:prstDash val="solid"/>
+                      <a:round/>
+                      <a:headEnd type="none" w="med" len="med"/>
+                      <a:tailEnd type="none" w="med" len="med"/>
+                    </a:lnR>
+                    <a:lnT>
+                      <a:noFill/>
+                    </a:lnT>
+                    <a:lnB>
+                      <a:noFill/>
+                    </a:lnB>
+                  </a:tcPr>
+                </a:tc>
+                <a:tc>
+                  <a:txBody>
+                    <a:bodyPr/>
+                    <a:lstStyle/>
+                    <a:p>
+                      <a:pPr algn="l" fontAlgn="b"/>
+                      <a:endParaRPr lang="en-US" sz="2300" b="0" i="0" u="none" strike="noStrike">
+                        <a:solidFill>
+                          <a:srgbClr val="000000"/>
+                        </a:solidFill>
+                        <a:effectLst/>
+                        <a:latin typeface="Calibri" panose="020F0502020204030204" pitchFamily="34" charset="0"/>
+                      </a:endParaRPr>
+                    </a:p>
+                  </a:txBody>
+                  <a:tcPr marL="20041" marR="20041" marT="20041" marB="0" anchor="b">
+                    <a:lnL w="6350" cap="flat" cmpd="sng" algn="ctr">
+                      <a:solidFill>
+                        <a:srgbClr val="000000"/>
+                      </a:solidFill>
+                      <a:prstDash val="solid"/>
+                      <a:round/>
+                      <a:headEnd type="none" w="med" len="med"/>
+                      <a:tailEnd type="none" w="med" len="med"/>
+                    </a:lnL>
+                    <a:lnR w="6350" cap="flat" cmpd="sng" algn="ctr">
+                      <a:solidFill>
+                        <a:srgbClr val="000000"/>
+                      </a:solidFill>
+                      <a:prstDash val="solid"/>
+                      <a:round/>
+                      <a:headEnd type="none" w="med" len="med"/>
+                      <a:tailEnd type="none" w="med" len="med"/>
+                    </a:lnR>
+                    <a:lnT>
+                      <a:noFill/>
+                    </a:lnT>
+                    <a:lnB>
+                      <a:noFill/>
+                    </a:lnB>
+                  </a:tcPr>
+                </a:tc>
+                <a:tc gridSpan="2">
+                  <a:txBody>
+                    <a:bodyPr/>
+                    <a:lstStyle/>
+                    <a:p>
+                      <a:pPr algn="ctr" fontAlgn="b"/>
+                      <a:r>
+                        <a:rPr lang="en-US" sz="2300" b="0" i="0" u="none" strike="noStrike">
+                          <a:solidFill>
+                            <a:srgbClr val="000000"/>
+                          </a:solidFill>
+                          <a:effectLst/>
+                          <a:latin typeface="Calibri" panose="020F0502020204030204" pitchFamily="34" charset="0"/>
+                        </a:rPr>
+                        <a:t>…</a:t>
+                      </a:r>
+                    </a:p>
+                  </a:txBody>
+                  <a:tcPr marL="20041" marR="20041" marT="20041" marB="0" anchor="b">
+                    <a:lnL w="6350" cap="flat" cmpd="sng" algn="ctr">
+                      <a:solidFill>
+                        <a:srgbClr val="000000"/>
+                      </a:solidFill>
+                      <a:prstDash val="solid"/>
+                      <a:round/>
+                      <a:headEnd type="none" w="med" len="med"/>
+                      <a:tailEnd type="none" w="med" len="med"/>
+                    </a:lnL>
+                    <a:lnR w="6350" cap="flat" cmpd="sng" algn="ctr">
+                      <a:solidFill>
+                        <a:srgbClr val="000000"/>
+                      </a:solidFill>
+                      <a:prstDash val="solid"/>
+                      <a:round/>
+                      <a:headEnd type="none" w="med" len="med"/>
+                      <a:tailEnd type="none" w="med" len="med"/>
+                    </a:lnR>
+                    <a:lnT>
+                      <a:noFill/>
+                    </a:lnT>
+                    <a:lnB>
+                      <a:noFill/>
+                    </a:lnB>
+                  </a:tcPr>
+                </a:tc>
+                <a:tc hMerge="1">
+                  <a:txBody>
+                    <a:bodyPr/>
+                    <a:lstStyle/>
+                    <a:p>
+                      <a:endParaRPr lang="en-US"/>
+                    </a:p>
+                  </a:txBody>
+                  <a:tcPr/>
+                </a:tc>
+                <a:tc>
+                  <a:txBody>
+                    <a:bodyPr/>
+                    <a:lstStyle/>
+                    <a:p>
+                      <a:pPr algn="l" fontAlgn="b"/>
+                      <a:endParaRPr lang="en-US" sz="2300" b="0" i="0" u="none" strike="noStrike">
+                        <a:solidFill>
+                          <a:srgbClr val="000000"/>
+                        </a:solidFill>
+                        <a:effectLst/>
+                        <a:latin typeface="Calibri" panose="020F0502020204030204" pitchFamily="34" charset="0"/>
+                      </a:endParaRPr>
+                    </a:p>
+                  </a:txBody>
+                  <a:tcPr marL="20041" marR="20041" marT="20041" marB="0" anchor="b">
+                    <a:lnL w="6350" cap="flat" cmpd="sng" algn="ctr">
+                      <a:solidFill>
+                        <a:srgbClr val="000000"/>
+                      </a:solidFill>
+                      <a:prstDash val="solid"/>
+                      <a:round/>
+                      <a:headEnd type="none" w="med" len="med"/>
+                      <a:tailEnd type="none" w="med" len="med"/>
+                    </a:lnL>
+                    <a:lnR>
+                      <a:noFill/>
+                    </a:lnR>
+                    <a:lnT>
+                      <a:noFill/>
+                    </a:lnT>
+                    <a:lnB>
+                      <a:noFill/>
+                    </a:lnB>
+                  </a:tcPr>
+                </a:tc>
+                <a:tc>
+                  <a:txBody>
+                    <a:bodyPr/>
+                    <a:lstStyle/>
+                    <a:p>
+                      <a:pPr algn="l" fontAlgn="b"/>
+                      <a:endParaRPr lang="en-US" sz="2300" b="0" i="0" u="none" strike="noStrike">
+                        <a:solidFill>
+                          <a:srgbClr val="000000"/>
+                        </a:solidFill>
+                        <a:effectLst/>
+                        <a:latin typeface="Calibri" panose="020F0502020204030204" pitchFamily="34" charset="0"/>
+                      </a:endParaRPr>
+                    </a:p>
+                  </a:txBody>
+                  <a:tcPr marL="20041" marR="20041" marT="20041" marB="0" anchor="b">
+                    <a:lnL>
+                      <a:noFill/>
+                    </a:lnL>
+                    <a:lnR>
+                      <a:noFill/>
+                    </a:lnR>
+                    <a:lnT>
+                      <a:noFill/>
+                    </a:lnT>
+                    <a:lnB>
+                      <a:noFill/>
+                    </a:lnB>
+                  </a:tcPr>
+                </a:tc>
+                <a:tc>
+                  <a:txBody>
+                    <a:bodyPr/>
+                    <a:lstStyle/>
+                    <a:p>
+                      <a:pPr algn="l" fontAlgn="b"/>
+                      <a:endParaRPr lang="en-US" sz="2300" b="0" i="0" u="none" strike="noStrike">
+                        <a:solidFill>
+                          <a:srgbClr val="000000"/>
+                        </a:solidFill>
+                        <a:effectLst/>
+                        <a:latin typeface="Calibri" panose="020F0502020204030204" pitchFamily="34" charset="0"/>
+                      </a:endParaRPr>
+                    </a:p>
+                  </a:txBody>
+                  <a:tcPr marL="20041" marR="20041" marT="20041" marB="0" anchor="b">
+                    <a:lnL>
+                      <a:noFill/>
+                    </a:lnL>
+                    <a:lnR>
+                      <a:noFill/>
+                    </a:lnR>
+                    <a:lnT>
+                      <a:noFill/>
+                    </a:lnT>
+                    <a:lnB>
+                      <a:noFill/>
+                    </a:lnB>
+                  </a:tcPr>
+                </a:tc>
+                <a:tc>
+                  <a:txBody>
+                    <a:bodyPr/>
+                    <a:lstStyle/>
+                    <a:p>
+                      <a:pPr algn="l" fontAlgn="b"/>
+                      <a:endParaRPr lang="en-US" sz="2300" b="0" i="0" u="none" strike="noStrike">
+                        <a:solidFill>
+                          <a:srgbClr val="000000"/>
+                        </a:solidFill>
+                        <a:effectLst/>
+                        <a:latin typeface="Calibri" panose="020F0502020204030204" pitchFamily="34" charset="0"/>
+                      </a:endParaRPr>
+                    </a:p>
+                  </a:txBody>
+                  <a:tcPr marL="20041" marR="20041" marT="20041" marB="0" anchor="b">
+                    <a:lnL>
+                      <a:noFill/>
+                    </a:lnL>
+                    <a:lnR w="6350" cap="flat" cmpd="sng" algn="ctr">
+                      <a:solidFill>
+                        <a:srgbClr val="000000"/>
+                      </a:solidFill>
+                      <a:prstDash val="solid"/>
+                      <a:round/>
+                      <a:headEnd type="none" w="med" len="med"/>
+                      <a:tailEnd type="none" w="med" len="med"/>
+                    </a:lnR>
+                    <a:lnT>
+                      <a:noFill/>
+                    </a:lnT>
+                    <a:lnB>
+                      <a:noFill/>
+                    </a:lnB>
+                  </a:tcPr>
+                </a:tc>
+                <a:tc>
+                  <a:txBody>
+                    <a:bodyPr/>
+                    <a:lstStyle/>
+                    <a:p>
+                      <a:pPr algn="r" fontAlgn="b"/>
+                      <a:r>
+                        <a:rPr lang="en-US" sz="2300" b="1" i="0" u="none" strike="noStrike">
+                          <a:solidFill>
+                            <a:srgbClr val="000000"/>
+                          </a:solidFill>
+                          <a:effectLst/>
+                          <a:latin typeface="Calibri" panose="020F0502020204030204" pitchFamily="34" charset="0"/>
+                        </a:rPr>
+                        <a:t>17</a:t>
+                      </a:r>
+                    </a:p>
+                  </a:txBody>
+                  <a:tcPr marL="20041" marR="20041" marT="20041" marB="0" anchor="b">
+                    <a:lnL w="6350" cap="flat" cmpd="sng" algn="ctr">
+                      <a:solidFill>
+                        <a:srgbClr val="000000"/>
+                      </a:solidFill>
+                      <a:prstDash val="solid"/>
+                      <a:round/>
+                      <a:headEnd type="none" w="med" len="med"/>
+                      <a:tailEnd type="none" w="med" len="med"/>
+                    </a:lnL>
+                    <a:lnR>
+                      <a:noFill/>
+                    </a:lnR>
+                    <a:lnT>
+                      <a:noFill/>
+                    </a:lnT>
+                    <a:lnB w="6350" cap="flat" cmpd="sng" algn="ctr">
+                      <a:solidFill>
+                        <a:srgbClr val="000000"/>
+                      </a:solidFill>
+                      <a:prstDash val="solid"/>
+                      <a:round/>
+                      <a:headEnd type="none" w="med" len="med"/>
+                      <a:tailEnd type="none" w="med" len="med"/>
+                    </a:lnB>
+                  </a:tcPr>
+                </a:tc>
+                <a:tc>
+                  <a:txBody>
+                    <a:bodyPr/>
+                    <a:lstStyle/>
+                    <a:p>
+                      <a:pPr algn="r" fontAlgn="b"/>
+                      <a:r>
+                        <a:rPr lang="en-US" sz="2300" b="0" i="0" u="none" strike="noStrike">
+                          <a:solidFill>
+                            <a:srgbClr val="000000"/>
+                          </a:solidFill>
+                          <a:effectLst/>
+                          <a:latin typeface="Calibri" panose="020F0502020204030204" pitchFamily="34" charset="0"/>
+                        </a:rPr>
+                        <a:t>3</a:t>
+                      </a:r>
+                    </a:p>
+                  </a:txBody>
+                  <a:tcPr marL="20041" marR="20041" marT="20041" marB="0" anchor="b">
+                    <a:lnL>
+                      <a:noFill/>
+                    </a:lnL>
+                    <a:lnR w="6350" cap="flat" cmpd="sng" algn="ctr">
+                      <a:solidFill>
+                        <a:srgbClr val="000000"/>
+                      </a:solidFill>
+                      <a:prstDash val="solid"/>
+                      <a:round/>
+                      <a:headEnd type="none" w="med" len="med"/>
+                      <a:tailEnd type="none" w="med" len="med"/>
+                    </a:lnR>
+                    <a:lnT>
+                      <a:noFill/>
+                    </a:lnT>
+                    <a:lnB w="6350" cap="flat" cmpd="sng" algn="ctr">
+                      <a:solidFill>
+                        <a:srgbClr val="000000"/>
+                      </a:solidFill>
+                      <a:prstDash val="solid"/>
+                      <a:round/>
+                      <a:headEnd type="none" w="med" len="med"/>
+                      <a:tailEnd type="none" w="med" len="med"/>
+                    </a:lnB>
+                  </a:tcPr>
+                </a:tc>
+                <a:tc>
+                  <a:txBody>
+                    <a:bodyPr/>
+                    <a:lstStyle/>
+                    <a:p>
+                      <a:pPr algn="l" fontAlgn="b"/>
+                      <a:endParaRPr lang="en-US" sz="2300" b="0" i="0" u="none" strike="noStrike">
+                        <a:solidFill>
+                          <a:srgbClr val="000000"/>
+                        </a:solidFill>
+                        <a:effectLst/>
+                        <a:latin typeface="Calibri" panose="020F0502020204030204" pitchFamily="34" charset="0"/>
+                      </a:endParaRPr>
+                    </a:p>
+                  </a:txBody>
+                  <a:tcPr marL="20041" marR="20041" marT="20041" marB="0" anchor="b">
+                    <a:lnL w="6350" cap="flat" cmpd="sng" algn="ctr">
+                      <a:solidFill>
+                        <a:srgbClr val="000000"/>
+                      </a:solidFill>
+                      <a:prstDash val="solid"/>
+                      <a:round/>
+                      <a:headEnd type="none" w="med" len="med"/>
+                      <a:tailEnd type="none" w="med" len="med"/>
+                    </a:lnL>
+                    <a:lnR>
+                      <a:noFill/>
+                    </a:lnR>
+                    <a:lnT>
+                      <a:noFill/>
+                    </a:lnT>
+                    <a:lnB>
+                      <a:noFill/>
+                    </a:lnB>
+                  </a:tcPr>
+                </a:tc>
+              </a:tr>
+              <a:tr h="400818">
+                <a:tc gridSpan="2">
+                  <a:txBody>
+                    <a:bodyPr/>
+                    <a:lstStyle/>
+                    <a:p>
+                      <a:pPr algn="ctr" fontAlgn="b"/>
+                      <a:r>
+                        <a:rPr lang="en-US" sz="2300" b="0" i="0" u="none" strike="noStrike">
+                          <a:solidFill>
+                            <a:srgbClr val="000000"/>
+                          </a:solidFill>
+                          <a:effectLst/>
+                          <a:latin typeface="Calibri" panose="020F0502020204030204" pitchFamily="34" charset="0"/>
+                        </a:rPr>
+                        <a:t>…</a:t>
+                      </a:r>
+                    </a:p>
+                  </a:txBody>
+                  <a:tcPr marL="20041" marR="20041" marT="20041" marB="0" anchor="b">
+                    <a:lnL w="6350" cap="flat" cmpd="sng" algn="ctr">
+                      <a:solidFill>
+                        <a:srgbClr val="000000"/>
+                      </a:solidFill>
+                      <a:prstDash val="solid"/>
+                      <a:round/>
+                      <a:headEnd type="none" w="med" len="med"/>
+                      <a:tailEnd type="none" w="med" len="med"/>
+                    </a:lnL>
+                    <a:lnR w="6350" cap="flat" cmpd="sng" algn="ctr">
+                      <a:solidFill>
+                        <a:srgbClr val="000000"/>
+                      </a:solidFill>
+                      <a:prstDash val="solid"/>
+                      <a:round/>
+                      <a:headEnd type="none" w="med" len="med"/>
+                      <a:tailEnd type="none" w="med" len="med"/>
+                    </a:lnR>
+                    <a:lnT>
+                      <a:noFill/>
+                    </a:lnT>
+                    <a:lnB>
+                      <a:noFill/>
+                    </a:lnB>
+                  </a:tcPr>
+                </a:tc>
+                <a:tc hMerge="1">
+                  <a:txBody>
+                    <a:bodyPr/>
+                    <a:lstStyle/>
+                    <a:p>
+                      <a:endParaRPr lang="en-US"/>
+                    </a:p>
+                  </a:txBody>
+                  <a:tcPr/>
+                </a:tc>
+                <a:tc>
+                  <a:txBody>
+                    <a:bodyPr/>
+                    <a:lstStyle/>
+                    <a:p>
+                      <a:pPr algn="l" fontAlgn="b"/>
+                      <a:endParaRPr lang="en-US" sz="2300" b="0" i="0" u="none" strike="noStrike">
+                        <a:solidFill>
+                          <a:srgbClr val="000000"/>
+                        </a:solidFill>
+                        <a:effectLst/>
+                        <a:latin typeface="Calibri" panose="020F0502020204030204" pitchFamily="34" charset="0"/>
+                      </a:endParaRPr>
+                    </a:p>
+                  </a:txBody>
+                  <a:tcPr marL="20041" marR="20041" marT="20041" marB="0" anchor="b">
+                    <a:lnL w="6350" cap="flat" cmpd="sng" algn="ctr">
+                      <a:solidFill>
+                        <a:srgbClr val="000000"/>
+                      </a:solidFill>
+                      <a:prstDash val="solid"/>
+                      <a:round/>
+                      <a:headEnd type="none" w="med" len="med"/>
+                      <a:tailEnd type="none" w="med" len="med"/>
+                    </a:lnL>
+                    <a:lnR w="6350" cap="flat" cmpd="sng" algn="ctr">
+                      <a:solidFill>
+                        <a:srgbClr val="000000"/>
+                      </a:solidFill>
+                      <a:prstDash val="solid"/>
+                      <a:round/>
+                      <a:headEnd type="none" w="med" len="med"/>
+                      <a:tailEnd type="none" w="med" len="med"/>
+                    </a:lnR>
+                    <a:lnT>
+                      <a:noFill/>
+                    </a:lnT>
+                    <a:lnB>
+                      <a:noFill/>
+                    </a:lnB>
+                  </a:tcPr>
+                </a:tc>
+                <a:tc>
+                  <a:txBody>
+                    <a:bodyPr/>
+                    <a:lstStyle/>
+                    <a:p>
+                      <a:pPr algn="r" fontAlgn="b"/>
+                      <a:r>
+                        <a:rPr lang="en-US" sz="2300" b="1" i="0" u="none" strike="noStrike">
+                          <a:solidFill>
+                            <a:srgbClr val="000000"/>
+                          </a:solidFill>
+                          <a:effectLst/>
+                          <a:latin typeface="Calibri" panose="020F0502020204030204" pitchFamily="34" charset="0"/>
+                        </a:rPr>
+                        <a:t>17</a:t>
+                      </a:r>
+                    </a:p>
+                  </a:txBody>
+                  <a:tcPr marL="20041" marR="20041" marT="20041" marB="0" anchor="b">
+                    <a:lnL w="6350" cap="flat" cmpd="sng" algn="ctr">
+                      <a:solidFill>
+                        <a:srgbClr val="000000"/>
+                      </a:solidFill>
+                      <a:prstDash val="solid"/>
+                      <a:round/>
+                      <a:headEnd type="none" w="med" len="med"/>
+                      <a:tailEnd type="none" w="med" len="med"/>
+                    </a:lnL>
+                    <a:lnR>
+                      <a:noFill/>
+                    </a:lnR>
+                    <a:lnT>
+                      <a:noFill/>
+                    </a:lnT>
+                    <a:lnB w="6350" cap="flat" cmpd="sng" algn="ctr">
+                      <a:solidFill>
+                        <a:srgbClr val="000000"/>
+                      </a:solidFill>
+                      <a:prstDash val="solid"/>
+                      <a:round/>
+                      <a:headEnd type="none" w="med" len="med"/>
+                      <a:tailEnd type="none" w="med" len="med"/>
+                    </a:lnB>
+                  </a:tcPr>
+                </a:tc>
+                <a:tc>
+                  <a:txBody>
+                    <a:bodyPr/>
+                    <a:lstStyle/>
+                    <a:p>
+                      <a:pPr algn="r" fontAlgn="b"/>
+                      <a:r>
+                        <a:rPr lang="en-US" sz="2300" b="0" i="0" u="none" strike="noStrike">
+                          <a:solidFill>
+                            <a:srgbClr val="000000"/>
+                          </a:solidFill>
+                          <a:effectLst/>
+                          <a:latin typeface="Calibri" panose="020F0502020204030204" pitchFamily="34" charset="0"/>
+                        </a:rPr>
+                        <a:t>3</a:t>
+                      </a:r>
+                    </a:p>
+                  </a:txBody>
+                  <a:tcPr marL="20041" marR="20041" marT="20041" marB="0" anchor="b">
+                    <a:lnL>
+                      <a:noFill/>
+                    </a:lnL>
+                    <a:lnR w="6350" cap="flat" cmpd="sng" algn="ctr">
+                      <a:solidFill>
+                        <a:srgbClr val="000000"/>
+                      </a:solidFill>
+                      <a:prstDash val="solid"/>
+                      <a:round/>
+                      <a:headEnd type="none" w="med" len="med"/>
+                      <a:tailEnd type="none" w="med" len="med"/>
+                    </a:lnR>
+                    <a:lnT>
+                      <a:noFill/>
+                    </a:lnT>
+                    <a:lnB w="6350" cap="flat" cmpd="sng" algn="ctr">
+                      <a:solidFill>
+                        <a:srgbClr val="000000"/>
+                      </a:solidFill>
+                      <a:prstDash val="solid"/>
+                      <a:round/>
+                      <a:headEnd type="none" w="med" len="med"/>
+                      <a:tailEnd type="none" w="med" len="med"/>
+                    </a:lnB>
+                  </a:tcPr>
+                </a:tc>
+                <a:tc>
+                  <a:txBody>
+                    <a:bodyPr/>
+                    <a:lstStyle/>
+                    <a:p>
+                      <a:pPr algn="l" fontAlgn="b"/>
+                      <a:endParaRPr lang="en-US" sz="2300" b="0" i="0" u="none" strike="noStrike">
+                        <a:solidFill>
+                          <a:srgbClr val="000000"/>
+                        </a:solidFill>
+                        <a:effectLst/>
+                        <a:latin typeface="Calibri" panose="020F0502020204030204" pitchFamily="34" charset="0"/>
+                      </a:endParaRPr>
+                    </a:p>
+                  </a:txBody>
+                  <a:tcPr marL="20041" marR="20041" marT="20041" marB="0" anchor="b">
+                    <a:lnL w="6350" cap="flat" cmpd="sng" algn="ctr">
+                      <a:solidFill>
+                        <a:srgbClr val="000000"/>
+                      </a:solidFill>
+                      <a:prstDash val="solid"/>
+                      <a:round/>
+                      <a:headEnd type="none" w="med" len="med"/>
+                      <a:tailEnd type="none" w="med" len="med"/>
+                    </a:lnL>
+                    <a:lnR>
+                      <a:noFill/>
+                    </a:lnR>
+                    <a:lnT>
+                      <a:noFill/>
+                    </a:lnT>
+                    <a:lnB>
+                      <a:noFill/>
+                    </a:lnB>
+                  </a:tcPr>
+                </a:tc>
+                <a:tc>
+                  <a:txBody>
+                    <a:bodyPr/>
+                    <a:lstStyle/>
+                    <a:p>
+                      <a:pPr algn="l" fontAlgn="b"/>
+                      <a:endParaRPr lang="en-US" sz="2300" b="1" i="0" u="none" strike="noStrike">
+                        <a:solidFill>
+                          <a:srgbClr val="000000"/>
+                        </a:solidFill>
+                        <a:effectLst/>
+                        <a:latin typeface="Calibri" panose="020F0502020204030204" pitchFamily="34" charset="0"/>
+                      </a:endParaRPr>
+                    </a:p>
+                  </a:txBody>
+                  <a:tcPr marL="20041" marR="20041" marT="20041" marB="0" anchor="b">
+                    <a:lnL>
+                      <a:noFill/>
+                    </a:lnL>
+                    <a:lnR>
+                      <a:noFill/>
+                    </a:lnR>
+                    <a:lnT>
+                      <a:noFill/>
+                    </a:lnT>
+                    <a:lnB>
+                      <a:noFill/>
+                    </a:lnB>
+                  </a:tcPr>
+                </a:tc>
+                <a:tc>
+                  <a:txBody>
+                    <a:bodyPr/>
+                    <a:lstStyle/>
+                    <a:p>
+                      <a:pPr algn="l" fontAlgn="b"/>
+                      <a:endParaRPr lang="en-US" sz="2300" b="0" i="0" u="none" strike="noStrike">
+                        <a:solidFill>
+                          <a:srgbClr val="000000"/>
+                        </a:solidFill>
+                        <a:effectLst/>
+                        <a:latin typeface="Calibri" panose="020F0502020204030204" pitchFamily="34" charset="0"/>
+                      </a:endParaRPr>
+                    </a:p>
+                  </a:txBody>
+                  <a:tcPr marL="20041" marR="20041" marT="20041" marB="0" anchor="b">
+                    <a:lnL>
+                      <a:noFill/>
+                    </a:lnL>
+                    <a:lnR>
+                      <a:noFill/>
+                    </a:lnR>
+                    <a:lnT>
+                      <a:noFill/>
+                    </a:lnT>
+                    <a:lnB>
+                      <a:noFill/>
+                    </a:lnB>
+                  </a:tcPr>
+                </a:tc>
+                <a:tc>
+                  <a:txBody>
+                    <a:bodyPr/>
+                    <a:lstStyle/>
+                    <a:p>
+                      <a:pPr algn="l" fontAlgn="b"/>
+                      <a:endParaRPr lang="en-US" sz="2300" b="0" i="0" u="none" strike="noStrike">
+                        <a:solidFill>
+                          <a:srgbClr val="000000"/>
+                        </a:solidFill>
+                        <a:effectLst/>
+                        <a:latin typeface="Calibri" panose="020F0502020204030204" pitchFamily="34" charset="0"/>
+                      </a:endParaRPr>
+                    </a:p>
+                  </a:txBody>
+                  <a:tcPr marL="20041" marR="20041" marT="20041" marB="0" anchor="b">
+                    <a:lnL>
+                      <a:noFill/>
+                    </a:lnL>
+                    <a:lnR>
+                      <a:noFill/>
+                    </a:lnR>
+                    <a:lnT>
+                      <a:noFill/>
+                    </a:lnT>
+                    <a:lnB>
+                      <a:noFill/>
+                    </a:lnB>
+                  </a:tcPr>
+                </a:tc>
+                <a:tc>
+                  <a:txBody>
+                    <a:bodyPr/>
+                    <a:lstStyle/>
+                    <a:p>
+                      <a:pPr algn="l" fontAlgn="b"/>
+                      <a:endParaRPr lang="en-US" sz="2300" b="0" i="0" u="none" strike="noStrike">
+                        <a:solidFill>
+                          <a:srgbClr val="000000"/>
+                        </a:solidFill>
+                        <a:effectLst/>
+                        <a:latin typeface="Calibri" panose="020F0502020204030204" pitchFamily="34" charset="0"/>
+                      </a:endParaRPr>
+                    </a:p>
+                  </a:txBody>
+                  <a:tcPr marL="20041" marR="20041" marT="20041" marB="0" anchor="b">
+                    <a:lnL>
+                      <a:noFill/>
+                    </a:lnL>
+                    <a:lnR>
+                      <a:noFill/>
+                    </a:lnR>
+                    <a:lnT w="6350" cap="flat" cmpd="sng" algn="ctr">
+                      <a:solidFill>
+                        <a:srgbClr val="000000"/>
+                      </a:solidFill>
+                      <a:prstDash val="solid"/>
+                      <a:round/>
+                      <a:headEnd type="none" w="med" len="med"/>
+                      <a:tailEnd type="none" w="med" len="med"/>
+                    </a:lnT>
+                    <a:lnB>
+                      <a:noFill/>
+                    </a:lnB>
+                  </a:tcPr>
+                </a:tc>
+                <a:tc>
+                  <a:txBody>
+                    <a:bodyPr/>
+                    <a:lstStyle/>
+                    <a:p>
+                      <a:pPr algn="l" fontAlgn="b"/>
+                      <a:endParaRPr lang="en-US" sz="2300" b="0" i="0" u="none" strike="noStrike">
+                        <a:solidFill>
+                          <a:srgbClr val="000000"/>
+                        </a:solidFill>
+                        <a:effectLst/>
+                        <a:latin typeface="Calibri" panose="020F0502020204030204" pitchFamily="34" charset="0"/>
+                      </a:endParaRPr>
+                    </a:p>
+                  </a:txBody>
+                  <a:tcPr marL="20041" marR="20041" marT="20041" marB="0" anchor="b">
+                    <a:lnL>
+                      <a:noFill/>
+                    </a:lnL>
+                    <a:lnR>
+                      <a:noFill/>
+                    </a:lnR>
+                    <a:lnT w="6350" cap="flat" cmpd="sng" algn="ctr">
+                      <a:solidFill>
+                        <a:srgbClr val="000000"/>
+                      </a:solidFill>
+                      <a:prstDash val="solid"/>
+                      <a:round/>
+                      <a:headEnd type="none" w="med" len="med"/>
+                      <a:tailEnd type="none" w="med" len="med"/>
+                    </a:lnT>
+                    <a:lnB>
+                      <a:noFill/>
+                    </a:lnB>
+                  </a:tcPr>
+                </a:tc>
+                <a:tc>
+                  <a:txBody>
+                    <a:bodyPr/>
+                    <a:lstStyle/>
+                    <a:p>
+                      <a:pPr algn="l" fontAlgn="b"/>
+                      <a:endParaRPr lang="en-US" sz="2300" b="0" i="0" u="none" strike="noStrike">
+                        <a:solidFill>
+                          <a:srgbClr val="000000"/>
+                        </a:solidFill>
+                        <a:effectLst/>
+                        <a:latin typeface="Calibri" panose="020F0502020204030204" pitchFamily="34" charset="0"/>
+                      </a:endParaRPr>
+                    </a:p>
+                  </a:txBody>
+                  <a:tcPr marL="20041" marR="20041" marT="20041" marB="0" anchor="b">
+                    <a:lnL>
+                      <a:noFill/>
+                    </a:lnL>
+                    <a:lnR>
+                      <a:noFill/>
+                    </a:lnR>
+                    <a:lnT>
+                      <a:noFill/>
+                    </a:lnT>
+                    <a:lnB>
+                      <a:noFill/>
+                    </a:lnB>
+                  </a:tcPr>
+                </a:tc>
+              </a:tr>
+              <a:tr h="400818">
+                <a:tc>
+                  <a:txBody>
+                    <a:bodyPr/>
+                    <a:lstStyle/>
+                    <a:p>
+                      <a:pPr algn="r" fontAlgn="b"/>
+                      <a:r>
+                        <a:rPr lang="en-US" sz="2300" b="1" i="0" u="none" strike="noStrike">
+                          <a:solidFill>
+                            <a:srgbClr val="000000"/>
+                          </a:solidFill>
+                          <a:effectLst/>
+                          <a:latin typeface="Calibri" panose="020F0502020204030204" pitchFamily="34" charset="0"/>
+                        </a:rPr>
+                        <a:t>17</a:t>
+                      </a:r>
+                    </a:p>
+                  </a:txBody>
+                  <a:tcPr marL="20041" marR="20041" marT="20041" marB="0" anchor="b">
+                    <a:lnL w="6350" cap="flat" cmpd="sng" algn="ctr">
+                      <a:solidFill>
+                        <a:srgbClr val="000000"/>
+                      </a:solidFill>
+                      <a:prstDash val="solid"/>
+                      <a:round/>
+                      <a:headEnd type="none" w="med" len="med"/>
+                      <a:tailEnd type="none" w="med" len="med"/>
+                    </a:lnL>
+                    <a:lnR>
+                      <a:noFill/>
+                    </a:lnR>
+                    <a:lnT>
+                      <a:noFill/>
+                    </a:lnT>
+                    <a:lnB w="6350" cap="flat" cmpd="sng" algn="ctr">
+                      <a:solidFill>
+                        <a:srgbClr val="000000"/>
+                      </a:solidFill>
+                      <a:prstDash val="solid"/>
+                      <a:round/>
+                      <a:headEnd type="none" w="med" len="med"/>
+                      <a:tailEnd type="none" w="med" len="med"/>
+                    </a:lnB>
+                  </a:tcPr>
+                </a:tc>
+                <a:tc>
+                  <a:txBody>
+                    <a:bodyPr/>
+                    <a:lstStyle/>
+                    <a:p>
+                      <a:pPr algn="r" fontAlgn="b"/>
+                      <a:r>
+                        <a:rPr lang="en-US" sz="2300" b="0" i="0" u="none" strike="noStrike">
+                          <a:solidFill>
+                            <a:srgbClr val="000000"/>
+                          </a:solidFill>
+                          <a:effectLst/>
+                          <a:latin typeface="Calibri" panose="020F0502020204030204" pitchFamily="34" charset="0"/>
+                        </a:rPr>
+                        <a:t>3</a:t>
+                      </a:r>
+                    </a:p>
+                  </a:txBody>
+                  <a:tcPr marL="20041" marR="20041" marT="20041" marB="0" anchor="b">
+                    <a:lnL>
+                      <a:noFill/>
+                    </a:lnL>
+                    <a:lnR w="6350" cap="flat" cmpd="sng" algn="ctr">
+                      <a:solidFill>
+                        <a:srgbClr val="000000"/>
+                      </a:solidFill>
+                      <a:prstDash val="solid"/>
+                      <a:round/>
+                      <a:headEnd type="none" w="med" len="med"/>
+                      <a:tailEnd type="none" w="med" len="med"/>
+                    </a:lnR>
+                    <a:lnT>
+                      <a:noFill/>
+                    </a:lnT>
+                    <a:lnB w="6350" cap="flat" cmpd="sng" algn="ctr">
+                      <a:solidFill>
+                        <a:srgbClr val="000000"/>
+                      </a:solidFill>
+                      <a:prstDash val="solid"/>
+                      <a:round/>
+                      <a:headEnd type="none" w="med" len="med"/>
+                      <a:tailEnd type="none" w="med" len="med"/>
+                    </a:lnB>
+                  </a:tcPr>
+                </a:tc>
+                <a:tc>
+                  <a:txBody>
+                    <a:bodyPr/>
+                    <a:lstStyle/>
+                    <a:p>
+                      <a:pPr algn="l" fontAlgn="b"/>
+                      <a:endParaRPr lang="en-US" sz="2300" b="0" i="0" u="none" strike="noStrike">
+                        <a:solidFill>
+                          <a:srgbClr val="000000"/>
+                        </a:solidFill>
+                        <a:effectLst/>
+                        <a:latin typeface="Calibri" panose="020F0502020204030204" pitchFamily="34" charset="0"/>
+                      </a:endParaRPr>
+                    </a:p>
+                  </a:txBody>
+                  <a:tcPr marL="20041" marR="20041" marT="20041" marB="0" anchor="b">
+                    <a:lnL w="6350" cap="flat" cmpd="sng" algn="ctr">
+                      <a:solidFill>
+                        <a:srgbClr val="000000"/>
+                      </a:solidFill>
+                      <a:prstDash val="solid"/>
+                      <a:round/>
+                      <a:headEnd type="none" w="med" len="med"/>
+                      <a:tailEnd type="none" w="med" len="med"/>
+                    </a:lnL>
+                    <a:lnR>
+                      <a:noFill/>
+                    </a:lnR>
+                    <a:lnT>
+                      <a:noFill/>
+                    </a:lnT>
+                    <a:lnB>
+                      <a:noFill/>
+                    </a:lnB>
+                  </a:tcPr>
+                </a:tc>
+                <a:tc>
+                  <a:txBody>
+                    <a:bodyPr/>
+                    <a:lstStyle/>
+                    <a:p>
+                      <a:pPr algn="l" fontAlgn="b"/>
+                      <a:endParaRPr lang="en-US" sz="2300" b="0" i="0" u="none" strike="noStrike">
+                        <a:solidFill>
+                          <a:srgbClr val="000000"/>
+                        </a:solidFill>
+                        <a:effectLst/>
+                        <a:latin typeface="Calibri" panose="020F0502020204030204" pitchFamily="34" charset="0"/>
+                      </a:endParaRPr>
+                    </a:p>
+                  </a:txBody>
+                  <a:tcPr marL="20041" marR="20041" marT="20041" marB="0" anchor="b">
+                    <a:lnL>
+                      <a:noFill/>
+                    </a:lnL>
+                    <a:lnR>
+                      <a:noFill/>
+                    </a:lnR>
+                    <a:lnT w="6350" cap="flat" cmpd="sng" algn="ctr">
+                      <a:solidFill>
+                        <a:srgbClr val="000000"/>
+                      </a:solidFill>
+                      <a:prstDash val="solid"/>
+                      <a:round/>
+                      <a:headEnd type="none" w="med" len="med"/>
+                      <a:tailEnd type="none" w="med" len="med"/>
+                    </a:lnT>
+                    <a:lnB>
+                      <a:noFill/>
+                    </a:lnB>
+                  </a:tcPr>
+                </a:tc>
+                <a:tc>
+                  <a:txBody>
+                    <a:bodyPr/>
+                    <a:lstStyle/>
+                    <a:p>
+                      <a:pPr algn="l" fontAlgn="b"/>
+                      <a:endParaRPr lang="en-US" sz="2300" b="0" i="0" u="none" strike="noStrike">
+                        <a:solidFill>
+                          <a:srgbClr val="000000"/>
+                        </a:solidFill>
+                        <a:effectLst/>
+                        <a:latin typeface="Calibri" panose="020F0502020204030204" pitchFamily="34" charset="0"/>
+                      </a:endParaRPr>
+                    </a:p>
+                  </a:txBody>
+                  <a:tcPr marL="20041" marR="20041" marT="20041" marB="0" anchor="b">
+                    <a:lnL>
+                      <a:noFill/>
+                    </a:lnL>
+                    <a:lnR>
+                      <a:noFill/>
+                    </a:lnR>
+                    <a:lnT w="6350" cap="flat" cmpd="sng" algn="ctr">
+                      <a:solidFill>
+                        <a:srgbClr val="000000"/>
+                      </a:solidFill>
+                      <a:prstDash val="solid"/>
+                      <a:round/>
+                      <a:headEnd type="none" w="med" len="med"/>
+                      <a:tailEnd type="none" w="med" len="med"/>
+                    </a:lnT>
+                    <a:lnB>
+                      <a:noFill/>
+                    </a:lnB>
+                  </a:tcPr>
+                </a:tc>
+                <a:tc>
+                  <a:txBody>
+                    <a:bodyPr/>
+                    <a:lstStyle/>
+                    <a:p>
+                      <a:pPr algn="l" fontAlgn="b"/>
+                      <a:endParaRPr lang="en-US" sz="2300" b="0" i="0" u="none" strike="noStrike">
+                        <a:solidFill>
+                          <a:srgbClr val="000000"/>
+                        </a:solidFill>
+                        <a:effectLst/>
+                        <a:latin typeface="Calibri" panose="020F0502020204030204" pitchFamily="34" charset="0"/>
+                      </a:endParaRPr>
+                    </a:p>
+                  </a:txBody>
+                  <a:tcPr marL="20041" marR="20041" marT="20041" marB="0" anchor="b">
+                    <a:lnL>
+                      <a:noFill/>
+                    </a:lnL>
+                    <a:lnR>
+                      <a:noFill/>
+                    </a:lnR>
+                    <a:lnT>
+                      <a:noFill/>
+                    </a:lnT>
+                    <a:lnB>
+                      <a:noFill/>
+                    </a:lnB>
+                  </a:tcPr>
+                </a:tc>
+                <a:tc>
+                  <a:txBody>
+                    <a:bodyPr/>
+                    <a:lstStyle/>
+                    <a:p>
+                      <a:pPr algn="l" fontAlgn="b"/>
+                      <a:endParaRPr lang="en-US" sz="2300" b="0" i="0" u="none" strike="noStrike">
+                        <a:solidFill>
+                          <a:srgbClr val="000000"/>
+                        </a:solidFill>
+                        <a:effectLst/>
+                        <a:latin typeface="Calibri" panose="020F0502020204030204" pitchFamily="34" charset="0"/>
+                      </a:endParaRPr>
+                    </a:p>
+                  </a:txBody>
+                  <a:tcPr marL="20041" marR="20041" marT="20041" marB="0" anchor="b">
+                    <a:lnL>
+                      <a:noFill/>
+                    </a:lnL>
+                    <a:lnR>
+                      <a:noFill/>
+                    </a:lnR>
+                    <a:lnT>
+                      <a:noFill/>
+                    </a:lnT>
+                    <a:lnB>
+                      <a:noFill/>
+                    </a:lnB>
+                  </a:tcPr>
+                </a:tc>
+                <a:tc>
+                  <a:txBody>
+                    <a:bodyPr/>
+                    <a:lstStyle/>
+                    <a:p>
+                      <a:pPr algn="l" fontAlgn="b"/>
+                      <a:endParaRPr lang="en-US" sz="2300" b="0" i="0" u="none" strike="noStrike">
+                        <a:solidFill>
+                          <a:srgbClr val="000000"/>
+                        </a:solidFill>
+                        <a:effectLst/>
+                        <a:latin typeface="Calibri" panose="020F0502020204030204" pitchFamily="34" charset="0"/>
+                      </a:endParaRPr>
+                    </a:p>
+                  </a:txBody>
+                  <a:tcPr marL="20041" marR="20041" marT="20041" marB="0" anchor="b">
+                    <a:lnL>
+                      <a:noFill/>
+                    </a:lnL>
+                    <a:lnR>
+                      <a:noFill/>
+                    </a:lnR>
+                    <a:lnT>
+                      <a:noFill/>
+                    </a:lnT>
+                    <a:lnB>
+                      <a:noFill/>
+                    </a:lnB>
+                  </a:tcPr>
+                </a:tc>
+                <a:tc>
+                  <a:txBody>
+                    <a:bodyPr/>
+                    <a:lstStyle/>
+                    <a:p>
+                      <a:pPr algn="l" fontAlgn="b"/>
+                      <a:endParaRPr lang="en-US" sz="2300" b="0" i="0" u="none" strike="noStrike">
+                        <a:solidFill>
+                          <a:srgbClr val="000000"/>
+                        </a:solidFill>
+                        <a:effectLst/>
+                        <a:latin typeface="Calibri" panose="020F0502020204030204" pitchFamily="34" charset="0"/>
+                      </a:endParaRPr>
+                    </a:p>
+                  </a:txBody>
+                  <a:tcPr marL="20041" marR="20041" marT="20041" marB="0" anchor="b">
+                    <a:lnL>
+                      <a:noFill/>
+                    </a:lnL>
+                    <a:lnR>
+                      <a:noFill/>
+                    </a:lnR>
+                    <a:lnT>
+                      <a:noFill/>
+                    </a:lnT>
+                    <a:lnB>
+                      <a:noFill/>
+                    </a:lnB>
+                  </a:tcPr>
+                </a:tc>
+                <a:tc>
+                  <a:txBody>
+                    <a:bodyPr/>
+                    <a:lstStyle/>
+                    <a:p>
+                      <a:pPr algn="l" fontAlgn="b"/>
+                      <a:endParaRPr lang="en-US" sz="2300" b="0" i="0" u="none" strike="noStrike">
+                        <a:solidFill>
+                          <a:srgbClr val="000000"/>
+                        </a:solidFill>
+                        <a:effectLst/>
+                        <a:latin typeface="Calibri" panose="020F0502020204030204" pitchFamily="34" charset="0"/>
+                      </a:endParaRPr>
+                    </a:p>
+                  </a:txBody>
+                  <a:tcPr marL="20041" marR="20041" marT="20041" marB="0" anchor="b">
+                    <a:lnL>
+                      <a:noFill/>
+                    </a:lnL>
+                    <a:lnR>
+                      <a:noFill/>
+                    </a:lnR>
+                    <a:lnT>
+                      <a:noFill/>
+                    </a:lnT>
+                    <a:lnB>
+                      <a:noFill/>
+                    </a:lnB>
+                  </a:tcPr>
+                </a:tc>
+                <a:tc>
+                  <a:txBody>
+                    <a:bodyPr/>
+                    <a:lstStyle/>
+                    <a:p>
+                      <a:pPr algn="l" fontAlgn="b"/>
+                      <a:endParaRPr lang="en-US" sz="2300" b="0" i="0" u="none" strike="noStrike">
+                        <a:solidFill>
+                          <a:srgbClr val="000000"/>
+                        </a:solidFill>
+                        <a:effectLst/>
+                        <a:latin typeface="Calibri" panose="020F0502020204030204" pitchFamily="34" charset="0"/>
+                      </a:endParaRPr>
+                    </a:p>
+                  </a:txBody>
+                  <a:tcPr marL="20041" marR="20041" marT="20041" marB="0" anchor="b">
+                    <a:lnL>
+                      <a:noFill/>
+                    </a:lnL>
+                    <a:lnR>
+                      <a:noFill/>
+                    </a:lnR>
+                    <a:lnT>
+                      <a:noFill/>
+                    </a:lnT>
+                    <a:lnB>
+                      <a:noFill/>
+                    </a:lnB>
+                  </a:tcPr>
+                </a:tc>
+                <a:tc>
+                  <a:txBody>
+                    <a:bodyPr/>
+                    <a:lstStyle/>
+                    <a:p>
+                      <a:pPr algn="l" fontAlgn="b"/>
+                      <a:endParaRPr lang="en-US" sz="2300" b="0" i="0" u="none" strike="noStrike">
+                        <a:solidFill>
+                          <a:srgbClr val="000000"/>
+                        </a:solidFill>
+                        <a:effectLst/>
+                        <a:latin typeface="Calibri" panose="020F0502020204030204" pitchFamily="34" charset="0"/>
+                      </a:endParaRPr>
+                    </a:p>
+                  </a:txBody>
+                  <a:tcPr marL="20041" marR="20041" marT="20041" marB="0" anchor="b">
+                    <a:lnL>
+                      <a:noFill/>
+                    </a:lnL>
+                    <a:lnR>
+                      <a:noFill/>
+                    </a:lnR>
+                    <a:lnT>
+                      <a:noFill/>
+                    </a:lnT>
+                    <a:lnB>
+                      <a:noFill/>
+                    </a:lnB>
+                  </a:tcPr>
+                </a:tc>
+              </a:tr>
+              <a:tr h="400818">
+                <a:tc>
+                  <a:txBody>
+                    <a:bodyPr/>
+                    <a:lstStyle/>
+                    <a:p>
+                      <a:pPr algn="l" fontAlgn="b"/>
+                      <a:r>
+                        <a:rPr lang="en-US" sz="2300" b="1" i="0" u="none" strike="noStrike">
+                          <a:solidFill>
+                            <a:srgbClr val="000000"/>
+                          </a:solidFill>
+                          <a:effectLst/>
+                          <a:latin typeface="Calibri" panose="020F0502020204030204" pitchFamily="34" charset="0"/>
+                        </a:rPr>
+                        <a:t>id</a:t>
+                      </a:r>
+                    </a:p>
+                  </a:txBody>
+                  <a:tcPr marL="20041" marR="20041" marT="20041" marB="0" anchor="b">
+                    <a:lnL>
+                      <a:noFill/>
+                    </a:lnL>
+                    <a:lnR>
+                      <a:noFill/>
+                    </a:lnR>
+                    <a:lnT w="6350" cap="flat" cmpd="sng" algn="ctr">
+                      <a:solidFill>
+                        <a:srgbClr val="000000"/>
+                      </a:solidFill>
+                      <a:prstDash val="solid"/>
+                      <a:round/>
+                      <a:headEnd type="none" w="med" len="med"/>
+                      <a:tailEnd type="none" w="med" len="med"/>
+                    </a:lnT>
+                    <a:lnB>
+                      <a:noFill/>
+                    </a:lnB>
+                  </a:tcPr>
+                </a:tc>
+                <a:tc gridSpan="2">
+                  <a:txBody>
+                    <a:bodyPr/>
+                    <a:lstStyle/>
+                    <a:p>
+                      <a:pPr algn="l" fontAlgn="b"/>
+                      <a:r>
+                        <a:rPr lang="en-US" sz="2300" b="0" i="0" u="none" strike="noStrike">
+                          <a:solidFill>
+                            <a:srgbClr val="000000"/>
+                          </a:solidFill>
+                          <a:effectLst/>
+                          <a:latin typeface="Calibri" panose="020F0502020204030204" pitchFamily="34" charset="0"/>
+                        </a:rPr>
+                        <a:t>len</a:t>
+                      </a:r>
+                    </a:p>
+                  </a:txBody>
+                  <a:tcPr marL="20041" marR="20041" marT="20041" marB="0" anchor="b">
+                    <a:lnL>
+                      <a:noFill/>
+                    </a:lnL>
+                    <a:lnR>
+                      <a:noFill/>
+                    </a:lnR>
+                    <a:lnT w="6350" cap="flat" cmpd="sng" algn="ctr">
+                      <a:solidFill>
+                        <a:srgbClr val="000000"/>
+                      </a:solidFill>
+                      <a:prstDash val="solid"/>
+                      <a:round/>
+                      <a:headEnd type="none" w="med" len="med"/>
+                      <a:tailEnd type="none" w="med" len="med"/>
+                    </a:lnT>
+                    <a:lnB>
+                      <a:noFill/>
+                    </a:lnB>
+                  </a:tcPr>
+                </a:tc>
+                <a:tc hMerge="1">
+                  <a:txBody>
+                    <a:bodyPr/>
+                    <a:lstStyle/>
+                    <a:p>
+                      <a:endParaRPr lang="en-US"/>
+                    </a:p>
+                  </a:txBody>
+                  <a:tcPr/>
+                </a:tc>
+                <a:tc>
+                  <a:txBody>
+                    <a:bodyPr/>
+                    <a:lstStyle/>
+                    <a:p>
+                      <a:pPr algn="l" fontAlgn="b"/>
+                      <a:endParaRPr lang="en-US" sz="2300" b="0" i="0" u="none" strike="noStrike">
+                        <a:solidFill>
+                          <a:srgbClr val="000000"/>
+                        </a:solidFill>
+                        <a:effectLst/>
+                        <a:latin typeface="Calibri" panose="020F0502020204030204" pitchFamily="34" charset="0"/>
+                      </a:endParaRPr>
+                    </a:p>
+                  </a:txBody>
+                  <a:tcPr marL="20041" marR="20041" marT="20041" marB="0" anchor="b">
+                    <a:lnL>
+                      <a:noFill/>
+                    </a:lnL>
+                    <a:lnR>
+                      <a:noFill/>
+                    </a:lnR>
+                    <a:lnT>
+                      <a:noFill/>
+                    </a:lnT>
+                    <a:lnB>
+                      <a:noFill/>
+                    </a:lnB>
+                  </a:tcPr>
+                </a:tc>
+                <a:tc>
+                  <a:txBody>
+                    <a:bodyPr/>
+                    <a:lstStyle/>
+                    <a:p>
+                      <a:pPr algn="l" fontAlgn="b"/>
+                      <a:endParaRPr lang="en-US" sz="2300" b="0" i="0" u="none" strike="noStrike">
+                        <a:solidFill>
+                          <a:srgbClr val="000000"/>
+                        </a:solidFill>
+                        <a:effectLst/>
+                        <a:latin typeface="Calibri" panose="020F0502020204030204" pitchFamily="34" charset="0"/>
+                      </a:endParaRPr>
+                    </a:p>
+                  </a:txBody>
+                  <a:tcPr marL="20041" marR="20041" marT="20041" marB="0" anchor="b">
+                    <a:lnL>
+                      <a:noFill/>
+                    </a:lnL>
+                    <a:lnR>
+                      <a:noFill/>
+                    </a:lnR>
+                    <a:lnT>
+                      <a:noFill/>
+                    </a:lnT>
+                    <a:lnB>
+                      <a:noFill/>
+                    </a:lnB>
+                  </a:tcPr>
+                </a:tc>
+                <a:tc>
+                  <a:txBody>
+                    <a:bodyPr/>
+                    <a:lstStyle/>
+                    <a:p>
+                      <a:pPr algn="l" fontAlgn="b"/>
+                      <a:endParaRPr lang="en-US" sz="2300" b="0" i="0" u="none" strike="noStrike">
+                        <a:solidFill>
+                          <a:srgbClr val="000000"/>
+                        </a:solidFill>
+                        <a:effectLst/>
+                        <a:latin typeface="Calibri" panose="020F0502020204030204" pitchFamily="34" charset="0"/>
+                      </a:endParaRPr>
+                    </a:p>
+                  </a:txBody>
+                  <a:tcPr marL="20041" marR="20041" marT="20041" marB="0" anchor="b">
+                    <a:lnL>
+                      <a:noFill/>
+                    </a:lnL>
+                    <a:lnR>
+                      <a:noFill/>
+                    </a:lnR>
+                    <a:lnT>
+                      <a:noFill/>
+                    </a:lnT>
+                    <a:lnB>
+                      <a:noFill/>
+                    </a:lnB>
+                  </a:tcPr>
+                </a:tc>
+                <a:tc>
+                  <a:txBody>
+                    <a:bodyPr/>
+                    <a:lstStyle/>
+                    <a:p>
+                      <a:pPr algn="l" fontAlgn="b"/>
+                      <a:endParaRPr lang="en-US" sz="2300" b="0" i="0" u="none" strike="noStrike">
+                        <a:solidFill>
+                          <a:srgbClr val="000000"/>
+                        </a:solidFill>
+                        <a:effectLst/>
+                        <a:latin typeface="Calibri" panose="020F0502020204030204" pitchFamily="34" charset="0"/>
+                      </a:endParaRPr>
+                    </a:p>
+                  </a:txBody>
+                  <a:tcPr marL="20041" marR="20041" marT="20041" marB="0" anchor="b">
+                    <a:lnL>
+                      <a:noFill/>
+                    </a:lnL>
+                    <a:lnR>
+                      <a:noFill/>
+                    </a:lnR>
+                    <a:lnT>
+                      <a:noFill/>
+                    </a:lnT>
+                    <a:lnB>
+                      <a:noFill/>
+                    </a:lnB>
+                  </a:tcPr>
+                </a:tc>
+                <a:tc>
+                  <a:txBody>
+                    <a:bodyPr/>
+                    <a:lstStyle/>
+                    <a:p>
+                      <a:pPr algn="l" fontAlgn="b"/>
+                      <a:endParaRPr lang="en-US" sz="2300" b="0" i="0" u="none" strike="noStrike">
+                        <a:solidFill>
+                          <a:srgbClr val="000000"/>
+                        </a:solidFill>
+                        <a:effectLst/>
+                        <a:latin typeface="Calibri" panose="020F0502020204030204" pitchFamily="34" charset="0"/>
+                      </a:endParaRPr>
+                    </a:p>
+                  </a:txBody>
+                  <a:tcPr marL="20041" marR="20041" marT="20041" marB="0" anchor="b">
+                    <a:lnL>
+                      <a:noFill/>
+                    </a:lnL>
+                    <a:lnR>
+                      <a:noFill/>
+                    </a:lnR>
+                    <a:lnT>
+                      <a:noFill/>
+                    </a:lnT>
+                    <a:lnB>
+                      <a:noFill/>
+                    </a:lnB>
+                  </a:tcPr>
+                </a:tc>
+                <a:tc>
+                  <a:txBody>
+                    <a:bodyPr/>
+                    <a:lstStyle/>
+                    <a:p>
+                      <a:pPr algn="l" fontAlgn="b"/>
+                      <a:endParaRPr lang="en-US" sz="2300" b="0" i="0" u="none" strike="noStrike">
+                        <a:solidFill>
+                          <a:srgbClr val="000000"/>
+                        </a:solidFill>
+                        <a:effectLst/>
+                        <a:latin typeface="Calibri" panose="020F0502020204030204" pitchFamily="34" charset="0"/>
+                      </a:endParaRPr>
+                    </a:p>
+                  </a:txBody>
+                  <a:tcPr marL="20041" marR="20041" marT="20041" marB="0" anchor="b">
+                    <a:lnL>
+                      <a:noFill/>
+                    </a:lnL>
+                    <a:lnR>
+                      <a:noFill/>
+                    </a:lnR>
+                    <a:lnT>
+                      <a:noFill/>
+                    </a:lnT>
+                    <a:lnB>
+                      <a:noFill/>
+                    </a:lnB>
+                  </a:tcPr>
+                </a:tc>
+                <a:tc>
+                  <a:txBody>
+                    <a:bodyPr/>
+                    <a:lstStyle/>
+                    <a:p>
+                      <a:pPr algn="l" fontAlgn="b"/>
+                      <a:endParaRPr lang="en-US" sz="2300" b="0" i="0" u="none" strike="noStrike">
+                        <a:solidFill>
+                          <a:srgbClr val="000000"/>
+                        </a:solidFill>
+                        <a:effectLst/>
+                        <a:latin typeface="Calibri" panose="020F0502020204030204" pitchFamily="34" charset="0"/>
+                      </a:endParaRPr>
+                    </a:p>
+                  </a:txBody>
+                  <a:tcPr marL="20041" marR="20041" marT="20041" marB="0" anchor="b">
+                    <a:lnL>
+                      <a:noFill/>
+                    </a:lnL>
+                    <a:lnR>
+                      <a:noFill/>
+                    </a:lnR>
+                    <a:lnT>
+                      <a:noFill/>
+                    </a:lnT>
+                    <a:lnB>
+                      <a:noFill/>
+                    </a:lnB>
+                  </a:tcPr>
+                </a:tc>
+                <a:tc>
+                  <a:txBody>
+                    <a:bodyPr/>
+                    <a:lstStyle/>
+                    <a:p>
+                      <a:pPr algn="l" fontAlgn="b"/>
+                      <a:endParaRPr lang="en-US" sz="2300" b="0" i="0" u="none" strike="noStrike">
+                        <a:solidFill>
+                          <a:srgbClr val="000000"/>
+                        </a:solidFill>
+                        <a:effectLst/>
+                        <a:latin typeface="Calibri" panose="020F0502020204030204" pitchFamily="34" charset="0"/>
+                      </a:endParaRPr>
+                    </a:p>
+                  </a:txBody>
+                  <a:tcPr marL="20041" marR="20041" marT="20041" marB="0" anchor="b">
+                    <a:lnL>
+                      <a:noFill/>
+                    </a:lnL>
+                    <a:lnR>
+                      <a:noFill/>
+                    </a:lnR>
+                    <a:lnT>
+                      <a:noFill/>
+                    </a:lnT>
+                    <a:lnB>
+                      <a:noFill/>
+                    </a:lnB>
+                  </a:tcPr>
+                </a:tc>
+                <a:tc>
+                  <a:txBody>
+                    <a:bodyPr/>
+                    <a:lstStyle/>
+                    <a:p>
+                      <a:pPr algn="l" fontAlgn="b"/>
+                      <a:endParaRPr lang="en-US" sz="2300" b="0" i="0" u="none" strike="noStrike" dirty="0">
+                        <a:solidFill>
+                          <a:srgbClr val="000000"/>
+                        </a:solidFill>
+                        <a:effectLst/>
+                        <a:latin typeface="Calibri" panose="020F0502020204030204" pitchFamily="34" charset="0"/>
+                      </a:endParaRPr>
+                    </a:p>
+                  </a:txBody>
+                  <a:tcPr marL="20041" marR="20041" marT="20041" marB="0" anchor="b">
+                    <a:lnL>
+                      <a:noFill/>
+                    </a:lnL>
+                    <a:lnR>
+                      <a:noFill/>
+                    </a:lnR>
+                    <a:lnT>
+                      <a:noFill/>
+                    </a:lnT>
+                    <a:lnB>
+                      <a:noFill/>
+                    </a:lnB>
+                  </a:tcPr>
+                </a:tc>
+              </a:tr>
+            </a:tbl>
+          </a:graphicData>
+        </a:graphic>
+      </p:graphicFrame>
     </p:spTree>
     <p:extLst>
       <p:ext uri="{BB962C8B-B14F-4D97-AF65-F5344CB8AC3E}">

</xml_diff>

<commit_message>
Final Submission for presentation
</commit_message>
<xml_diff>
--- a/Paper Presentation/EECS405.PattersonFitzpatrick.PaperPresentation.pptx
+++ b/Paper Presentation/EECS405.PattersonFitzpatrick.PaperPresentation.pptx
@@ -19,15 +19,16 @@
     <p:sldId id="262" r:id="rId13"/>
     <p:sldId id="263" r:id="rId14"/>
     <p:sldId id="278" r:id="rId15"/>
-    <p:sldId id="272" r:id="rId16"/>
-    <p:sldId id="265" r:id="rId17"/>
+    <p:sldId id="265" r:id="rId16"/>
+    <p:sldId id="272" r:id="rId17"/>
     <p:sldId id="274" r:id="rId18"/>
     <p:sldId id="279" r:id="rId19"/>
     <p:sldId id="273" r:id="rId20"/>
     <p:sldId id="266" r:id="rId21"/>
     <p:sldId id="280" r:id="rId22"/>
     <p:sldId id="281" r:id="rId23"/>
-    <p:sldId id="264" r:id="rId24"/>
+    <p:sldId id="283" r:id="rId24"/>
+    <p:sldId id="264" r:id="rId25"/>
   </p:sldIdLst>
   <p:sldSz cx="12192000" cy="6858000"/>
   <p:notesSz cx="6858000" cy="9144000"/>
@@ -3196,11 +3197,7 @@
           <a:p>
             <a:r>
               <a:rPr lang="en-US" dirty="0" smtClean="0"/>
-              <a:t>Non Random Access (NRA</a:t>
-            </a:r>
-            <a:r>
-              <a:rPr lang="en-US" dirty="0" smtClean="0"/>
-              <a:t>) – “Breadth First”</a:t>
+              <a:t>Non Random Access (NRA) – “Breadth First”</a:t>
             </a:r>
             <a:endParaRPr lang="en-US" dirty="0"/>
           </a:p>
@@ -3243,13 +3240,8 @@
           <a:p>
             <a:r>
               <a:rPr lang="en-US" dirty="0" smtClean="0"/>
-              <a:t>Search each q-gram in </a:t>
-            </a:r>
-            <a:r>
-              <a:rPr lang="en-US" dirty="0" smtClean="0"/>
-              <a:t>round-robin fashion</a:t>
-            </a:r>
-            <a:endParaRPr lang="en-US" dirty="0" smtClean="0"/>
+              <a:t>Search each q-gram in round-robin fashion</a:t>
+            </a:r>
           </a:p>
           <a:p>
             <a:pPr lvl="1"/>
@@ -3328,15 +3320,7 @@
           <a:p>
             <a:r>
               <a:rPr lang="en-US" dirty="0" smtClean="0"/>
-              <a:t>NRA </a:t>
-            </a:r>
-            <a:r>
-              <a:rPr lang="en-US" dirty="0" smtClean="0"/>
-              <a:t>- </a:t>
-            </a:r>
-            <a:r>
-              <a:rPr lang="en-US" dirty="0" smtClean="0"/>
-              <a:t>Example</a:t>
+              <a:t>NRA - Example</a:t>
             </a:r>
             <a:endParaRPr lang="en-US" dirty="0"/>
           </a:p>
@@ -3465,11 +3449,7 @@
           <a:p>
             <a:r>
               <a:rPr lang="en-US" dirty="0" smtClean="0"/>
-              <a:t>Order </a:t>
-            </a:r>
-            <a:r>
-              <a:rPr lang="en-US" dirty="0" smtClean="0"/>
-              <a:t>Preservation</a:t>
+              <a:t>Order Preservation</a:t>
             </a:r>
           </a:p>
           <a:p>
@@ -3871,6 +3851,257 @@
 </file>
 
 <file path=ppt/slides/slide15.xml><?xml version="1.0" encoding="utf-8"?>
+<p:sld xmlns:a="http://schemas.openxmlformats.org/drawingml/2006/main" xmlns:r="http://schemas.openxmlformats.org/officeDocument/2006/relationships" xmlns:p="http://schemas.openxmlformats.org/presentationml/2006/main">
+  <p:cSld>
+    <p:spTree>
+      <p:nvGrpSpPr>
+        <p:cNvPr id="1" name=""/>
+        <p:cNvGrpSpPr/>
+        <p:nvPr/>
+      </p:nvGrpSpPr>
+      <p:grpSpPr>
+        <a:xfrm>
+          <a:off x="0" y="0"/>
+          <a:ext cx="0" cy="0"/>
+          <a:chOff x="0" y="0"/>
+          <a:chExt cx="0" cy="0"/>
+        </a:xfrm>
+      </p:grpSpPr>
+      <p:sp>
+        <p:nvSpPr>
+          <p:cNvPr id="2" name="Title 1"/>
+          <p:cNvSpPr>
+            <a:spLocks noGrp="1"/>
+          </p:cNvSpPr>
+          <p:nvPr>
+            <p:ph type="title"/>
+          </p:nvPr>
+        </p:nvSpPr>
+        <p:spPr/>
+        <p:txBody>
+          <a:bodyPr/>
+          <a:lstStyle/>
+          <a:p>
+            <a:r>
+              <a:rPr lang="en-US" dirty="0" smtClean="0"/>
+              <a:t>Shortest-First Algorithm (SF)</a:t>
+            </a:r>
+            <a:endParaRPr lang="en-US" dirty="0"/>
+          </a:p>
+        </p:txBody>
+      </p:sp>
+      <p:sp>
+        <p:nvSpPr>
+          <p:cNvPr id="3" name="Content Placeholder 2"/>
+          <p:cNvSpPr>
+            <a:spLocks noGrp="1"/>
+          </p:cNvSpPr>
+          <p:nvPr>
+            <p:ph idx="1"/>
+          </p:nvPr>
+        </p:nvSpPr>
+        <p:spPr/>
+        <p:txBody>
+          <a:bodyPr>
+            <a:normAutofit fontScale="92500" lnSpcReduction="10000"/>
+          </a:bodyPr>
+          <a:lstStyle/>
+          <a:p>
+            <a:r>
+              <a:rPr lang="en-US" dirty="0" smtClean="0"/>
+              <a:t>If we view </a:t>
+            </a:r>
+            <a:r>
+              <a:rPr lang="en-US" dirty="0" err="1" smtClean="0"/>
+              <a:t>iNRA</a:t>
+            </a:r>
+            <a:r>
+              <a:rPr lang="en-US" dirty="0" smtClean="0"/>
+              <a:t> as a breadth first approach, then SF is a depth first approach</a:t>
+            </a:r>
+          </a:p>
+          <a:p>
+            <a:r>
+              <a:rPr lang="en-US" dirty="0" smtClean="0"/>
+              <a:t>Skip to first entry in every list with length </a:t>
+            </a:r>
+            <a:r>
+              <a:rPr lang="en-US" i="1" dirty="0" err="1" smtClean="0"/>
+              <a:t>len</a:t>
+            </a:r>
+            <a:r>
+              <a:rPr lang="en-US" i="1" dirty="0" smtClean="0"/>
+              <a:t>(s) &gt;= </a:t>
+            </a:r>
+            <a:r>
+              <a:rPr lang="el-GR" i="1" dirty="0" smtClean="0"/>
+              <a:t>τ</a:t>
+            </a:r>
+            <a:r>
+              <a:rPr lang="en-US" i="1" dirty="0" smtClean="0"/>
+              <a:t> </a:t>
+            </a:r>
+            <a:r>
+              <a:rPr lang="en-US" i="1" dirty="0" err="1" smtClean="0"/>
+              <a:t>len</a:t>
+            </a:r>
+            <a:r>
+              <a:rPr lang="en-US" i="1" dirty="0" smtClean="0"/>
+              <a:t>(q)</a:t>
+            </a:r>
+          </a:p>
+          <a:p>
+            <a:r>
+              <a:rPr lang="en-US" dirty="0"/>
+              <a:t>Compute </a:t>
+            </a:r>
+            <a:r>
+              <a:rPr lang="el-GR" dirty="0"/>
+              <a:t>λ</a:t>
+            </a:r>
+            <a:r>
+              <a:rPr lang="en-US" baseline="-25000" dirty="0"/>
+              <a:t>1….n</a:t>
+            </a:r>
+            <a:endParaRPr lang="en-US" dirty="0"/>
+          </a:p>
+          <a:p>
+            <a:r>
+              <a:rPr lang="en-US" dirty="0" smtClean="0"/>
+              <a:t>Scan inverted lists in decreasing </a:t>
+            </a:r>
+            <a:r>
+              <a:rPr lang="en-US" dirty="0" err="1" smtClean="0"/>
+              <a:t>idf</a:t>
+            </a:r>
+            <a:r>
+              <a:rPr lang="en-US" dirty="0" smtClean="0"/>
+              <a:t> order</a:t>
+            </a:r>
+          </a:p>
+          <a:p>
+            <a:pPr lvl="1"/>
+            <a:r>
+              <a:rPr lang="en-US" dirty="0" smtClean="0"/>
+              <a:t>Tokens with higher </a:t>
+            </a:r>
+            <a:r>
+              <a:rPr lang="en-US" dirty="0" err="1" smtClean="0"/>
+              <a:t>idfs</a:t>
+            </a:r>
+            <a:r>
+              <a:rPr lang="en-US" dirty="0" smtClean="0"/>
+              <a:t> examined first</a:t>
+            </a:r>
+          </a:p>
+          <a:p>
+            <a:pPr lvl="2"/>
+            <a:r>
+              <a:rPr lang="en-US" dirty="0" smtClean="0"/>
+              <a:t>Occur in fewer strings</a:t>
+            </a:r>
+          </a:p>
+          <a:p>
+            <a:pPr lvl="2"/>
+            <a:r>
+              <a:rPr lang="en-US" dirty="0" smtClean="0"/>
+              <a:t>Smaller lists of strings that they occur in</a:t>
+            </a:r>
+          </a:p>
+          <a:p>
+            <a:pPr lvl="2"/>
+            <a:r>
+              <a:rPr lang="en-US" dirty="0" smtClean="0"/>
+              <a:t>Smallest chance of false positive candidates</a:t>
+            </a:r>
+          </a:p>
+          <a:p>
+            <a:r>
+              <a:rPr lang="en-US" dirty="0" smtClean="0"/>
+              <a:t>Scan for elements of length from </a:t>
+            </a:r>
+            <a:r>
+              <a:rPr lang="el-GR" i="1" dirty="0"/>
+              <a:t>τ</a:t>
+            </a:r>
+            <a:r>
+              <a:rPr lang="en-US" i="1" dirty="0"/>
+              <a:t> </a:t>
+            </a:r>
+            <a:r>
+              <a:rPr lang="en-US" i="1" dirty="0" err="1"/>
+              <a:t>len</a:t>
+            </a:r>
+            <a:r>
+              <a:rPr lang="en-US" i="1" dirty="0"/>
+              <a:t>(q</a:t>
+            </a:r>
+            <a:r>
+              <a:rPr lang="en-US" i="1" dirty="0" smtClean="0"/>
+              <a:t>) </a:t>
+            </a:r>
+            <a:r>
+              <a:rPr lang="en-US" dirty="0" smtClean="0"/>
+              <a:t> to min(</a:t>
+            </a:r>
+            <a:r>
+              <a:rPr lang="en-US" i="1" dirty="0" err="1" smtClean="0"/>
+              <a:t>len</a:t>
+            </a:r>
+            <a:r>
+              <a:rPr lang="en-US" i="1" dirty="0" smtClean="0"/>
+              <a:t>(q)/</a:t>
+            </a:r>
+            <a:r>
+              <a:rPr lang="el-GR" i="1" dirty="0"/>
+              <a:t> τ</a:t>
+            </a:r>
+            <a:r>
+              <a:rPr lang="en-US" i="1" dirty="0" smtClean="0"/>
+              <a:t>, </a:t>
+            </a:r>
+            <a:r>
+              <a:rPr lang="el-GR" dirty="0"/>
+              <a:t>λ</a:t>
+            </a:r>
+            <a:r>
+              <a:rPr lang="en-US" baseline="-25000" dirty="0" smtClean="0"/>
+              <a:t>1</a:t>
+            </a:r>
+            <a:r>
+              <a:rPr lang="en-US" dirty="0" smtClean="0"/>
+              <a:t>)</a:t>
+            </a:r>
+          </a:p>
+          <a:p>
+            <a:r>
+              <a:rPr lang="en-US" dirty="0" smtClean="0"/>
+              <a:t>Store candidates in candidate set </a:t>
+            </a:r>
+            <a:r>
+              <a:rPr lang="en-US" i="1" dirty="0" smtClean="0"/>
+              <a:t>C</a:t>
+            </a:r>
+          </a:p>
+          <a:p>
+            <a:endParaRPr lang="en-US" dirty="0" smtClean="0"/>
+          </a:p>
+        </p:txBody>
+      </p:sp>
+    </p:spTree>
+    <p:extLst>
+      <p:ext uri="{BB962C8B-B14F-4D97-AF65-F5344CB8AC3E}">
+        <p14:creationId xmlns:p14="http://schemas.microsoft.com/office/powerpoint/2010/main" val="2740628492"/>
+      </p:ext>
+    </p:extLst>
+  </p:cSld>
+  <p:clrMapOvr>
+    <a:masterClrMapping/>
+  </p:clrMapOvr>
+</p:sld>
+</file>
+
+<file path=ppt/slides/slide16.xml><?xml version="1.0" encoding="utf-8"?>
 <p:sld xmlns:a="http://schemas.openxmlformats.org/drawingml/2006/main" xmlns:r="http://schemas.openxmlformats.org/officeDocument/2006/relationships" xmlns:p="http://schemas.openxmlformats.org/presentationml/2006/main">
   <p:cSld>
     <p:spTree>
@@ -4454,257 +4685,6 @@
 </p:sld>
 </file>
 
-<file path=ppt/slides/slide16.xml><?xml version="1.0" encoding="utf-8"?>
-<p:sld xmlns:a="http://schemas.openxmlformats.org/drawingml/2006/main" xmlns:r="http://schemas.openxmlformats.org/officeDocument/2006/relationships" xmlns:p="http://schemas.openxmlformats.org/presentationml/2006/main">
-  <p:cSld>
-    <p:spTree>
-      <p:nvGrpSpPr>
-        <p:cNvPr id="1" name=""/>
-        <p:cNvGrpSpPr/>
-        <p:nvPr/>
-      </p:nvGrpSpPr>
-      <p:grpSpPr>
-        <a:xfrm>
-          <a:off x="0" y="0"/>
-          <a:ext cx="0" cy="0"/>
-          <a:chOff x="0" y="0"/>
-          <a:chExt cx="0" cy="0"/>
-        </a:xfrm>
-      </p:grpSpPr>
-      <p:sp>
-        <p:nvSpPr>
-          <p:cNvPr id="2" name="Title 1"/>
-          <p:cNvSpPr>
-            <a:spLocks noGrp="1"/>
-          </p:cNvSpPr>
-          <p:nvPr>
-            <p:ph type="title"/>
-          </p:nvPr>
-        </p:nvSpPr>
-        <p:spPr/>
-        <p:txBody>
-          <a:bodyPr/>
-          <a:lstStyle/>
-          <a:p>
-            <a:r>
-              <a:rPr lang="en-US" dirty="0" smtClean="0"/>
-              <a:t>Shortest-First Algorithm (SF)</a:t>
-            </a:r>
-            <a:endParaRPr lang="en-US" dirty="0"/>
-          </a:p>
-        </p:txBody>
-      </p:sp>
-      <p:sp>
-        <p:nvSpPr>
-          <p:cNvPr id="3" name="Content Placeholder 2"/>
-          <p:cNvSpPr>
-            <a:spLocks noGrp="1"/>
-          </p:cNvSpPr>
-          <p:nvPr>
-            <p:ph idx="1"/>
-          </p:nvPr>
-        </p:nvSpPr>
-        <p:spPr/>
-        <p:txBody>
-          <a:bodyPr>
-            <a:normAutofit fontScale="92500" lnSpcReduction="10000"/>
-          </a:bodyPr>
-          <a:lstStyle/>
-          <a:p>
-            <a:r>
-              <a:rPr lang="en-US" dirty="0" smtClean="0"/>
-              <a:t>If we view </a:t>
-            </a:r>
-            <a:r>
-              <a:rPr lang="en-US" dirty="0" err="1" smtClean="0"/>
-              <a:t>iNRA</a:t>
-            </a:r>
-            <a:r>
-              <a:rPr lang="en-US" dirty="0" smtClean="0"/>
-              <a:t> as a breadth first approach, then SF is a depth first approach</a:t>
-            </a:r>
-          </a:p>
-          <a:p>
-            <a:r>
-              <a:rPr lang="en-US" dirty="0" smtClean="0"/>
-              <a:t>Skip to first entry in every list with length </a:t>
-            </a:r>
-            <a:r>
-              <a:rPr lang="en-US" i="1" dirty="0" err="1" smtClean="0"/>
-              <a:t>len</a:t>
-            </a:r>
-            <a:r>
-              <a:rPr lang="en-US" i="1" dirty="0" smtClean="0"/>
-              <a:t>(s) &gt;= </a:t>
-            </a:r>
-            <a:r>
-              <a:rPr lang="el-GR" i="1" dirty="0" smtClean="0"/>
-              <a:t>τ</a:t>
-            </a:r>
-            <a:r>
-              <a:rPr lang="en-US" i="1" dirty="0" smtClean="0"/>
-              <a:t> </a:t>
-            </a:r>
-            <a:r>
-              <a:rPr lang="en-US" i="1" dirty="0" err="1" smtClean="0"/>
-              <a:t>len</a:t>
-            </a:r>
-            <a:r>
-              <a:rPr lang="en-US" i="1" dirty="0" smtClean="0"/>
-              <a:t>(q)</a:t>
-            </a:r>
-          </a:p>
-          <a:p>
-            <a:r>
-              <a:rPr lang="en-US" dirty="0"/>
-              <a:t>Compute </a:t>
-            </a:r>
-            <a:r>
-              <a:rPr lang="el-GR" dirty="0"/>
-              <a:t>λ</a:t>
-            </a:r>
-            <a:r>
-              <a:rPr lang="en-US" baseline="-25000" dirty="0"/>
-              <a:t>1….n</a:t>
-            </a:r>
-            <a:endParaRPr lang="en-US" dirty="0"/>
-          </a:p>
-          <a:p>
-            <a:r>
-              <a:rPr lang="en-US" dirty="0" smtClean="0"/>
-              <a:t>Scan inverted lists in decreasing </a:t>
-            </a:r>
-            <a:r>
-              <a:rPr lang="en-US" dirty="0" err="1" smtClean="0"/>
-              <a:t>idf</a:t>
-            </a:r>
-            <a:r>
-              <a:rPr lang="en-US" dirty="0" smtClean="0"/>
-              <a:t> order</a:t>
-            </a:r>
-          </a:p>
-          <a:p>
-            <a:pPr lvl="1"/>
-            <a:r>
-              <a:rPr lang="en-US" dirty="0" smtClean="0"/>
-              <a:t>Tokens with higher </a:t>
-            </a:r>
-            <a:r>
-              <a:rPr lang="en-US" dirty="0" err="1" smtClean="0"/>
-              <a:t>idfs</a:t>
-            </a:r>
-            <a:r>
-              <a:rPr lang="en-US" dirty="0" smtClean="0"/>
-              <a:t> examined first</a:t>
-            </a:r>
-          </a:p>
-          <a:p>
-            <a:pPr lvl="2"/>
-            <a:r>
-              <a:rPr lang="en-US" dirty="0" smtClean="0"/>
-              <a:t>Occur in fewer strings</a:t>
-            </a:r>
-          </a:p>
-          <a:p>
-            <a:pPr lvl="2"/>
-            <a:r>
-              <a:rPr lang="en-US" dirty="0" smtClean="0"/>
-              <a:t>Smaller lists of strings that they occur in</a:t>
-            </a:r>
-          </a:p>
-          <a:p>
-            <a:pPr lvl="2"/>
-            <a:r>
-              <a:rPr lang="en-US" dirty="0" smtClean="0"/>
-              <a:t>Smallest chance of false positive candidates</a:t>
-            </a:r>
-          </a:p>
-          <a:p>
-            <a:r>
-              <a:rPr lang="en-US" dirty="0" smtClean="0"/>
-              <a:t>Scan for elements of length from </a:t>
-            </a:r>
-            <a:r>
-              <a:rPr lang="el-GR" i="1" dirty="0"/>
-              <a:t>τ</a:t>
-            </a:r>
-            <a:r>
-              <a:rPr lang="en-US" i="1" dirty="0"/>
-              <a:t> </a:t>
-            </a:r>
-            <a:r>
-              <a:rPr lang="en-US" i="1" dirty="0" err="1"/>
-              <a:t>len</a:t>
-            </a:r>
-            <a:r>
-              <a:rPr lang="en-US" i="1" dirty="0"/>
-              <a:t>(q</a:t>
-            </a:r>
-            <a:r>
-              <a:rPr lang="en-US" i="1" dirty="0" smtClean="0"/>
-              <a:t>) </a:t>
-            </a:r>
-            <a:r>
-              <a:rPr lang="en-US" dirty="0" smtClean="0"/>
-              <a:t> to min(</a:t>
-            </a:r>
-            <a:r>
-              <a:rPr lang="en-US" i="1" dirty="0" err="1" smtClean="0"/>
-              <a:t>len</a:t>
-            </a:r>
-            <a:r>
-              <a:rPr lang="en-US" i="1" dirty="0" smtClean="0"/>
-              <a:t>(q)/</a:t>
-            </a:r>
-            <a:r>
-              <a:rPr lang="el-GR" i="1" dirty="0"/>
-              <a:t> τ</a:t>
-            </a:r>
-            <a:r>
-              <a:rPr lang="en-US" i="1" dirty="0" smtClean="0"/>
-              <a:t>, </a:t>
-            </a:r>
-            <a:r>
-              <a:rPr lang="el-GR" dirty="0"/>
-              <a:t>λ</a:t>
-            </a:r>
-            <a:r>
-              <a:rPr lang="en-US" baseline="-25000" dirty="0" smtClean="0"/>
-              <a:t>1</a:t>
-            </a:r>
-            <a:r>
-              <a:rPr lang="en-US" dirty="0" smtClean="0"/>
-              <a:t>)</a:t>
-            </a:r>
-          </a:p>
-          <a:p>
-            <a:r>
-              <a:rPr lang="en-US" dirty="0" smtClean="0"/>
-              <a:t>Store candidates in candidate set </a:t>
-            </a:r>
-            <a:r>
-              <a:rPr lang="en-US" i="1" dirty="0" smtClean="0"/>
-              <a:t>C</a:t>
-            </a:r>
-          </a:p>
-          <a:p>
-            <a:endParaRPr lang="en-US" dirty="0" smtClean="0"/>
-          </a:p>
-        </p:txBody>
-      </p:sp>
-    </p:spTree>
-    <p:extLst>
-      <p:ext uri="{BB962C8B-B14F-4D97-AF65-F5344CB8AC3E}">
-        <p14:creationId xmlns:p14="http://schemas.microsoft.com/office/powerpoint/2010/main" val="2740628492"/>
-      </p:ext>
-    </p:extLst>
-  </p:cSld>
-  <p:clrMapOvr>
-    <a:masterClrMapping/>
-  </p:clrMapOvr>
-</p:sld>
-</file>
-
 <file path=ppt/slides/slide17.xml><?xml version="1.0" encoding="utf-8"?>
 <p:sld xmlns:a="http://schemas.openxmlformats.org/drawingml/2006/main" xmlns:r="http://schemas.openxmlformats.org/officeDocument/2006/relationships" xmlns:p="http://schemas.openxmlformats.org/presentationml/2006/main">
   <p:cSld>
@@ -5497,7 +5477,11 @@
           <a:bodyPr/>
           <a:lstStyle/>
           <a:p>
-            <a:endParaRPr lang="en-US"/>
+            <a:r>
+              <a:rPr lang="en-US" dirty="0" smtClean="0"/>
+              <a:t>Experimental Results</a:t>
+            </a:r>
+            <a:endParaRPr lang="en-US" dirty="0"/>
           </a:p>
         </p:txBody>
       </p:sp>
@@ -5516,7 +5500,68 @@
           <a:bodyPr/>
           <a:lstStyle/>
           <a:p>
-            <a:endParaRPr lang="en-US"/>
+            <a:r>
+              <a:rPr lang="en-US" dirty="0" smtClean="0"/>
+              <a:t>Non-Composit</a:t>
+            </a:r>
+            <a:r>
+              <a:rPr lang="en-US" dirty="0" smtClean="0"/>
+              <a:t>e Index </a:t>
+            </a:r>
+            <a:r>
+              <a:rPr lang="en-US" dirty="0" smtClean="0"/>
+              <a:t>Basic SQL query never terminated in reasonable time</a:t>
+            </a:r>
+          </a:p>
+          <a:p>
+            <a:r>
+              <a:rPr lang="en-US" dirty="0" smtClean="0"/>
+              <a:t>Inverted Indexes</a:t>
+            </a:r>
+          </a:p>
+          <a:p>
+            <a:pPr lvl="1"/>
+            <a:r>
+              <a:rPr lang="en-US" dirty="0" smtClean="0"/>
+              <a:t>Multi-way Merge, TA/NRA</a:t>
+            </a:r>
+          </a:p>
+          <a:p>
+            <a:pPr lvl="1"/>
+            <a:r>
+              <a:rPr lang="en-US" dirty="0" smtClean="0"/>
+              <a:t>With and without skip lists</a:t>
+            </a:r>
+          </a:p>
+          <a:p>
+            <a:pPr lvl="1"/>
+            <a:r>
+              <a:rPr lang="en-US" dirty="0" smtClean="0"/>
+              <a:t>Total size of inverted lists 5GB</a:t>
+            </a:r>
+          </a:p>
+          <a:p>
+            <a:r>
+              <a:rPr lang="en-US" dirty="0" smtClean="0"/>
+              <a:t>Extendible Hashing</a:t>
+            </a:r>
+          </a:p>
+          <a:p>
+            <a:pPr lvl="1"/>
+            <a:r>
+              <a:rPr lang="en-US" dirty="0" smtClean="0"/>
+              <a:t>3.2 GB</a:t>
+            </a:r>
+          </a:p>
+          <a:p>
+            <a:r>
+              <a:rPr lang="en-US" dirty="0" smtClean="0"/>
+              <a:t>All indexing structures are significantly larger than dataset</a:t>
+            </a:r>
+          </a:p>
+          <a:p>
+            <a:pPr lvl="1"/>
+            <a:endParaRPr lang="en-US" dirty="0"/>
           </a:p>
         </p:txBody>
       </p:sp>
@@ -5567,7 +5612,7 @@
           <a:p>
             <a:r>
               <a:rPr lang="en-US" dirty="0" smtClean="0"/>
-              <a:t>Conclusions</a:t>
+              <a:t>Experimental Summary</a:t>
             </a:r>
             <a:endParaRPr lang="en-US" dirty="0"/>
           </a:p>
@@ -5590,43 +5635,134 @@
           <a:p>
             <a:r>
               <a:rPr lang="en-US" dirty="0" smtClean="0"/>
-              <a:t>In General, SF had the best performance of the mentioned algorithms</a:t>
+              <a:t>SF is the winner in terms of </a:t>
             </a:r>
           </a:p>
           <a:p>
             <a:pPr lvl="1"/>
             <a:r>
               <a:rPr lang="en-US" dirty="0" smtClean="0"/>
-              <a:t>Only in certain edge cases did the guarantees of </a:t>
-            </a:r>
-            <a:r>
-              <a:rPr lang="en-US" dirty="0" err="1" smtClean="0"/>
-              <a:t>iNRA</a:t>
-            </a:r>
+              <a:t>Computation Cost (due to low bookkeeping)</a:t>
+            </a:r>
+          </a:p>
+          <a:p>
+            <a:pPr lvl="1"/>
             <a:r>
               <a:rPr lang="en-US" dirty="0" smtClean="0"/>
-              <a:t> improve performance</a:t>
+              <a:t>Index Size (Only uses inverted and skip lists)</a:t>
+            </a:r>
+          </a:p>
+          <a:p>
+            <a:r>
+              <a:rPr lang="en-US" dirty="0" smtClean="0"/>
+              <a:t>Hybrid Algorithm has higher pruning power</a:t>
             </a:r>
           </a:p>
           <a:p>
             <a:pPr lvl="1"/>
             <a:r>
               <a:rPr lang="en-US" dirty="0" smtClean="0"/>
-              <a:t>The minimal bookkeeping </a:t>
-            </a:r>
-            <a:r>
-              <a:rPr lang="en-US" dirty="0" err="1" smtClean="0"/>
-              <a:t>outweighted</a:t>
-            </a:r>
+              <a:t>More involved data structures increase computation cost</a:t>
+            </a:r>
+          </a:p>
+          <a:p>
+            <a:endParaRPr lang="en-US" dirty="0"/>
+          </a:p>
+        </p:txBody>
+      </p:sp>
+    </p:spTree>
+    <p:extLst>
+      <p:ext uri="{BB962C8B-B14F-4D97-AF65-F5344CB8AC3E}">
+        <p14:creationId xmlns:p14="http://schemas.microsoft.com/office/powerpoint/2010/main" val="1953993284"/>
+      </p:ext>
+    </p:extLst>
+  </p:cSld>
+  <p:clrMapOvr>
+    <a:masterClrMapping/>
+  </p:clrMapOvr>
+</p:sld>
+</file>
+
+<file path=ppt/slides/slide24.xml><?xml version="1.0" encoding="utf-8"?>
+<p:sld xmlns:a="http://schemas.openxmlformats.org/drawingml/2006/main" xmlns:r="http://schemas.openxmlformats.org/officeDocument/2006/relationships" xmlns:p="http://schemas.openxmlformats.org/presentationml/2006/main">
+  <p:cSld>
+    <p:spTree>
+      <p:nvGrpSpPr>
+        <p:cNvPr id="1" name=""/>
+        <p:cNvGrpSpPr/>
+        <p:nvPr/>
+      </p:nvGrpSpPr>
+      <p:grpSpPr>
+        <a:xfrm>
+          <a:off x="0" y="0"/>
+          <a:ext cx="0" cy="0"/>
+          <a:chOff x="0" y="0"/>
+          <a:chExt cx="0" cy="0"/>
+        </a:xfrm>
+      </p:grpSpPr>
+      <p:sp>
+        <p:nvSpPr>
+          <p:cNvPr id="2" name="Title 1"/>
+          <p:cNvSpPr>
+            <a:spLocks noGrp="1"/>
+          </p:cNvSpPr>
+          <p:nvPr>
+            <p:ph type="title"/>
+          </p:nvPr>
+        </p:nvSpPr>
+        <p:spPr/>
+        <p:txBody>
+          <a:bodyPr/>
+          <a:lstStyle/>
+          <a:p>
             <a:r>
               <a:rPr lang="en-US" dirty="0" smtClean="0"/>
-              <a:t> gains from pruning search space</a:t>
-            </a:r>
-          </a:p>
+              <a:t>Conclusions</a:t>
+            </a:r>
+            <a:endParaRPr lang="en-US" dirty="0"/>
+          </a:p>
+        </p:txBody>
+      </p:sp>
+      <p:sp>
+        <p:nvSpPr>
+          <p:cNvPr id="3" name="Content Placeholder 2"/>
+          <p:cNvSpPr>
+            <a:spLocks noGrp="1"/>
+          </p:cNvSpPr>
+          <p:nvPr>
+            <p:ph idx="1"/>
+          </p:nvPr>
+        </p:nvSpPr>
+        <p:spPr/>
+        <p:txBody>
+          <a:bodyPr/>
+          <a:lstStyle/>
           <a:p>
             <a:r>
               <a:rPr lang="en-US" dirty="0" smtClean="0"/>
-              <a:t>All similarity search algorithms from this paper can benefit from Length Bounded pruning</a:t>
+              <a:t>Similarity measures can be exploited in set similarity</a:t>
+            </a:r>
+          </a:p>
+          <a:p>
+            <a:pPr lvl="1"/>
+            <a:r>
+              <a:rPr lang="en-US" dirty="0" smtClean="0"/>
+              <a:t>Length Bounding</a:t>
+            </a:r>
+            <a:endParaRPr lang="en-US" dirty="0" smtClean="0"/>
+          </a:p>
+          <a:p>
+            <a:r>
+              <a:rPr lang="en-US" dirty="0" smtClean="0"/>
+              <a:t>Many similarity </a:t>
+            </a:r>
+            <a:r>
+              <a:rPr lang="en-US" dirty="0" smtClean="0"/>
+              <a:t>search algorithms can </a:t>
+            </a:r>
+            <a:r>
+              <a:rPr lang="en-US" dirty="0" smtClean="0"/>
+              <a:t>benefit from Length Bounded pruning</a:t>
             </a:r>
           </a:p>
           <a:p>
@@ -5718,11 +5854,7 @@
             <a:pPr lvl="1"/>
             <a:r>
               <a:rPr lang="en-US" dirty="0" smtClean="0"/>
-              <a:t>The more times the term </a:t>
-            </a:r>
-            <a:r>
-              <a:rPr lang="en-US" dirty="0" smtClean="0"/>
-              <a:t>occurs in a </a:t>
+              <a:t>The more times the term occurs in a </a:t>
             </a:r>
             <a:r>
               <a:rPr lang="en-US" dirty="0" err="1" smtClean="0"/>
@@ -5730,15 +5862,7 @@
             </a:r>
             <a:r>
               <a:rPr lang="en-US" dirty="0" smtClean="0"/>
-              <a:t> </a:t>
-            </a:r>
-            <a:r>
-              <a:rPr lang="en-US" dirty="0" smtClean="0"/>
-              <a:t>(more common), the more weight given to </a:t>
-            </a:r>
-            <a:r>
-              <a:rPr lang="en-US" dirty="0" smtClean="0"/>
-              <a:t>it</a:t>
+              <a:t> (more common), the more weight given to it</a:t>
             </a:r>
           </a:p>
           <a:p>
@@ -5747,7 +5871,6 @@
               <a:rPr lang="en-US" dirty="0" smtClean="0"/>
               <a:t>In practice, the cardinality is so small that TF can be dropped without affecting the quality of the results</a:t>
             </a:r>
-            <a:endParaRPr lang="en-US" dirty="0" smtClean="0"/>
           </a:p>
           <a:p>
             <a:r>
@@ -5759,11 +5882,7 @@
             <a:pPr lvl="1"/>
             <a:r>
               <a:rPr lang="en-US" dirty="0" smtClean="0"/>
-              <a:t>The inverse of the total number of times a token appear in a </a:t>
-            </a:r>
-            <a:r>
-              <a:rPr lang="en-US" dirty="0" smtClean="0"/>
-              <a:t>database</a:t>
+              <a:t>The inverse of the total number of times a token appear in a database</a:t>
             </a:r>
           </a:p>
           <a:p>
@@ -5772,7 +5891,6 @@
               <a:rPr lang="en-US" dirty="0" smtClean="0"/>
               <a:t>The less a term occurs in the database (more rare), the more weight it has</a:t>
             </a:r>
-            <a:endParaRPr lang="en-US" dirty="0" smtClean="0"/>
           </a:p>
           <a:p>
             <a:pPr lvl="1"/>
@@ -5888,15 +6006,7 @@
           <a:p>
             <a:r>
               <a:rPr lang="en-US" dirty="0" smtClean="0"/>
-              <a:t>Normalized </a:t>
-            </a:r>
-            <a:r>
-              <a:rPr lang="en-US" dirty="0" smtClean="0"/>
-              <a:t>Set </a:t>
-            </a:r>
-            <a:r>
-              <a:rPr lang="en-US" dirty="0" smtClean="0"/>
-              <a:t>Length</a:t>
+              <a:t>Normalized Set Length</a:t>
             </a:r>
           </a:p>
           <a:p>
@@ -5972,8 +6082,8 @@
           </a:p>
         </p:txBody>
       </p:sp>
-      <mc:AlternateContent xmlns:mc="http://schemas.openxmlformats.org/markup-compatibility/2006">
-        <mc:Choice xmlns:a14="http://schemas.microsoft.com/office/drawing/2010/main" Requires="a14">
+      <mc:AlternateContent xmlns:mc="http://schemas.openxmlformats.org/markup-compatibility/2006" xmlns:a14="http://schemas.microsoft.com/office/drawing/2010/main">
+        <mc:Choice Requires="a14">
           <p:sp>
             <p:nvSpPr>
               <p:cNvPr id="3" name="Content Placeholder 2"/>
@@ -6256,7 +6366,7 @@
                     <m:d>
                       <m:dPr>
                         <m:ctrlPr>
-                          <a:rPr lang="en-US" b="0" i="0" smtClean="0">
+                          <a:rPr lang="en-US" b="0" i="1" smtClean="0">
                             <a:latin typeface="Cambria Math" panose="02040503050406030204" pitchFamily="18" charset="0"/>
                           </a:rPr>
                         </m:ctrlPr>
@@ -6616,7 +6726,7 @@
             </p:txBody>
           </p:sp>
         </mc:Choice>
-        <mc:Fallback>
+        <mc:Fallback xmlns="">
           <p:sp>
             <p:nvSpPr>
               <p:cNvPr id="3" name="Content Placeholder 2"/>
@@ -6892,15 +7002,7 @@
           <a:p>
             <a:r>
               <a:rPr lang="en-US" dirty="0" smtClean="0"/>
-              <a:t>Existing </a:t>
-            </a:r>
-            <a:r>
-              <a:rPr lang="en-US" dirty="0" smtClean="0"/>
-              <a:t>Techniques – </a:t>
-            </a:r>
-            <a:r>
-              <a:rPr lang="en-US" dirty="0" smtClean="0"/>
-              <a:t>Relational Database</a:t>
+              <a:t>Existing Techniques – Relational Database</a:t>
             </a:r>
             <a:endParaRPr lang="en-US" dirty="0"/>
           </a:p>
@@ -8268,15 +8370,7 @@
           <a:p>
             <a:r>
               <a:rPr lang="en-US" dirty="0" smtClean="0"/>
-              <a:t>Existing </a:t>
-            </a:r>
-            <a:r>
-              <a:rPr lang="en-US" dirty="0" smtClean="0"/>
-              <a:t>Techniques – </a:t>
-            </a:r>
-            <a:r>
-              <a:rPr lang="en-US" dirty="0" smtClean="0"/>
-              <a:t>Inverted List</a:t>
+              <a:t>Existing Techniques – Inverted List</a:t>
             </a:r>
             <a:endParaRPr lang="en-US" dirty="0"/>
           </a:p>

</xml_diff>